<commit_message>
mas avanzes sobre la clase final para AA
</commit_message>
<xml_diff>
--- a/doc/clase/presentacion.pptx
+++ b/doc/clase/presentacion.pptx
@@ -11,27 +11,36 @@
     <p:sldId id="260" r:id="rId5"/>
     <p:sldId id="259" r:id="rId6"/>
     <p:sldId id="261" r:id="rId7"/>
-    <p:sldId id="263" r:id="rId8"/>
-    <p:sldId id="271" r:id="rId9"/>
-    <p:sldId id="270" r:id="rId10"/>
-    <p:sldId id="262" r:id="rId11"/>
-    <p:sldId id="264" r:id="rId12"/>
-    <p:sldId id="265" r:id="rId13"/>
-    <p:sldId id="266" r:id="rId14"/>
-    <p:sldId id="272" r:id="rId15"/>
-    <p:sldId id="267" r:id="rId16"/>
-    <p:sldId id="273" r:id="rId17"/>
-    <p:sldId id="279" r:id="rId18"/>
-    <p:sldId id="274" r:id="rId19"/>
-    <p:sldId id="277" r:id="rId20"/>
-    <p:sldId id="278" r:id="rId21"/>
-    <p:sldId id="275" r:id="rId22"/>
-    <p:sldId id="276" r:id="rId23"/>
-    <p:sldId id="280" r:id="rId24"/>
-    <p:sldId id="281" r:id="rId25"/>
-    <p:sldId id="282" r:id="rId26"/>
-    <p:sldId id="284" r:id="rId27"/>
-    <p:sldId id="283" r:id="rId28"/>
+    <p:sldId id="286" r:id="rId8"/>
+    <p:sldId id="263" r:id="rId9"/>
+    <p:sldId id="271" r:id="rId10"/>
+    <p:sldId id="270" r:id="rId11"/>
+    <p:sldId id="262" r:id="rId12"/>
+    <p:sldId id="264" r:id="rId13"/>
+    <p:sldId id="265" r:id="rId14"/>
+    <p:sldId id="266" r:id="rId15"/>
+    <p:sldId id="272" r:id="rId16"/>
+    <p:sldId id="267" r:id="rId17"/>
+    <p:sldId id="273" r:id="rId18"/>
+    <p:sldId id="279" r:id="rId19"/>
+    <p:sldId id="274" r:id="rId20"/>
+    <p:sldId id="277" r:id="rId21"/>
+    <p:sldId id="278" r:id="rId22"/>
+    <p:sldId id="275" r:id="rId23"/>
+    <p:sldId id="276" r:id="rId24"/>
+    <p:sldId id="294" r:id="rId25"/>
+    <p:sldId id="288" r:id="rId26"/>
+    <p:sldId id="289" r:id="rId27"/>
+    <p:sldId id="290" r:id="rId28"/>
+    <p:sldId id="291" r:id="rId29"/>
+    <p:sldId id="292" r:id="rId30"/>
+    <p:sldId id="287" r:id="rId31"/>
+    <p:sldId id="283" r:id="rId32"/>
+    <p:sldId id="285" r:id="rId33"/>
+    <p:sldId id="293" r:id="rId34"/>
+    <p:sldId id="295" r:id="rId35"/>
+    <p:sldId id="296" r:id="rId36"/>
+    <p:sldId id="297" r:id="rId37"/>
   </p:sldIdLst>
   <p:sldSz cx="9144000" cy="6858000" type="screen4x3"/>
   <p:notesSz cx="6858000" cy="9144000"/>
@@ -1761,6 +1770,13 @@
         </dgm:presLayoutVars>
       </dgm:prSet>
       <dgm:spPr/>
+      <dgm:t>
+        <a:bodyPr/>
+        <a:lstStyle/>
+        <a:p>
+          <a:endParaRPr lang="es-AR"/>
+        </a:p>
+      </dgm:t>
     </dgm:pt>
     <dgm:pt modelId="{4F0E77D5-AD74-4656-82EE-869EEA01FBE1}" type="pres">
       <dgm:prSet presAssocID="{7361E55B-6BFA-4532-AF44-50875721E62D}" presName="parSpace" presStyleCnt="0"/>
@@ -1803,12 +1819,12 @@
   </dgm:ptLst>
   <dgm:cxnLst>
     <dgm:cxn modelId="{4893D02B-96C4-4A8D-8A95-8F9D82E6F1EF}" type="presOf" srcId="{E615D9DA-70D4-4224-86D9-2EDC90E15FA8}" destId="{B5D79D17-A2A7-435A-A391-E81BA24422DB}" srcOrd="0" destOrd="0" presId="urn:microsoft.com/office/officeart/2005/8/layout/hChevron3"/>
+    <dgm:cxn modelId="{C4B01AA2-092A-4954-8F22-AAC1FB6BDEF9}" type="presOf" srcId="{137E4E3A-77DB-4FCF-A8A9-43CC38CD037F}" destId="{C88191C9-BD0A-4A01-B71F-466F7155B892}" srcOrd="0" destOrd="0" presId="urn:microsoft.com/office/officeart/2005/8/layout/hChevron3"/>
     <dgm:cxn modelId="{B93A6187-CF13-4E40-937C-7547C5FD881E}" srcId="{C0EC6E3E-8E68-436F-A18B-FC1D8C6C59DC}" destId="{E615D9DA-70D4-4224-86D9-2EDC90E15FA8}" srcOrd="2" destOrd="0" parTransId="{AD8EA524-8699-4966-97A6-FD08AB3281E8}" sibTransId="{923BADBE-F4AA-4608-A4A1-167E7D4CAA36}"/>
-    <dgm:cxn modelId="{C4B01AA2-092A-4954-8F22-AAC1FB6BDEF9}" type="presOf" srcId="{137E4E3A-77DB-4FCF-A8A9-43CC38CD037F}" destId="{C88191C9-BD0A-4A01-B71F-466F7155B892}" srcOrd="0" destOrd="0" presId="urn:microsoft.com/office/officeart/2005/8/layout/hChevron3"/>
     <dgm:cxn modelId="{3E08A404-CBF6-4E5E-85C9-79B0D983FD22}" srcId="{C0EC6E3E-8E68-436F-A18B-FC1D8C6C59DC}" destId="{137E4E3A-77DB-4FCF-A8A9-43CC38CD037F}" srcOrd="1" destOrd="0" parTransId="{CE0E05C1-9F98-44F9-8BAB-B3D75A990D3E}" sibTransId="{B9C9001A-B351-4E7C-A98B-43867C539500}"/>
     <dgm:cxn modelId="{1EBC5343-AA02-416F-909F-C34B6C3F4020}" type="presOf" srcId="{C0EC6E3E-8E68-436F-A18B-FC1D8C6C59DC}" destId="{D191350D-AD94-4DE6-AFC8-AD652B26986F}" srcOrd="0" destOrd="0" presId="urn:microsoft.com/office/officeart/2005/8/layout/hChevron3"/>
+    <dgm:cxn modelId="{9CE55687-3F7B-4392-A9EA-321582C866EB}" type="presOf" srcId="{D7AE5D53-BD0F-49DF-B844-F8F97345DE8F}" destId="{1C8F5D31-CF5B-4E6F-B59D-9B354588CB0B}" srcOrd="0" destOrd="0" presId="urn:microsoft.com/office/officeart/2005/8/layout/hChevron3"/>
     <dgm:cxn modelId="{8A15411A-7A6A-4D0D-9F2A-9F59D9515087}" srcId="{C0EC6E3E-8E68-436F-A18B-FC1D8C6C59DC}" destId="{D7AE5D53-BD0F-49DF-B844-F8F97345DE8F}" srcOrd="0" destOrd="0" parTransId="{5DDED1AE-B3D9-4DCA-9ABB-959179F88FCD}" sibTransId="{7361E55B-6BFA-4532-AF44-50875721E62D}"/>
-    <dgm:cxn modelId="{9CE55687-3F7B-4392-A9EA-321582C866EB}" type="presOf" srcId="{D7AE5D53-BD0F-49DF-B844-F8F97345DE8F}" destId="{1C8F5D31-CF5B-4E6F-B59D-9B354588CB0B}" srcOrd="0" destOrd="0" presId="urn:microsoft.com/office/officeart/2005/8/layout/hChevron3"/>
     <dgm:cxn modelId="{DAD0AE4D-5DD8-4341-9157-AAD814EF5982}" type="presParOf" srcId="{D191350D-AD94-4DE6-AFC8-AD652B26986F}" destId="{1C8F5D31-CF5B-4E6F-B59D-9B354588CB0B}" srcOrd="0" destOrd="0" presId="urn:microsoft.com/office/officeart/2005/8/layout/hChevron3"/>
     <dgm:cxn modelId="{80D2F397-8C39-4B09-AB26-4C0F3EA1525D}" type="presParOf" srcId="{D191350D-AD94-4DE6-AFC8-AD652B26986F}" destId="{4F0E77D5-AD74-4656-82EE-869EEA01FBE1}" srcOrd="1" destOrd="0" presId="urn:microsoft.com/office/officeart/2005/8/layout/hChevron3"/>
     <dgm:cxn modelId="{CFF36397-408F-4B93-A7EC-BD46C2D2E8AE}" type="presParOf" srcId="{D191350D-AD94-4DE6-AFC8-AD652B26986F}" destId="{C88191C9-BD0A-4A01-B71F-466F7155B892}" srcOrd="2" destOrd="0" presId="urn:microsoft.com/office/officeart/2005/8/layout/hChevron3"/>
@@ -2046,6 +2062,13 @@
         </dgm:presLayoutVars>
       </dgm:prSet>
       <dgm:spPr/>
+      <dgm:t>
+        <a:bodyPr/>
+        <a:lstStyle/>
+        <a:p>
+          <a:endParaRPr lang="es-AR"/>
+        </a:p>
+      </dgm:t>
     </dgm:pt>
     <dgm:pt modelId="{79A6DD49-6E5F-4CA2-9326-B6CDFC3DDA11}" type="pres">
       <dgm:prSet presAssocID="{51CF406E-693A-4DEB-B54C-7A0244E6D397}" presName="boxAndChildren" presStyleCnt="0"/>
@@ -2073,6 +2096,13 @@
     <dgm:pt modelId="{0DD11015-9266-4A79-8DCA-6781A4155265}" type="pres">
       <dgm:prSet presAssocID="{7EDDF34F-5222-415B-959D-70E702701ABF}" presName="parentTextArrow" presStyleLbl="node1" presStyleIdx="1" presStyleCnt="7"/>
       <dgm:spPr/>
+      <dgm:t>
+        <a:bodyPr/>
+        <a:lstStyle/>
+        <a:p>
+          <a:endParaRPr lang="es-AR"/>
+        </a:p>
+      </dgm:t>
     </dgm:pt>
     <dgm:pt modelId="{8D47431A-C463-473F-94CA-F9B0BAC09CA3}" type="pres">
       <dgm:prSet presAssocID="{D9355720-5703-41BD-8C25-730290DBC425}" presName="sp" presStyleCnt="0"/>
@@ -2085,6 +2115,13 @@
     <dgm:pt modelId="{9D8C338C-C1CE-47E3-83E6-D49A1CC2DEE4}" type="pres">
       <dgm:prSet presAssocID="{4D681680-480E-4571-BFCF-BA38706BAD01}" presName="parentTextArrow" presStyleLbl="node1" presStyleIdx="2" presStyleCnt="7"/>
       <dgm:spPr/>
+      <dgm:t>
+        <a:bodyPr/>
+        <a:lstStyle/>
+        <a:p>
+          <a:endParaRPr lang="es-AR"/>
+        </a:p>
+      </dgm:t>
     </dgm:pt>
     <dgm:pt modelId="{B30C8ABE-CB28-47FB-946C-092BF1DEE5F0}" type="pres">
       <dgm:prSet presAssocID="{0166271B-B5EE-4EBE-95A8-B48FD7ED199E}" presName="sp" presStyleCnt="0"/>
@@ -2097,6 +2134,13 @@
     <dgm:pt modelId="{A8084B6D-C45E-4B2E-AF58-EE43A1CCDC46}" type="pres">
       <dgm:prSet presAssocID="{971DF4AF-31C1-4228-B6A5-CB107BC7BB68}" presName="parentTextArrow" presStyleLbl="node1" presStyleIdx="3" presStyleCnt="7"/>
       <dgm:spPr/>
+      <dgm:t>
+        <a:bodyPr/>
+        <a:lstStyle/>
+        <a:p>
+          <a:endParaRPr lang="es-AR"/>
+        </a:p>
+      </dgm:t>
     </dgm:pt>
     <dgm:pt modelId="{35261DB9-7644-4DE8-866D-00C15016DA6A}" type="pres">
       <dgm:prSet presAssocID="{793909DF-CA73-4FD0-9B88-4924CC9A23DF}" presName="sp" presStyleCnt="0"/>
@@ -2128,6 +2172,13 @@
     <dgm:pt modelId="{FC55B6BC-794E-4119-A25C-2D7BBDAA7EFA}" type="pres">
       <dgm:prSet presAssocID="{DCC32DCF-4434-4A45-A8B8-E680929BC4A7}" presName="parentTextArrow" presStyleLbl="node1" presStyleIdx="5" presStyleCnt="7"/>
       <dgm:spPr/>
+      <dgm:t>
+        <a:bodyPr/>
+        <a:lstStyle/>
+        <a:p>
+          <a:endParaRPr lang="es-AR"/>
+        </a:p>
+      </dgm:t>
     </dgm:pt>
     <dgm:pt modelId="{36FD4C97-A325-4426-99CE-D7970FB9481A}" type="pres">
       <dgm:prSet presAssocID="{8F71E21C-F895-44C3-ADF7-5BD4F6CFA20C}" presName="sp" presStyleCnt="0"/>
@@ -2150,21 +2201,21 @@
     </dgm:pt>
   </dgm:ptLst>
   <dgm:cxnLst>
+    <dgm:cxn modelId="{5A1F0F94-9758-4EB9-BAAA-57E71F9B7E65}" type="presOf" srcId="{12A82211-3711-4407-8B66-5AEA6A68B1F9}" destId="{2E570F46-AFC9-44A1-B7D7-C636F004319C}" srcOrd="0" destOrd="0" presId="urn:microsoft.com/office/officeart/2005/8/layout/process4"/>
+    <dgm:cxn modelId="{E96AA9B1-5D65-4FFB-9A15-07B47713134E}" type="presOf" srcId="{971DF4AF-31C1-4228-B6A5-CB107BC7BB68}" destId="{A8084B6D-C45E-4B2E-AF58-EE43A1CCDC46}" srcOrd="0" destOrd="0" presId="urn:microsoft.com/office/officeart/2005/8/layout/process4"/>
     <dgm:cxn modelId="{6E771FB7-2CE6-4924-B1E8-77EB92D399CE}" type="presOf" srcId="{0F7CC523-CFFB-490F-BDB2-3653BE2B30BB}" destId="{105D015A-503C-4284-8600-ED1E195CB5EA}" srcOrd="0" destOrd="0" presId="urn:microsoft.com/office/officeart/2005/8/layout/process4"/>
     <dgm:cxn modelId="{68386563-5FDD-41DE-AA66-CE622EB89F28}" type="presOf" srcId="{6D4CC2A4-8C3E-4232-BAAA-C846CFD70789}" destId="{77D9E306-13CE-4C37-AD2C-DD1F611F8FBC}" srcOrd="0" destOrd="0" presId="urn:microsoft.com/office/officeart/2005/8/layout/process4"/>
+    <dgm:cxn modelId="{61BAFC86-9C1A-45F9-8CB1-FAF858A200D6}" srcId="{12A82211-3711-4407-8B66-5AEA6A68B1F9}" destId="{4D681680-480E-4571-BFCF-BA38706BAD01}" srcOrd="4" destOrd="0" parTransId="{0C01CB92-EC24-4FC6-ACE1-9119BF86C097}" sibTransId="{D9355720-5703-41BD-8C25-730290DBC425}"/>
+    <dgm:cxn modelId="{52CE1171-FCFE-4A57-B36D-CBBB241F015A}" srcId="{12A82211-3711-4407-8B66-5AEA6A68B1F9}" destId="{51CF406E-693A-4DEB-B54C-7A0244E6D397}" srcOrd="6" destOrd="0" parTransId="{520D11A1-65C9-42B7-9317-823AAF5D3C9A}" sibTransId="{62FE5C92-4562-40C6-8BBA-043F4D299777}"/>
     <dgm:cxn modelId="{7B59D377-41D6-4F08-8465-9F2C3D87FFD5}" type="presOf" srcId="{4D681680-480E-4571-BFCF-BA38706BAD01}" destId="{9D8C338C-C1CE-47E3-83E6-D49A1CC2DEE4}" srcOrd="0" destOrd="0" presId="urn:microsoft.com/office/officeart/2005/8/layout/process4"/>
+    <dgm:cxn modelId="{555B2AAE-E1DC-4ACA-BFF8-7FFA9C9584ED}" srcId="{12A82211-3711-4407-8B66-5AEA6A68B1F9}" destId="{0F7CC523-CFFB-490F-BDB2-3653BE2B30BB}" srcOrd="2" destOrd="0" parTransId="{2547006F-2F67-4C07-AB7B-A8C94F70A8E9}" sibTransId="{793909DF-CA73-4FD0-9B88-4924CC9A23DF}"/>
+    <dgm:cxn modelId="{50D41EA5-CE80-4F0B-8631-34ECA74619AC}" type="presOf" srcId="{DCC32DCF-4434-4A45-A8B8-E680929BC4A7}" destId="{FC55B6BC-794E-4119-A25C-2D7BBDAA7EFA}" srcOrd="0" destOrd="0" presId="urn:microsoft.com/office/officeart/2005/8/layout/process4"/>
+    <dgm:cxn modelId="{1F9C68C2-A55D-48A2-9A59-9FFAB5DFF33C}" type="presOf" srcId="{7EDDF34F-5222-415B-959D-70E702701ABF}" destId="{0DD11015-9266-4A79-8DCA-6781A4155265}" srcOrd="0" destOrd="0" presId="urn:microsoft.com/office/officeart/2005/8/layout/process4"/>
+    <dgm:cxn modelId="{2CA333E4-FAF0-49E3-A7FE-E26502EDB555}" srcId="{12A82211-3711-4407-8B66-5AEA6A68B1F9}" destId="{7EDDF34F-5222-415B-959D-70E702701ABF}" srcOrd="5" destOrd="0" parTransId="{CA29004D-9CA1-46C1-A5D0-211F5D5CF93A}" sibTransId="{9CF404DD-85F8-4CB2-8CA0-801C1147F535}"/>
+    <dgm:cxn modelId="{3C644423-3A37-4281-9B12-49E5A8F0882C}" type="presOf" srcId="{51CF406E-693A-4DEB-B54C-7A0244E6D397}" destId="{2FBEFD42-549E-4C3E-B51E-4C707A1BEE80}" srcOrd="0" destOrd="0" presId="urn:microsoft.com/office/officeart/2005/8/layout/process4"/>
+    <dgm:cxn modelId="{24D7E046-683B-4BD8-9C88-4D442D1D789B}" srcId="{12A82211-3711-4407-8B66-5AEA6A68B1F9}" destId="{DCC32DCF-4434-4A45-A8B8-E680929BC4A7}" srcOrd="1" destOrd="0" parTransId="{E7818577-03D6-4881-95C5-30BE6C452B0C}" sibTransId="{11B1747B-6278-440F-98FE-B95D4969045F}"/>
     <dgm:cxn modelId="{0E8A83F2-4766-4213-AF4E-A79BB9D0BC88}" srcId="{12A82211-3711-4407-8B66-5AEA6A68B1F9}" destId="{971DF4AF-31C1-4228-B6A5-CB107BC7BB68}" srcOrd="3" destOrd="0" parTransId="{31D001FB-5184-4FF1-B0A6-E3F1CB33ED3E}" sibTransId="{0166271B-B5EE-4EBE-95A8-B48FD7ED199E}"/>
-    <dgm:cxn modelId="{52CE1171-FCFE-4A57-B36D-CBBB241F015A}" srcId="{12A82211-3711-4407-8B66-5AEA6A68B1F9}" destId="{51CF406E-693A-4DEB-B54C-7A0244E6D397}" srcOrd="6" destOrd="0" parTransId="{520D11A1-65C9-42B7-9317-823AAF5D3C9A}" sibTransId="{62FE5C92-4562-40C6-8BBA-043F4D299777}"/>
-    <dgm:cxn modelId="{24D7E046-683B-4BD8-9C88-4D442D1D789B}" srcId="{12A82211-3711-4407-8B66-5AEA6A68B1F9}" destId="{DCC32DCF-4434-4A45-A8B8-E680929BC4A7}" srcOrd="1" destOrd="0" parTransId="{E7818577-03D6-4881-95C5-30BE6C452B0C}" sibTransId="{11B1747B-6278-440F-98FE-B95D4969045F}"/>
-    <dgm:cxn modelId="{50D41EA5-CE80-4F0B-8631-34ECA74619AC}" type="presOf" srcId="{DCC32DCF-4434-4A45-A8B8-E680929BC4A7}" destId="{FC55B6BC-794E-4119-A25C-2D7BBDAA7EFA}" srcOrd="0" destOrd="0" presId="urn:microsoft.com/office/officeart/2005/8/layout/process4"/>
-    <dgm:cxn modelId="{5A1F0F94-9758-4EB9-BAAA-57E71F9B7E65}" type="presOf" srcId="{12A82211-3711-4407-8B66-5AEA6A68B1F9}" destId="{2E570F46-AFC9-44A1-B7D7-C636F004319C}" srcOrd="0" destOrd="0" presId="urn:microsoft.com/office/officeart/2005/8/layout/process4"/>
     <dgm:cxn modelId="{11366128-F2DB-45E0-91D4-80B9545315F9}" srcId="{12A82211-3711-4407-8B66-5AEA6A68B1F9}" destId="{6D4CC2A4-8C3E-4232-BAAA-C846CFD70789}" srcOrd="0" destOrd="0" parTransId="{0E5C81BA-363C-408C-87DB-E93281EFAEAE}" sibTransId="{8F71E21C-F895-44C3-ADF7-5BD4F6CFA20C}"/>
-    <dgm:cxn modelId="{1F9C68C2-A55D-48A2-9A59-9FFAB5DFF33C}" type="presOf" srcId="{7EDDF34F-5222-415B-959D-70E702701ABF}" destId="{0DD11015-9266-4A79-8DCA-6781A4155265}" srcOrd="0" destOrd="0" presId="urn:microsoft.com/office/officeart/2005/8/layout/process4"/>
-    <dgm:cxn modelId="{E96AA9B1-5D65-4FFB-9A15-07B47713134E}" type="presOf" srcId="{971DF4AF-31C1-4228-B6A5-CB107BC7BB68}" destId="{A8084B6D-C45E-4B2E-AF58-EE43A1CCDC46}" srcOrd="0" destOrd="0" presId="urn:microsoft.com/office/officeart/2005/8/layout/process4"/>
-    <dgm:cxn modelId="{61BAFC86-9C1A-45F9-8CB1-FAF858A200D6}" srcId="{12A82211-3711-4407-8B66-5AEA6A68B1F9}" destId="{4D681680-480E-4571-BFCF-BA38706BAD01}" srcOrd="4" destOrd="0" parTransId="{0C01CB92-EC24-4FC6-ACE1-9119BF86C097}" sibTransId="{D9355720-5703-41BD-8C25-730290DBC425}"/>
-    <dgm:cxn modelId="{2CA333E4-FAF0-49E3-A7FE-E26502EDB555}" srcId="{12A82211-3711-4407-8B66-5AEA6A68B1F9}" destId="{7EDDF34F-5222-415B-959D-70E702701ABF}" srcOrd="5" destOrd="0" parTransId="{CA29004D-9CA1-46C1-A5D0-211F5D5CF93A}" sibTransId="{9CF404DD-85F8-4CB2-8CA0-801C1147F535}"/>
-    <dgm:cxn modelId="{555B2AAE-E1DC-4ACA-BFF8-7FFA9C9584ED}" srcId="{12A82211-3711-4407-8B66-5AEA6A68B1F9}" destId="{0F7CC523-CFFB-490F-BDB2-3653BE2B30BB}" srcOrd="2" destOrd="0" parTransId="{2547006F-2F67-4C07-AB7B-A8C94F70A8E9}" sibTransId="{793909DF-CA73-4FD0-9B88-4924CC9A23DF}"/>
-    <dgm:cxn modelId="{3C644423-3A37-4281-9B12-49E5A8F0882C}" type="presOf" srcId="{51CF406E-693A-4DEB-B54C-7A0244E6D397}" destId="{2FBEFD42-549E-4C3E-B51E-4C707A1BEE80}" srcOrd="0" destOrd="0" presId="urn:microsoft.com/office/officeart/2005/8/layout/process4"/>
     <dgm:cxn modelId="{EEDE786D-5C55-4E0C-B17B-92D9217D5057}" type="presParOf" srcId="{2E570F46-AFC9-44A1-B7D7-C636F004319C}" destId="{79A6DD49-6E5F-4CA2-9326-B6CDFC3DDA11}" srcOrd="0" destOrd="0" presId="urn:microsoft.com/office/officeart/2005/8/layout/process4"/>
     <dgm:cxn modelId="{1A6A2AC9-9FFC-405D-896F-707A3B5C7A64}" type="presParOf" srcId="{79A6DD49-6E5F-4CA2-9326-B6CDFC3DDA11}" destId="{2FBEFD42-549E-4C3E-B51E-4C707A1BEE80}" srcOrd="0" destOrd="0" presId="urn:microsoft.com/office/officeart/2005/8/layout/process4"/>
     <dgm:cxn modelId="{5D25E194-A8C6-42E6-A098-9772098C0B53}" type="presParOf" srcId="{2E570F46-AFC9-44A1-B7D7-C636F004319C}" destId="{EF57ED17-7178-4A71-84A9-0449EDD0B29D}" srcOrd="1" destOrd="0" presId="urn:microsoft.com/office/officeart/2005/8/layout/process4"/>
@@ -5509,7 +5560,8 @@
           <a:p>
             <a:fld id="{25F218F2-CF5D-482A-BA19-2B73616E972F}" type="datetimeFigureOut">
               <a:rPr lang="es-AR" smtClean="0"/>
-              <a:t>23/06/2012</a:t>
+              <a:pPr/>
+              <a:t>24/06/2012</a:t>
             </a:fld>
             <a:endParaRPr lang="es-AR"/>
           </a:p>
@@ -5571,6 +5623,7 @@
           <a:p>
             <a:fld id="{5EA7F4DF-F119-495F-8C6F-AD0C6942A472}" type="slidenum">
               <a:rPr lang="es-AR" smtClean="0"/>
+              <a:pPr/>
               <a:t>‹#›</a:t>
             </a:fld>
             <a:endParaRPr lang="es-AR"/>
@@ -5705,7 +5758,8 @@
           <a:p>
             <a:fld id="{25F218F2-CF5D-482A-BA19-2B73616E972F}" type="datetimeFigureOut">
               <a:rPr lang="es-AR" smtClean="0"/>
-              <a:t>23/06/2012</a:t>
+              <a:pPr/>
+              <a:t>24/06/2012</a:t>
             </a:fld>
             <a:endParaRPr lang="es-AR"/>
           </a:p>
@@ -5751,6 +5805,7 @@
           <a:p>
             <a:fld id="{5EA7F4DF-F119-495F-8C6F-AD0C6942A472}" type="slidenum">
               <a:rPr lang="es-AR" smtClean="0"/>
+              <a:pPr/>
               <a:t>‹#›</a:t>
             </a:fld>
             <a:endParaRPr lang="es-AR"/>
@@ -5890,7 +5945,8 @@
           <a:p>
             <a:fld id="{25F218F2-CF5D-482A-BA19-2B73616E972F}" type="datetimeFigureOut">
               <a:rPr lang="es-AR" smtClean="0"/>
-              <a:t>23/06/2012</a:t>
+              <a:pPr/>
+              <a:t>24/06/2012</a:t>
             </a:fld>
             <a:endParaRPr lang="es-AR"/>
           </a:p>
@@ -5936,6 +5992,7 @@
           <a:p>
             <a:fld id="{5EA7F4DF-F119-495F-8C6F-AD0C6942A472}" type="slidenum">
               <a:rPr lang="es-AR" smtClean="0"/>
+              <a:pPr/>
               <a:t>‹#›</a:t>
             </a:fld>
             <a:endParaRPr lang="es-AR"/>
@@ -6040,7 +6097,8 @@
           <a:p>
             <a:fld id="{25F218F2-CF5D-482A-BA19-2B73616E972F}" type="datetimeFigureOut">
               <a:rPr lang="es-AR" smtClean="0"/>
-              <a:t>23/06/2012</a:t>
+              <a:pPr/>
+              <a:t>24/06/2012</a:t>
             </a:fld>
             <a:endParaRPr lang="es-AR"/>
           </a:p>
@@ -6086,6 +6144,7 @@
           <a:p>
             <a:fld id="{5EA7F4DF-F119-495F-8C6F-AD0C6942A472}" type="slidenum">
               <a:rPr lang="es-AR" smtClean="0"/>
+              <a:pPr/>
               <a:t>‹#›</a:t>
             </a:fld>
             <a:endParaRPr lang="es-AR"/>
@@ -6295,7 +6354,8 @@
           <a:p>
             <a:fld id="{25F218F2-CF5D-482A-BA19-2B73616E972F}" type="datetimeFigureOut">
               <a:rPr lang="es-AR" smtClean="0"/>
-              <a:t>23/06/2012</a:t>
+              <a:pPr/>
+              <a:t>24/06/2012</a:t>
             </a:fld>
             <a:endParaRPr lang="es-AR"/>
           </a:p>
@@ -6341,6 +6401,7 @@
           <a:p>
             <a:fld id="{5EA7F4DF-F119-495F-8C6F-AD0C6942A472}" type="slidenum">
               <a:rPr lang="es-AR" smtClean="0"/>
+              <a:pPr/>
               <a:t>‹#›</a:t>
             </a:fld>
             <a:endParaRPr lang="es-AR"/>
@@ -6704,7 +6765,8 @@
           <a:p>
             <a:fld id="{25F218F2-CF5D-482A-BA19-2B73616E972F}" type="datetimeFigureOut">
               <a:rPr lang="es-AR" smtClean="0"/>
-              <a:t>23/06/2012</a:t>
+              <a:pPr/>
+              <a:t>24/06/2012</a:t>
             </a:fld>
             <a:endParaRPr lang="es-AR"/>
           </a:p>
@@ -6750,6 +6812,7 @@
           <a:p>
             <a:fld id="{5EA7F4DF-F119-495F-8C6F-AD0C6942A472}" type="slidenum">
               <a:rPr lang="es-AR" smtClean="0"/>
+              <a:pPr/>
               <a:t>‹#›</a:t>
             </a:fld>
             <a:endParaRPr lang="es-AR"/>
@@ -7150,7 +7213,8 @@
           <a:p>
             <a:fld id="{25F218F2-CF5D-482A-BA19-2B73616E972F}" type="datetimeFigureOut">
               <a:rPr lang="es-AR" smtClean="0"/>
-              <a:t>23/06/2012</a:t>
+              <a:pPr/>
+              <a:t>24/06/2012</a:t>
             </a:fld>
             <a:endParaRPr lang="es-AR"/>
           </a:p>
@@ -7196,6 +7260,7 @@
           <a:p>
             <a:fld id="{5EA7F4DF-F119-495F-8C6F-AD0C6942A472}" type="slidenum">
               <a:rPr lang="es-AR" smtClean="0"/>
+              <a:pPr/>
               <a:t>‹#›</a:t>
             </a:fld>
             <a:endParaRPr lang="es-AR"/>
@@ -7251,7 +7316,8 @@
           <a:p>
             <a:fld id="{25F218F2-CF5D-482A-BA19-2B73616E972F}" type="datetimeFigureOut">
               <a:rPr lang="es-AR" smtClean="0"/>
-              <a:t>23/06/2012</a:t>
+              <a:pPr/>
+              <a:t>24/06/2012</a:t>
             </a:fld>
             <a:endParaRPr lang="es-AR"/>
           </a:p>
@@ -7297,6 +7363,7 @@
           <a:p>
             <a:fld id="{5EA7F4DF-F119-495F-8C6F-AD0C6942A472}" type="slidenum">
               <a:rPr lang="es-AR" smtClean="0"/>
+              <a:pPr/>
               <a:t>‹#›</a:t>
             </a:fld>
             <a:endParaRPr lang="es-AR"/>
@@ -7372,7 +7439,8 @@
           <a:p>
             <a:fld id="{25F218F2-CF5D-482A-BA19-2B73616E972F}" type="datetimeFigureOut">
               <a:rPr lang="es-AR" smtClean="0"/>
-              <a:t>23/06/2012</a:t>
+              <a:pPr/>
+              <a:t>24/06/2012</a:t>
             </a:fld>
             <a:endParaRPr lang="es-AR"/>
           </a:p>
@@ -7418,6 +7486,7 @@
           <a:p>
             <a:fld id="{5EA7F4DF-F119-495F-8C6F-AD0C6942A472}" type="slidenum">
               <a:rPr lang="es-AR" smtClean="0"/>
+              <a:pPr/>
               <a:t>‹#›</a:t>
             </a:fld>
             <a:endParaRPr lang="es-AR"/>
@@ -7646,7 +7715,8 @@
           <a:p>
             <a:fld id="{25F218F2-CF5D-482A-BA19-2B73616E972F}" type="datetimeFigureOut">
               <a:rPr lang="es-AR" smtClean="0"/>
-              <a:t>23/06/2012</a:t>
+              <a:pPr/>
+              <a:t>24/06/2012</a:t>
             </a:fld>
             <a:endParaRPr lang="es-AR"/>
           </a:p>
@@ -7692,6 +7762,7 @@
           <a:p>
             <a:fld id="{5EA7F4DF-F119-495F-8C6F-AD0C6942A472}" type="slidenum">
               <a:rPr lang="es-AR" smtClean="0"/>
+              <a:pPr/>
               <a:t>‹#›</a:t>
             </a:fld>
             <a:endParaRPr lang="es-AR"/>
@@ -7851,7 +7922,8 @@
           <a:p>
             <a:fld id="{25F218F2-CF5D-482A-BA19-2B73616E972F}" type="datetimeFigureOut">
               <a:rPr lang="es-AR" smtClean="0"/>
-              <a:t>23/06/2012</a:t>
+              <a:pPr/>
+              <a:t>24/06/2012</a:t>
             </a:fld>
             <a:endParaRPr lang="es-AR"/>
           </a:p>
@@ -7916,6 +7988,7 @@
           <a:p>
             <a:fld id="{5EA7F4DF-F119-495F-8C6F-AD0C6942A472}" type="slidenum">
               <a:rPr lang="es-AR" smtClean="0"/>
+              <a:pPr/>
               <a:t>‹#›</a:t>
             </a:fld>
             <a:endParaRPr lang="es-AR"/>
@@ -8960,7 +9033,8 @@
           <a:p>
             <a:fld id="{25F218F2-CF5D-482A-BA19-2B73616E972F}" type="datetimeFigureOut">
               <a:rPr lang="es-AR" smtClean="0"/>
-              <a:t>23/06/2012</a:t>
+              <a:pPr/>
+              <a:t>24/06/2012</a:t>
             </a:fld>
             <a:endParaRPr lang="es-AR"/>
           </a:p>
@@ -9036,6 +9110,7 @@
           <a:p>
             <a:fld id="{5EA7F4DF-F119-495F-8C6F-AD0C6942A472}" type="slidenum">
               <a:rPr lang="es-AR" smtClean="0"/>
+              <a:pPr/>
               <a:t>‹#›</a:t>
             </a:fld>
             <a:endParaRPr lang="es-AR"/>
@@ -9474,6 +9549,96 @@
           <a:p>
             <a:r>
               <a:rPr lang="es-AR" dirty="0" smtClean="0"/>
+              <a:t>La imagen puede ser limpiada tanto como uno desee, pero el tamaño es un problema mayor.</a:t>
+            </a:r>
+          </a:p>
+          <a:p>
+            <a:endParaRPr lang="es-AR" dirty="0" smtClean="0"/>
+          </a:p>
+          <a:p>
+            <a:r>
+              <a:rPr lang="es-AR" dirty="0" smtClean="0"/>
+              <a:t>Esta etapa consiste en rotar, trasladar y redimensionar el caracter en cuestion.</a:t>
+            </a:r>
+          </a:p>
+          <a:p>
+            <a:endParaRPr lang="es-AR" dirty="0"/>
+          </a:p>
+        </p:txBody>
+      </p:sp>
+      <p:sp>
+        <p:nvSpPr>
+          <p:cNvPr id="3" name="Title 2"/>
+          <p:cNvSpPr>
+            <a:spLocks noGrp="1"/>
+          </p:cNvSpPr>
+          <p:nvPr>
+            <p:ph type="title"/>
+          </p:nvPr>
+        </p:nvSpPr>
+        <p:spPr/>
+        <p:txBody>
+          <a:bodyPr/>
+          <a:lstStyle/>
+          <a:p>
+            <a:pPr algn="ctr"/>
+            <a:r>
+              <a:rPr lang="es-AR" dirty="0" smtClean="0"/>
+              <a:t>Normalization</a:t>
+            </a:r>
+            <a:endParaRPr lang="es-AR" dirty="0"/>
+          </a:p>
+        </p:txBody>
+      </p:sp>
+    </p:spTree>
+  </p:cSld>
+  <p:clrMapOvr>
+    <a:masterClrMapping/>
+  </p:clrMapOvr>
+  <p:timing>
+    <p:tnLst>
+      <p:par>
+        <p:cTn id="1" dur="indefinite" restart="never" nodeType="tmRoot"/>
+      </p:par>
+    </p:tnLst>
+  </p:timing>
+</p:sld>
+</file>
+
+<file path=ppt/slides/slide11.xml><?xml version="1.0" encoding="utf-8"?>
+<p:sld xmlns:a="http://schemas.openxmlformats.org/drawingml/2006/main" xmlns:r="http://schemas.openxmlformats.org/officeDocument/2006/relationships" xmlns:p="http://schemas.openxmlformats.org/presentationml/2006/main">
+  <p:cSld>
+    <p:spTree>
+      <p:nvGrpSpPr>
+        <p:cNvPr id="1" name=""/>
+        <p:cNvGrpSpPr/>
+        <p:nvPr/>
+      </p:nvGrpSpPr>
+      <p:grpSpPr>
+        <a:xfrm>
+          <a:off x="0" y="0"/>
+          <a:ext cx="0" cy="0"/>
+          <a:chOff x="0" y="0"/>
+          <a:chExt cx="0" cy="0"/>
+        </a:xfrm>
+      </p:grpSpPr>
+      <p:sp>
+        <p:nvSpPr>
+          <p:cNvPr id="2" name="Content Placeholder 1"/>
+          <p:cNvSpPr>
+            <a:spLocks noGrp="1"/>
+          </p:cNvSpPr>
+          <p:nvPr>
+            <p:ph idx="1"/>
+          </p:nvPr>
+        </p:nvSpPr>
+        <p:spPr/>
+        <p:txBody>
+          <a:bodyPr/>
+          <a:lstStyle/>
+          <a:p>
+            <a:r>
+              <a:rPr lang="es-AR" dirty="0" smtClean="0"/>
               <a:t>Tiene en consideración las fórmulas:</a:t>
             </a:r>
           </a:p>
@@ -9601,93 +9766,6 @@
 </p:sld>
 </file>
 
-<file path=ppt/slides/slide11.xml><?xml version="1.0" encoding="utf-8"?>
-<p:sld xmlns:a="http://schemas.openxmlformats.org/drawingml/2006/main" xmlns:r="http://schemas.openxmlformats.org/officeDocument/2006/relationships" xmlns:p="http://schemas.openxmlformats.org/presentationml/2006/main">
-  <p:cSld>
-    <p:spTree>
-      <p:nvGrpSpPr>
-        <p:cNvPr id="1" name=""/>
-        <p:cNvGrpSpPr/>
-        <p:nvPr/>
-      </p:nvGrpSpPr>
-      <p:grpSpPr>
-        <a:xfrm>
-          <a:off x="0" y="0"/>
-          <a:ext cx="0" cy="0"/>
-          <a:chOff x="0" y="0"/>
-          <a:chExt cx="0" cy="0"/>
-        </a:xfrm>
-      </p:grpSpPr>
-      <p:sp>
-        <p:nvSpPr>
-          <p:cNvPr id="2" name="Content Placeholder 1"/>
-          <p:cNvSpPr>
-            <a:spLocks noGrp="1"/>
-          </p:cNvSpPr>
-          <p:nvPr>
-            <p:ph idx="1"/>
-          </p:nvPr>
-        </p:nvSpPr>
-        <p:spPr/>
-        <p:txBody>
-          <a:bodyPr/>
-          <a:lstStyle/>
-          <a:p>
-            <a:r>
-              <a:rPr lang="es-AR" dirty="0" smtClean="0"/>
-              <a:t>El valor de rotacion del ángulo esta dado de acuerdo a los angulos principales de la imagen.</a:t>
-            </a:r>
-          </a:p>
-          <a:p>
-            <a:endParaRPr lang="es-AR" dirty="0" smtClean="0"/>
-          </a:p>
-          <a:p>
-            <a:r>
-              <a:rPr lang="es-AR" dirty="0" smtClean="0"/>
-              <a:t>El valor de la escala es calculado a partir de el valor medio de la variacion del caracter.</a:t>
-            </a:r>
-          </a:p>
-        </p:txBody>
-      </p:sp>
-      <p:sp>
-        <p:nvSpPr>
-          <p:cNvPr id="3" name="Title 2"/>
-          <p:cNvSpPr>
-            <a:spLocks noGrp="1"/>
-          </p:cNvSpPr>
-          <p:nvPr>
-            <p:ph type="title"/>
-          </p:nvPr>
-        </p:nvSpPr>
-        <p:spPr/>
-        <p:txBody>
-          <a:bodyPr/>
-          <a:lstStyle/>
-          <a:p>
-            <a:pPr algn="ctr"/>
-            <a:r>
-              <a:rPr lang="es-AR" dirty="0" smtClean="0"/>
-              <a:t>Normalization – Como?</a:t>
-            </a:r>
-            <a:endParaRPr lang="es-AR" dirty="0"/>
-          </a:p>
-        </p:txBody>
-      </p:sp>
-    </p:spTree>
-  </p:cSld>
-  <p:clrMapOvr>
-    <a:masterClrMapping/>
-  </p:clrMapOvr>
-  <p:timing>
-    <p:tnLst>
-      <p:par>
-        <p:cTn id="1" dur="indefinite" restart="never" nodeType="tmRoot"/>
-      </p:par>
-    </p:tnLst>
-  </p:timing>
-</p:sld>
-</file>
-
 <file path=ppt/slides/slide12.xml><?xml version="1.0" encoding="utf-8"?>
 <p:sld xmlns:a="http://schemas.openxmlformats.org/drawingml/2006/main" xmlns:r="http://schemas.openxmlformats.org/officeDocument/2006/relationships" xmlns:p="http://schemas.openxmlformats.org/presentationml/2006/main">
   <p:cSld>
@@ -9715,6 +9793,93 @@
             <p:ph idx="1"/>
           </p:nvPr>
         </p:nvSpPr>
+        <p:spPr/>
+        <p:txBody>
+          <a:bodyPr/>
+          <a:lstStyle/>
+          <a:p>
+            <a:r>
+              <a:rPr lang="es-AR" dirty="0" smtClean="0"/>
+              <a:t>El valor de rotacion del ángulo esta dado de acuerdo a los angulos principales de la imagen.</a:t>
+            </a:r>
+          </a:p>
+          <a:p>
+            <a:endParaRPr lang="es-AR" dirty="0" smtClean="0"/>
+          </a:p>
+          <a:p>
+            <a:r>
+              <a:rPr lang="es-AR" dirty="0" smtClean="0"/>
+              <a:t>El valor de la escala es calculado a partir de el valor medio de la variacion del caracter.</a:t>
+            </a:r>
+          </a:p>
+        </p:txBody>
+      </p:sp>
+      <p:sp>
+        <p:nvSpPr>
+          <p:cNvPr id="3" name="Title 2"/>
+          <p:cNvSpPr>
+            <a:spLocks noGrp="1"/>
+          </p:cNvSpPr>
+          <p:nvPr>
+            <p:ph type="title"/>
+          </p:nvPr>
+        </p:nvSpPr>
+        <p:spPr/>
+        <p:txBody>
+          <a:bodyPr/>
+          <a:lstStyle/>
+          <a:p>
+            <a:pPr algn="ctr"/>
+            <a:r>
+              <a:rPr lang="es-AR" dirty="0" smtClean="0"/>
+              <a:t>Normalization – Como?</a:t>
+            </a:r>
+            <a:endParaRPr lang="es-AR" dirty="0"/>
+          </a:p>
+        </p:txBody>
+      </p:sp>
+    </p:spTree>
+  </p:cSld>
+  <p:clrMapOvr>
+    <a:masterClrMapping/>
+  </p:clrMapOvr>
+  <p:timing>
+    <p:tnLst>
+      <p:par>
+        <p:cTn id="1" dur="indefinite" restart="never" nodeType="tmRoot"/>
+      </p:par>
+    </p:tnLst>
+  </p:timing>
+</p:sld>
+</file>
+
+<file path=ppt/slides/slide13.xml><?xml version="1.0" encoding="utf-8"?>
+<p:sld xmlns:a="http://schemas.openxmlformats.org/drawingml/2006/main" xmlns:r="http://schemas.openxmlformats.org/officeDocument/2006/relationships" xmlns:p="http://schemas.openxmlformats.org/presentationml/2006/main">
+  <p:cSld>
+    <p:spTree>
+      <p:nvGrpSpPr>
+        <p:cNvPr id="1" name=""/>
+        <p:cNvGrpSpPr/>
+        <p:nvPr/>
+      </p:nvGrpSpPr>
+      <p:grpSpPr>
+        <a:xfrm>
+          <a:off x="0" y="0"/>
+          <a:ext cx="0" cy="0"/>
+          <a:chOff x="0" y="0"/>
+          <a:chExt cx="0" cy="0"/>
+        </a:xfrm>
+      </p:grpSpPr>
+      <p:sp>
+        <p:nvSpPr>
+          <p:cNvPr id="2" name="Content Placeholder 1"/>
+          <p:cNvSpPr>
+            <a:spLocks noGrp="1"/>
+          </p:cNvSpPr>
+          <p:nvPr>
+            <p:ph idx="1"/>
+          </p:nvPr>
+        </p:nvSpPr>
         <p:spPr>
           <a:xfrm>
             <a:off x="457200" y="1481328"/>
@@ -9729,15 +9894,7 @@
           <a:p>
             <a:r>
               <a:rPr lang="es-AR" dirty="0" smtClean="0"/>
-              <a:t>Transformacion integral que </a:t>
-            </a:r>
-            <a:r>
-              <a:rPr lang="es-AR" dirty="0" smtClean="0"/>
-              <a:t>consiste en la integral de una función sobre un conjunto de </a:t>
-            </a:r>
-            <a:r>
-              <a:rPr lang="es-AR" dirty="0" smtClean="0"/>
-              <a:t>rectas.</a:t>
+              <a:t>Transformacion integral que consiste en la integral de una función sobre un conjunto de rectas.</a:t>
             </a:r>
           </a:p>
           <a:p>
@@ -9773,11 +9930,7 @@
           <a:p>
             <a:r>
               <a:rPr lang="es-AR" i="1" dirty="0" smtClean="0"/>
-              <a:t>d</a:t>
-            </a:r>
-            <a:r>
-              <a:rPr lang="es-AR" i="1" dirty="0" smtClean="0"/>
-              <a:t>elta </a:t>
+              <a:t>delta </a:t>
             </a:r>
             <a:r>
               <a:rPr lang="es-AR" dirty="0" smtClean="0"/>
@@ -9854,7 +10007,7 @@
 </p:sld>
 </file>
 
-<file path=ppt/slides/slide13.xml><?xml version="1.0" encoding="utf-8"?>
+<file path=ppt/slides/slide14.xml><?xml version="1.0" encoding="utf-8"?>
 <p:sld xmlns:a="http://schemas.openxmlformats.org/drawingml/2006/main" xmlns:r="http://schemas.openxmlformats.org/officeDocument/2006/relationships" xmlns:p="http://schemas.openxmlformats.org/presentationml/2006/main">
   <p:cSld>
     <p:spTree>
@@ -9933,7 +10086,7 @@
 </p:sld>
 </file>
 
-<file path=ppt/slides/slide14.xml><?xml version="1.0" encoding="utf-8"?>
+<file path=ppt/slides/slide15.xml><?xml version="1.0" encoding="utf-8"?>
 <p:sld xmlns:a="http://schemas.openxmlformats.org/drawingml/2006/main" xmlns:r="http://schemas.openxmlformats.org/officeDocument/2006/relationships" xmlns:p="http://schemas.openxmlformats.org/presentationml/2006/main">
   <p:cSld>
     <p:spTree>
@@ -9967,11 +10120,7 @@
           <a:p>
             <a:r>
               <a:rPr lang="es-AR" dirty="0" smtClean="0"/>
-              <a:t>Para el caso, los rayos estan espaciados cada 1px</a:t>
-            </a:r>
-            <a:r>
-              <a:rPr lang="es-AR" dirty="0" smtClean="0"/>
-              <a:t>.</a:t>
+              <a:t>Para el caso, los rayos estan espaciados cada 1px.</a:t>
             </a:r>
           </a:p>
           <a:p>
@@ -9983,39 +10132,7 @@
           <a:p>
             <a:r>
               <a:rPr lang="es-AR" dirty="0" smtClean="0"/>
-              <a:t>Se calcula </a:t>
-            </a:r>
-            <a:r>
-              <a:rPr lang="es-AR" dirty="0" smtClean="0"/>
-              <a:t>la proyección de </a:t>
-            </a:r>
-            <a:r>
-              <a:rPr lang="es-AR" dirty="0" smtClean="0"/>
-              <a:t>la </a:t>
-            </a:r>
-            <a:r>
-              <a:rPr lang="es-AR" dirty="0" smtClean="0"/>
-              <a:t>matriz (imagen) a </a:t>
-            </a:r>
-            <a:r>
-              <a:rPr lang="es-AR" dirty="0" smtClean="0"/>
-              <a:t>través </a:t>
-            </a:r>
-            <a:r>
-              <a:rPr lang="es-AR" dirty="0" smtClean="0"/>
-              <a:t>de una </a:t>
-            </a:r>
-            <a:r>
-              <a:rPr lang="es-AR" dirty="0" smtClean="0"/>
-              <a:t>dirección </a:t>
-            </a:r>
-            <a:r>
-              <a:rPr lang="es-AR" dirty="0" smtClean="0"/>
-              <a:t>especificada</a:t>
-            </a:r>
-            <a:r>
-              <a:rPr lang="es-AR" dirty="0" smtClean="0"/>
-              <a:t>.</a:t>
+              <a:t>Se calcula la proyección de la matriz (imagen) a través de una dirección especificada.</a:t>
             </a:r>
           </a:p>
           <a:p>
@@ -10073,7 +10190,7 @@
 </p:sld>
 </file>
 
-<file path=ppt/slides/slide15.xml><?xml version="1.0" encoding="utf-8"?>
+<file path=ppt/slides/slide16.xml><?xml version="1.0" encoding="utf-8"?>
 <p:sld xmlns:a="http://schemas.openxmlformats.org/drawingml/2006/main" xmlns:r="http://schemas.openxmlformats.org/officeDocument/2006/relationships" xmlns:p="http://schemas.openxmlformats.org/presentationml/2006/main">
   <p:cSld>
     <p:spTree>
@@ -10320,127 +10437,6 @@
 </p:sld>
 </file>
 
-<file path=ppt/slides/slide16.xml><?xml version="1.0" encoding="utf-8"?>
-<p:sld xmlns:a="http://schemas.openxmlformats.org/drawingml/2006/main" xmlns:r="http://schemas.openxmlformats.org/officeDocument/2006/relationships" xmlns:p="http://schemas.openxmlformats.org/presentationml/2006/main">
-  <p:cSld>
-    <p:spTree>
-      <p:nvGrpSpPr>
-        <p:cNvPr id="1" name=""/>
-        <p:cNvGrpSpPr/>
-        <p:nvPr/>
-      </p:nvGrpSpPr>
-      <p:grpSpPr>
-        <a:xfrm>
-          <a:off x="0" y="0"/>
-          <a:ext cx="0" cy="0"/>
-          <a:chOff x="0" y="0"/>
-          <a:chExt cx="0" cy="0"/>
-        </a:xfrm>
-      </p:grpSpPr>
-      <p:sp>
-        <p:nvSpPr>
-          <p:cNvPr id="2" name="Content Placeholder 1"/>
-          <p:cNvSpPr>
-            <a:spLocks noGrp="1"/>
-          </p:cNvSpPr>
-          <p:nvPr>
-            <p:ph idx="1"/>
-          </p:nvPr>
-        </p:nvSpPr>
-        <p:spPr/>
-        <p:txBody>
-          <a:bodyPr/>
-          <a:lstStyle/>
-          <a:p>
-            <a:r>
-              <a:rPr lang="es-AR" dirty="0" smtClean="0"/>
-              <a:t>Habilidad para extraer lineas a partir de imágenes </a:t>
-            </a:r>
-            <a:r>
-              <a:rPr lang="es-AR" i="1" dirty="0" smtClean="0"/>
-              <a:t>muy </a:t>
-            </a:r>
-            <a:r>
-              <a:rPr lang="es-AR" dirty="0" smtClean="0"/>
-              <a:t>ruidosas</a:t>
-            </a:r>
-            <a:r>
-              <a:rPr lang="es-AR" i="1" dirty="0" smtClean="0"/>
-              <a:t>.</a:t>
-            </a:r>
-          </a:p>
-          <a:p>
-            <a:pPr lvl="1"/>
-            <a:r>
-              <a:rPr lang="es-AR" dirty="0" smtClean="0"/>
-              <a:t>Caracteres manuscritos podrían considerarse muy ruidosos.</a:t>
-            </a:r>
-          </a:p>
-          <a:p>
-            <a:pPr lvl="1"/>
-            <a:endParaRPr lang="es-AR" dirty="0" smtClean="0"/>
-          </a:p>
-          <a:p>
-            <a:r>
-              <a:rPr lang="es-AR" dirty="0" smtClean="0"/>
-              <a:t>Se puede computar la tranformación </a:t>
-            </a:r>
-            <a:r>
-              <a:rPr lang="es-AR" i="1" dirty="0" smtClean="0"/>
-              <a:t>Radon </a:t>
-            </a:r>
-            <a:r>
-              <a:rPr lang="es-AR" dirty="0" smtClean="0"/>
-              <a:t>de cualquier imagen rotada, trasladad o escalada sabiendo su tranformación </a:t>
-            </a:r>
-            <a:r>
-              <a:rPr lang="es-AR" i="1" dirty="0" smtClean="0"/>
-              <a:t>Radon</a:t>
-            </a:r>
-            <a:r>
-              <a:rPr lang="es-AR" dirty="0" smtClean="0"/>
-              <a:t> original.</a:t>
-            </a:r>
-            <a:endParaRPr lang="es-AR" i="1" dirty="0"/>
-          </a:p>
-        </p:txBody>
-      </p:sp>
-      <p:sp>
-        <p:nvSpPr>
-          <p:cNvPr id="3" name="Title 2"/>
-          <p:cNvSpPr>
-            <a:spLocks noGrp="1"/>
-          </p:cNvSpPr>
-          <p:nvPr>
-            <p:ph type="title"/>
-          </p:nvPr>
-        </p:nvSpPr>
-        <p:spPr/>
-        <p:txBody>
-          <a:bodyPr/>
-          <a:lstStyle/>
-          <a:p>
-            <a:pPr algn="ctr"/>
-            <a:r>
-              <a:rPr lang="es-AR" dirty="0" smtClean="0"/>
-              <a:t>Radon </a:t>
-            </a:r>
-            <a:r>
-              <a:rPr lang="es-AR" dirty="0" smtClean="0"/>
-              <a:t>Transform – Porque?</a:t>
-            </a:r>
-            <a:endParaRPr lang="es-AR" dirty="0"/>
-          </a:p>
-        </p:txBody>
-      </p:sp>
-    </p:spTree>
-  </p:cSld>
-  <p:clrMapOvr>
-    <a:masterClrMapping/>
-  </p:clrMapOvr>
-</p:sld>
-</file>
-
 <file path=ppt/slides/slide17.xml><?xml version="1.0" encoding="utf-8"?>
 <p:sld xmlns:a="http://schemas.openxmlformats.org/drawingml/2006/main" xmlns:r="http://schemas.openxmlformats.org/officeDocument/2006/relationships" xmlns:p="http://schemas.openxmlformats.org/presentationml/2006/main">
   <p:cSld>
@@ -10475,51 +10471,54 @@
           <a:p>
             <a:r>
               <a:rPr lang="es-AR" dirty="0" smtClean="0"/>
-              <a:t>A partir de las proyecciones Radon, se construye un </a:t>
+              <a:t>Habilidad para extraer lineas a partir de imágenes </a:t>
             </a:r>
             <a:r>
               <a:rPr lang="es-AR" i="1" dirty="0" smtClean="0"/>
-              <a:t>senograma</a:t>
-            </a:r>
-          </a:p>
-          <a:p>
-            <a:endParaRPr lang="es-AR" i="1" dirty="0" smtClean="0"/>
-          </a:p>
-          <a:p>
+              <a:t>muy </a:t>
+            </a:r>
             <a:r>
               <a:rPr lang="es-AR" dirty="0" smtClean="0"/>
-              <a:t>Es basicamente un 2D dataset </a:t>
+              <a:t>ruidosas</a:t>
             </a:r>
             <a:r>
               <a:rPr lang="es-AR" i="1" dirty="0" smtClean="0"/>
-              <a:t>p(r, theta)</a:t>
-            </a:r>
+              <a:t>.</a:t>
+            </a:r>
+          </a:p>
+          <a:p>
+            <a:pPr lvl="1"/>
             <a:r>
               <a:rPr lang="es-AR" dirty="0" smtClean="0"/>
-              <a:t> que se obtiene de</a:t>
+              <a:t>Caracteres manuscritos podrían considerarse muy ruidosos.</a:t>
+            </a:r>
+          </a:p>
+          <a:p>
+            <a:pPr lvl="1"/>
+            <a:endParaRPr lang="es-AR" dirty="0" smtClean="0"/>
+          </a:p>
+          <a:p>
+            <a:r>
+              <a:rPr lang="es-AR" dirty="0" smtClean="0"/>
+              <a:t>Se puede computar la tranformación </a:t>
             </a:r>
             <a:r>
               <a:rPr lang="es-AR" i="1" dirty="0" smtClean="0"/>
-              <a:t>apilar</a:t>
+              <a:t>Radon </a:t>
             </a:r>
             <a:r>
               <a:rPr lang="es-AR" dirty="0" smtClean="0"/>
-              <a:t> las proyecciones 1D </a:t>
+              <a:t>de cualquier imagen rotada, trasladad o escalada sabiendo su tranformación </a:t>
             </a:r>
             <a:r>
               <a:rPr lang="es-AR" i="1" dirty="0" smtClean="0"/>
-              <a:t>p(r)</a:t>
+              <a:t>Radon</a:t>
             </a:r>
             <a:r>
               <a:rPr lang="es-AR" dirty="0" smtClean="0"/>
-              <a:t>.</a:t>
-            </a:r>
-          </a:p>
-          <a:p>
-            <a:pPr lvl="1">
-              <a:buNone/>
-            </a:pPr>
-            <a:endParaRPr lang="es-AR" dirty="0" smtClean="0"/>
+              <a:t> original.</a:t>
+            </a:r>
+            <a:endParaRPr lang="es-AR" i="1" dirty="0"/>
           </a:p>
         </p:txBody>
       </p:sp>
@@ -10541,7 +10540,7 @@
             <a:pPr algn="ctr"/>
             <a:r>
               <a:rPr lang="es-AR" dirty="0" smtClean="0"/>
-              <a:t>Accumulator</a:t>
+              <a:t>Radon Transform – Porque?</a:t>
             </a:r>
             <a:endParaRPr lang="es-AR" dirty="0"/>
           </a:p>
@@ -10556,6 +10555,120 @@
 </file>
 
 <file path=ppt/slides/slide18.xml><?xml version="1.0" encoding="utf-8"?>
+<p:sld xmlns:a="http://schemas.openxmlformats.org/drawingml/2006/main" xmlns:r="http://schemas.openxmlformats.org/officeDocument/2006/relationships" xmlns:p="http://schemas.openxmlformats.org/presentationml/2006/main">
+  <p:cSld>
+    <p:spTree>
+      <p:nvGrpSpPr>
+        <p:cNvPr id="1" name=""/>
+        <p:cNvGrpSpPr/>
+        <p:nvPr/>
+      </p:nvGrpSpPr>
+      <p:grpSpPr>
+        <a:xfrm>
+          <a:off x="0" y="0"/>
+          <a:ext cx="0" cy="0"/>
+          <a:chOff x="0" y="0"/>
+          <a:chExt cx="0" cy="0"/>
+        </a:xfrm>
+      </p:grpSpPr>
+      <p:sp>
+        <p:nvSpPr>
+          <p:cNvPr id="2" name="Content Placeholder 1"/>
+          <p:cNvSpPr>
+            <a:spLocks noGrp="1"/>
+          </p:cNvSpPr>
+          <p:nvPr>
+            <p:ph idx="1"/>
+          </p:nvPr>
+        </p:nvSpPr>
+        <p:spPr/>
+        <p:txBody>
+          <a:bodyPr/>
+          <a:lstStyle/>
+          <a:p>
+            <a:r>
+              <a:rPr lang="es-AR" dirty="0" smtClean="0"/>
+              <a:t>A partir de las proyecciones Radon, se construye un </a:t>
+            </a:r>
+            <a:r>
+              <a:rPr lang="es-AR" i="1" dirty="0" smtClean="0"/>
+              <a:t>senograma</a:t>
+            </a:r>
+          </a:p>
+          <a:p>
+            <a:endParaRPr lang="es-AR" i="1" dirty="0" smtClean="0"/>
+          </a:p>
+          <a:p>
+            <a:r>
+              <a:rPr lang="es-AR" dirty="0" smtClean="0"/>
+              <a:t>Es basicamente un 2D dataset </a:t>
+            </a:r>
+            <a:r>
+              <a:rPr lang="es-AR" i="1" dirty="0" smtClean="0"/>
+              <a:t>p(r, theta)</a:t>
+            </a:r>
+            <a:r>
+              <a:rPr lang="es-AR" dirty="0" smtClean="0"/>
+              <a:t> que se obtiene de</a:t>
+            </a:r>
+            <a:r>
+              <a:rPr lang="es-AR" i="1" dirty="0" smtClean="0"/>
+              <a:t>apilar</a:t>
+            </a:r>
+            <a:r>
+              <a:rPr lang="es-AR" dirty="0" smtClean="0"/>
+              <a:t> las proyecciones 1D </a:t>
+            </a:r>
+            <a:r>
+              <a:rPr lang="es-AR" i="1" dirty="0" smtClean="0"/>
+              <a:t>p(r)</a:t>
+            </a:r>
+            <a:r>
+              <a:rPr lang="es-AR" dirty="0" smtClean="0"/>
+              <a:t>.</a:t>
+            </a:r>
+          </a:p>
+          <a:p>
+            <a:pPr lvl="1">
+              <a:buNone/>
+            </a:pPr>
+            <a:endParaRPr lang="es-AR" dirty="0" smtClean="0"/>
+          </a:p>
+        </p:txBody>
+      </p:sp>
+      <p:sp>
+        <p:nvSpPr>
+          <p:cNvPr id="3" name="Title 2"/>
+          <p:cNvSpPr>
+            <a:spLocks noGrp="1"/>
+          </p:cNvSpPr>
+          <p:nvPr>
+            <p:ph type="title"/>
+          </p:nvPr>
+        </p:nvSpPr>
+        <p:spPr/>
+        <p:txBody>
+          <a:bodyPr/>
+          <a:lstStyle/>
+          <a:p>
+            <a:pPr algn="ctr"/>
+            <a:r>
+              <a:rPr lang="es-AR" dirty="0" smtClean="0"/>
+              <a:t>Accumulator</a:t>
+            </a:r>
+            <a:endParaRPr lang="es-AR" dirty="0"/>
+          </a:p>
+        </p:txBody>
+      </p:sp>
+    </p:spTree>
+  </p:cSld>
+  <p:clrMapOvr>
+    <a:masterClrMapping/>
+  </p:clrMapOvr>
+</p:sld>
+</file>
+
+<file path=ppt/slides/slide19.xml><?xml version="1.0" encoding="utf-8"?>
 <p:sld xmlns:a="http://schemas.openxmlformats.org/drawingml/2006/main" xmlns:r="http://schemas.openxmlformats.org/officeDocument/2006/relationships" xmlns:p="http://schemas.openxmlformats.org/presentationml/2006/main">
   <p:cSld>
     <p:spTree>
@@ -10697,7 +10810,78 @@
 </p:sld>
 </file>
 
-<file path=ppt/slides/slide19.xml><?xml version="1.0" encoding="utf-8"?>
+<file path=ppt/slides/slide2.xml><?xml version="1.0" encoding="utf-8"?>
+<p:sld xmlns:a="http://schemas.openxmlformats.org/drawingml/2006/main" xmlns:r="http://schemas.openxmlformats.org/officeDocument/2006/relationships" xmlns:p="http://schemas.openxmlformats.org/presentationml/2006/main">
+  <p:cSld>
+    <p:spTree>
+      <p:nvGrpSpPr>
+        <p:cNvPr id="1" name=""/>
+        <p:cNvGrpSpPr/>
+        <p:nvPr/>
+      </p:nvGrpSpPr>
+      <p:grpSpPr>
+        <a:xfrm>
+          <a:off x="0" y="0"/>
+          <a:ext cx="0" cy="0"/>
+          <a:chOff x="0" y="0"/>
+          <a:chExt cx="0" cy="0"/>
+        </a:xfrm>
+      </p:grpSpPr>
+      <p:sp>
+        <p:nvSpPr>
+          <p:cNvPr id="4" name="Title 3"/>
+          <p:cNvSpPr>
+            <a:spLocks noGrp="1"/>
+          </p:cNvSpPr>
+          <p:nvPr>
+            <p:ph type="ctrTitle"/>
+          </p:nvPr>
+        </p:nvSpPr>
+        <p:spPr/>
+        <p:txBody>
+          <a:bodyPr>
+            <a:normAutofit fontScale="90000"/>
+          </a:bodyPr>
+          <a:lstStyle/>
+          <a:p>
+            <a:r>
+              <a:rPr lang="es-AR" dirty="0" smtClean="0">
+                <a:effectLst/>
+              </a:rPr>
+              <a:t>Reconocimiento de caracteres mediante técnica de transformación de radon y anális de componentes principales</a:t>
+            </a:r>
+            <a:endParaRPr lang="es-AR" dirty="0"/>
+          </a:p>
+        </p:txBody>
+      </p:sp>
+      <p:sp>
+        <p:nvSpPr>
+          <p:cNvPr id="5" name="Subtitle 4"/>
+          <p:cNvSpPr>
+            <a:spLocks noGrp="1"/>
+          </p:cNvSpPr>
+          <p:nvPr>
+            <p:ph type="subTitle" idx="1"/>
+          </p:nvPr>
+        </p:nvSpPr>
+        <p:spPr/>
+        <p:txBody>
+          <a:bodyPr/>
+          <a:lstStyle/>
+          <a:p>
+            <a:endParaRPr lang="es-AR"/>
+          </a:p>
+        </p:txBody>
+      </p:sp>
+    </p:spTree>
+  </p:cSld>
+  <p:clrMapOvr>
+    <a:masterClrMapping/>
+  </p:clrMapOvr>
+</p:sld>
+</file>
+
+<file path=ppt/slides/slide20.xml><?xml version="1.0" encoding="utf-8"?>
 <p:sld xmlns:a="http://schemas.openxmlformats.org/drawingml/2006/main" xmlns:r="http://schemas.openxmlformats.org/officeDocument/2006/relationships" xmlns:p="http://schemas.openxmlformats.org/presentationml/2006/main">
   <p:cSld>
     <p:spTree>
@@ -10838,108 +11022,7 @@
 </p:sld>
 </file>
 
-<file path=ppt/slides/slide2.xml><?xml version="1.0" encoding="utf-8"?>
-<p:sld xmlns:a="http://schemas.openxmlformats.org/drawingml/2006/main" xmlns:r="http://schemas.openxmlformats.org/officeDocument/2006/relationships" xmlns:p="http://schemas.openxmlformats.org/presentationml/2006/main">
-  <p:cSld>
-    <p:spTree>
-      <p:nvGrpSpPr>
-        <p:cNvPr id="1" name=""/>
-        <p:cNvGrpSpPr/>
-        <p:nvPr/>
-      </p:nvGrpSpPr>
-      <p:grpSpPr>
-        <a:xfrm>
-          <a:off x="0" y="0"/>
-          <a:ext cx="0" cy="0"/>
-          <a:chOff x="0" y="0"/>
-          <a:chExt cx="0" cy="0"/>
-        </a:xfrm>
-      </p:grpSpPr>
-      <p:sp>
-        <p:nvSpPr>
-          <p:cNvPr id="4" name="Title 3"/>
-          <p:cNvSpPr>
-            <a:spLocks noGrp="1"/>
-          </p:cNvSpPr>
-          <p:nvPr>
-            <p:ph type="ctrTitle"/>
-          </p:nvPr>
-        </p:nvSpPr>
-        <p:spPr/>
-        <p:txBody>
-          <a:bodyPr>
-            <a:normAutofit fontScale="90000"/>
-          </a:bodyPr>
-          <a:lstStyle/>
-          <a:p>
-            <a:r>
-              <a:rPr lang="es-AR" dirty="0" smtClean="0">
-                <a:effectLst/>
-              </a:rPr>
-              <a:t>Reconocimiento de caracteres mediante </a:t>
-            </a:r>
-            <a:r>
-              <a:rPr lang="es-AR" dirty="0" smtClean="0">
-                <a:effectLst/>
-              </a:rPr>
-              <a:t>técnica </a:t>
-            </a:r>
-            <a:r>
-              <a:rPr lang="es-AR" dirty="0" smtClean="0">
-                <a:effectLst/>
-              </a:rPr>
-              <a:t>de transformación de radon y </a:t>
-            </a:r>
-            <a:r>
-              <a:rPr lang="es-AR" dirty="0" smtClean="0">
-                <a:effectLst/>
-              </a:rPr>
-              <a:t>anális </a:t>
-            </a:r>
-            <a:r>
-              <a:rPr lang="es-AR" dirty="0" smtClean="0">
-                <a:effectLst/>
-              </a:rPr>
-              <a:t>de componentes </a:t>
-            </a:r>
-            <a:r>
-              <a:rPr lang="es-AR" dirty="0" smtClean="0">
-                <a:effectLst/>
-              </a:rPr>
-              <a:t>principales</a:t>
-            </a:r>
-            <a:endParaRPr lang="es-AR" dirty="0"/>
-          </a:p>
-        </p:txBody>
-      </p:sp>
-      <p:sp>
-        <p:nvSpPr>
-          <p:cNvPr id="5" name="Subtitle 4"/>
-          <p:cNvSpPr>
-            <a:spLocks noGrp="1"/>
-          </p:cNvSpPr>
-          <p:nvPr>
-            <p:ph type="subTitle" idx="1"/>
-          </p:nvPr>
-        </p:nvSpPr>
-        <p:spPr/>
-        <p:txBody>
-          <a:bodyPr/>
-          <a:lstStyle/>
-          <a:p>
-            <a:endParaRPr lang="es-AR"/>
-          </a:p>
-        </p:txBody>
-      </p:sp>
-    </p:spTree>
-  </p:cSld>
-  <p:clrMapOvr>
-    <a:masterClrMapping/>
-  </p:clrMapOvr>
-</p:sld>
-</file>
-
-<file path=ppt/slides/slide20.xml><?xml version="1.0" encoding="utf-8"?>
+<file path=ppt/slides/slide21.xml><?xml version="1.0" encoding="utf-8"?>
 <p:sld xmlns:a="http://schemas.openxmlformats.org/drawingml/2006/main" xmlns:r="http://schemas.openxmlformats.org/officeDocument/2006/relationships" xmlns:p="http://schemas.openxmlformats.org/presentationml/2006/main">
   <p:cSld>
     <p:spTree>
@@ -11080,7 +11163,7 @@
 </p:sld>
 </file>
 
-<file path=ppt/slides/slide21.xml><?xml version="1.0" encoding="utf-8"?>
+<file path=ppt/slides/slide22.xml><?xml version="1.0" encoding="utf-8"?>
 <p:sld xmlns:a="http://schemas.openxmlformats.org/drawingml/2006/main" xmlns:r="http://schemas.openxmlformats.org/officeDocument/2006/relationships" xmlns:p="http://schemas.openxmlformats.org/presentationml/2006/main">
   <p:cSld>
     <p:spTree>
@@ -11245,112 +11328,6 @@
 </p:sld>
 </file>
 
-<file path=ppt/slides/slide22.xml><?xml version="1.0" encoding="utf-8"?>
-<p:sld xmlns:a="http://schemas.openxmlformats.org/drawingml/2006/main" xmlns:r="http://schemas.openxmlformats.org/officeDocument/2006/relationships" xmlns:p="http://schemas.openxmlformats.org/presentationml/2006/main">
-  <p:cSld>
-    <p:spTree>
-      <p:nvGrpSpPr>
-        <p:cNvPr id="1" name=""/>
-        <p:cNvGrpSpPr/>
-        <p:nvPr/>
-      </p:nvGrpSpPr>
-      <p:grpSpPr>
-        <a:xfrm>
-          <a:off x="0" y="0"/>
-          <a:ext cx="0" cy="0"/>
-          <a:chOff x="0" y="0"/>
-          <a:chExt cx="0" cy="0"/>
-        </a:xfrm>
-      </p:grpSpPr>
-      <p:sp>
-        <p:nvSpPr>
-          <p:cNvPr id="2" name="Content Placeholder 1"/>
-          <p:cNvSpPr>
-            <a:spLocks noGrp="1"/>
-          </p:cNvSpPr>
-          <p:nvPr>
-            <p:ph idx="1"/>
-          </p:nvPr>
-        </p:nvSpPr>
-        <p:spPr/>
-        <p:txBody>
-          <a:bodyPr>
-            <a:normAutofit lnSpcReduction="10000"/>
-          </a:bodyPr>
-          <a:lstStyle/>
-          <a:p>
-            <a:r>
-              <a:rPr lang="es-AR" dirty="0" smtClean="0"/>
-              <a:t>A.C.P. es en</a:t>
-            </a:r>
-            <a:r>
-              <a:rPr lang="es-AR" i="1" dirty="0" smtClean="0"/>
-              <a:t> teoría</a:t>
-            </a:r>
-            <a:r>
-              <a:rPr lang="es-AR" dirty="0" smtClean="0"/>
-              <a:t> la tranformacion óptima para cualquier set de datos en terminos de minimos cuadrados.</a:t>
-            </a:r>
-          </a:p>
-          <a:p>
-            <a:endParaRPr lang="es-AR" dirty="0" smtClean="0"/>
-          </a:p>
-          <a:p>
-            <a:r>
-              <a:rPr lang="es-AR" dirty="0" smtClean="0"/>
-              <a:t>La idea principal es expresar toda la cantidad de vectores de pixeles unidimiensonales contruidos en solamente sus componentes principales (minimizar la cantidad de datos)</a:t>
-            </a:r>
-          </a:p>
-          <a:p>
-            <a:endParaRPr lang="es-AR" dirty="0" smtClean="0"/>
-          </a:p>
-          <a:p>
-            <a:r>
-              <a:rPr lang="es-AR" dirty="0" smtClean="0"/>
-              <a:t>Corre </a:t>
-            </a:r>
-            <a:r>
-              <a:rPr lang="es-AR" dirty="0" smtClean="0"/>
-              <a:t>en paralelo con respecto a la etapa de Radon!</a:t>
-            </a:r>
-          </a:p>
-          <a:p>
-            <a:endParaRPr lang="es-AR" dirty="0" smtClean="0"/>
-          </a:p>
-        </p:txBody>
-      </p:sp>
-      <p:sp>
-        <p:nvSpPr>
-          <p:cNvPr id="3" name="Title 2"/>
-          <p:cNvSpPr>
-            <a:spLocks noGrp="1"/>
-          </p:cNvSpPr>
-          <p:nvPr>
-            <p:ph type="title"/>
-          </p:nvPr>
-        </p:nvSpPr>
-        <p:spPr/>
-        <p:txBody>
-          <a:bodyPr/>
-          <a:lstStyle/>
-          <a:p>
-            <a:pPr algn="ctr"/>
-            <a:r>
-              <a:rPr lang="es-AR" dirty="0" smtClean="0"/>
-              <a:t>Principal Components</a:t>
-            </a:r>
-            <a:endParaRPr lang="es-AR" dirty="0"/>
-          </a:p>
-        </p:txBody>
-      </p:sp>
-    </p:spTree>
-  </p:cSld>
-  <p:clrMapOvr>
-    <a:masterClrMapping/>
-  </p:clrMapOvr>
-</p:sld>
-</file>
-
 <file path=ppt/slides/slide23.xml><?xml version="1.0" encoding="utf-8"?>
 <p:sld xmlns:a="http://schemas.openxmlformats.org/drawingml/2006/main" xmlns:r="http://schemas.openxmlformats.org/officeDocument/2006/relationships" xmlns:p="http://schemas.openxmlformats.org/presentationml/2006/main">
   <p:cSld>
@@ -11378,12 +11355,7 @@
             <p:ph idx="1"/>
           </p:nvPr>
         </p:nvSpPr>
-        <p:spPr>
-          <a:xfrm>
-            <a:off x="642910" y="1428736"/>
-            <a:ext cx="8229600" cy="4525963"/>
-          </a:xfrm>
-        </p:spPr>
+        <p:spPr/>
         <p:txBody>
           <a:bodyPr>
             <a:normAutofit/>
@@ -11392,49 +11364,53 @@
           <a:p>
             <a:r>
               <a:rPr lang="es-AR" dirty="0" smtClean="0"/>
-              <a:t>Por cada una de las r imagenes obtenidas en la etapa de normalización, se crea un vector columna </a:t>
-            </a:r>
-            <a:r>
-              <a:rPr lang="es-AR" i="1" dirty="0" smtClean="0"/>
-              <a:t>X_k</a:t>
+              <a:t>E</a:t>
             </a:r>
             <a:r>
               <a:rPr lang="es-AR" dirty="0" smtClean="0"/>
-              <a:t> (k=1…r)</a:t>
-            </a:r>
-          </a:p>
-          <a:p>
-            <a:pPr lvl="1"/>
+              <a:t>xpresar los vectores </a:t>
+            </a:r>
             <a:r>
               <a:rPr lang="es-AR" dirty="0" smtClean="0"/>
-              <a:t>Se aplica la operacion de concatenacion para cada columna de la matriz.</a:t>
-            </a:r>
-          </a:p>
-          <a:p>
-            <a:pPr lvl="1"/>
+              <a:t>de pixeles unidimiensonales </a:t>
+            </a:r>
+            <a:r>
+              <a:rPr lang="es-AR" dirty="0" smtClean="0"/>
+              <a:t>construidos a partir de las imágenes en términos de sus </a:t>
+            </a:r>
+            <a:r>
+              <a:rPr lang="es-AR" dirty="0" smtClean="0"/>
+              <a:t>componentes principales (minimizar la cantidad de datos</a:t>
+            </a:r>
+            <a:r>
+              <a:rPr lang="es-AR" dirty="0" smtClean="0"/>
+              <a:t>).</a:t>
+            </a:r>
+          </a:p>
+          <a:p>
             <a:endParaRPr lang="es-AR" dirty="0" smtClean="0"/>
           </a:p>
           <a:p>
             <a:r>
               <a:rPr lang="es-AR" dirty="0" smtClean="0"/>
-              <a:t>El objetivo es calcular medias de intensiddad del brillo </a:t>
-            </a:r>
-            <a:r>
-              <a:rPr lang="es-AR" i="1" dirty="0" smtClean="0"/>
-              <a:t>M</a:t>
+              <a:t>Extraer </a:t>
             </a:r>
             <a:r>
               <a:rPr lang="es-AR" dirty="0" smtClean="0"/>
-              <a:t> y la covarianza </a:t>
-            </a:r>
-            <a:r>
-              <a:rPr lang="es-AR" i="1" dirty="0" smtClean="0"/>
-              <a:t>sigma</a:t>
+              <a:t>las características de los </a:t>
             </a:r>
             <a:r>
               <a:rPr lang="es-AR" dirty="0" smtClean="0"/>
-              <a:t>.</a:t>
-            </a:r>
+              <a:t>datos que mas </a:t>
+            </a:r>
+            <a:r>
+              <a:rPr lang="es-AR" dirty="0" smtClean="0"/>
+              <a:t>contribuyan a la variabilidad del conjunto.</a:t>
+            </a:r>
+            <a:endParaRPr lang="es-AR" dirty="0" smtClean="0"/>
+          </a:p>
+          <a:p>
+            <a:endParaRPr lang="es-AR" dirty="0" smtClean="0"/>
           </a:p>
         </p:txBody>
       </p:sp>
@@ -11489,6 +11465,31 @@
       </p:grpSpPr>
       <p:sp>
         <p:nvSpPr>
+          <p:cNvPr id="2" name="Content Placeholder 1"/>
+          <p:cNvSpPr>
+            <a:spLocks noGrp="1"/>
+          </p:cNvSpPr>
+          <p:nvPr>
+            <p:ph idx="1"/>
+          </p:nvPr>
+        </p:nvSpPr>
+        <p:spPr/>
+        <p:txBody>
+          <a:bodyPr/>
+          <a:lstStyle/>
+          <a:p>
+            <a:r>
+              <a:rPr lang="es-AR" dirty="0" smtClean="0"/>
+              <a:t>Creacion del vector unidimensional a partir de la imagen bidimensional</a:t>
+            </a:r>
+          </a:p>
+          <a:p>
+            <a:endParaRPr lang="es-AR" dirty="0"/>
+          </a:p>
+        </p:txBody>
+      </p:sp>
+      <p:sp>
+        <p:nvSpPr>
           <p:cNvPr id="3" name="Title 2"/>
           <p:cNvSpPr>
             <a:spLocks noGrp="1"/>
@@ -11513,7 +11514,7 @@
       </p:sp>
       <p:pic>
         <p:nvPicPr>
-          <p:cNvPr id="7170" name="Picture 2" descr="E:\Code\ITBA\TrabajosPracticos\doc\clase\img\ACP\Formulas.png"/>
+          <p:cNvPr id="5122" name="Picture 2" descr="E:\Code\ITBA\TrabajosPracticos\doc\clase\img\ACP\vector2d_a_1d.png"/>
           <p:cNvPicPr>
             <a:picLocks noChangeAspect="1" noChangeArrowheads="1"/>
           </p:cNvPicPr>
@@ -11528,8 +11529,8 @@
         </p:blipFill>
         <p:spPr bwMode="auto">
           <a:xfrm>
-            <a:off x="2795600" y="1571612"/>
-            <a:ext cx="3562350" cy="3867150"/>
+            <a:off x="500034" y="3214686"/>
+            <a:ext cx="8332066" cy="1763722"/>
           </a:xfrm>
           <a:prstGeom prst="rect">
             <a:avLst/>
@@ -11537,6 +11538,129 @@
           <a:noFill/>
         </p:spPr>
       </p:pic>
+      <p:sp>
+        <p:nvSpPr>
+          <p:cNvPr id="5" name="Rectangle 4"/>
+          <p:cNvSpPr/>
+          <p:nvPr/>
+        </p:nvSpPr>
+        <p:spPr>
+          <a:xfrm>
+            <a:off x="2285984" y="5429264"/>
+            <a:ext cx="6192722" cy="923330"/>
+          </a:xfrm>
+          <a:prstGeom prst="rect">
+            <a:avLst/>
+          </a:prstGeom>
+          <a:noFill/>
+        </p:spPr>
+        <p:txBody>
+          <a:bodyPr wrap="none" lIns="91440" tIns="45720" rIns="91440" bIns="45720">
+            <a:spAutoFit/>
+          </a:bodyPr>
+          <a:lstStyle/>
+          <a:p>
+            <a:pPr algn="ctr"/>
+            <a:r>
+              <a:rPr lang="en-US" sz="5400" b="1" cap="none" spc="0" dirty="0" smtClean="0">
+                <a:ln w="10541" cmpd="sng">
+                  <a:solidFill>
+                    <a:schemeClr val="accent1">
+                      <a:shade val="88000"/>
+                      <a:satMod val="110000"/>
+                    </a:schemeClr>
+                  </a:solidFill>
+                  <a:prstDash val="solid"/>
+                </a:ln>
+                <a:gradFill>
+                  <a:gsLst>
+                    <a:gs pos="0">
+                      <a:schemeClr val="accent1">
+                        <a:tint val="40000"/>
+                        <a:satMod val="250000"/>
+                      </a:schemeClr>
+                    </a:gs>
+                    <a:gs pos="9000">
+                      <a:schemeClr val="accent1">
+                        <a:tint val="52000"/>
+                        <a:satMod val="300000"/>
+                      </a:schemeClr>
+                    </a:gs>
+                    <a:gs pos="50000">
+                      <a:schemeClr val="accent1">
+                        <a:shade val="20000"/>
+                        <a:satMod val="300000"/>
+                      </a:schemeClr>
+                    </a:gs>
+                    <a:gs pos="79000">
+                      <a:schemeClr val="accent1">
+                        <a:tint val="52000"/>
+                        <a:satMod val="300000"/>
+                      </a:schemeClr>
+                    </a:gs>
+                    <a:gs pos="100000">
+                      <a:schemeClr val="accent1">
+                        <a:tint val="40000"/>
+                        <a:satMod val="250000"/>
+                      </a:schemeClr>
+                    </a:gs>
+                  </a:gsLst>
+                  <a:lin ang="5400000"/>
+                </a:gradFill>
+                <a:effectLst/>
+              </a:rPr>
+              <a:t>Porque se ve asi??</a:t>
+            </a:r>
+            <a:endParaRPr lang="en-US" sz="5400" b="1" cap="none" spc="0" dirty="0">
+              <a:ln w="10541" cmpd="sng">
+                <a:solidFill>
+                  <a:schemeClr val="accent1">
+                    <a:shade val="88000"/>
+                    <a:satMod val="110000"/>
+                  </a:schemeClr>
+                </a:solidFill>
+                <a:prstDash val="solid"/>
+              </a:ln>
+              <a:gradFill>
+                <a:gsLst>
+                  <a:gs pos="0">
+                    <a:schemeClr val="accent1">
+                      <a:tint val="40000"/>
+                      <a:satMod val="250000"/>
+                    </a:schemeClr>
+                  </a:gs>
+                  <a:gs pos="9000">
+                    <a:schemeClr val="accent1">
+                      <a:tint val="52000"/>
+                      <a:satMod val="300000"/>
+                    </a:schemeClr>
+                  </a:gs>
+                  <a:gs pos="50000">
+                    <a:schemeClr val="accent1">
+                      <a:shade val="20000"/>
+                      <a:satMod val="300000"/>
+                    </a:schemeClr>
+                  </a:gs>
+                  <a:gs pos="79000">
+                    <a:schemeClr val="accent1">
+                      <a:tint val="52000"/>
+                      <a:satMod val="300000"/>
+                    </a:schemeClr>
+                  </a:gs>
+                  <a:gs pos="100000">
+                    <a:schemeClr val="accent1">
+                      <a:tint val="40000"/>
+                      <a:satMod val="250000"/>
+                    </a:schemeClr>
+                  </a:gs>
+                </a:gsLst>
+                <a:lin ang="5400000"/>
+              </a:gradFill>
+              <a:effectLst/>
+            </a:endParaRPr>
+          </a:p>
+        </p:txBody>
+      </p:sp>
     </p:spTree>
   </p:cSld>
   <p:clrMapOvr>
@@ -11574,44 +11698,62 @@
         </p:nvSpPr>
         <p:spPr/>
         <p:txBody>
-          <a:bodyPr>
-            <a:normAutofit/>
-          </a:bodyPr>
+          <a:bodyPr/>
           <a:lstStyle/>
           <a:p>
             <a:r>
               <a:rPr lang="es-AR" dirty="0" smtClean="0"/>
-              <a:t>Calculados a partir de los autovectores </a:t>
-            </a:r>
-            <a:r>
-              <a:rPr lang="el-GR" i="1" dirty="0" smtClean="0"/>
-              <a:t>Φ</a:t>
-            </a:r>
-            <a:r>
-              <a:rPr lang="es-AR" i="1" dirty="0" smtClean="0"/>
-              <a:t> </a:t>
-            </a:r>
+              <a:t>Se aplica A.C.P. a cada imagen.</a:t>
+            </a:r>
+          </a:p>
+          <a:p>
+            <a:endParaRPr lang="es-AR" dirty="0" smtClean="0"/>
+          </a:p>
+          <a:p>
             <a:r>
               <a:rPr lang="es-AR" dirty="0" smtClean="0"/>
-              <a:t>y los autovalores </a:t>
-            </a:r>
-            <a:r>
-              <a:rPr lang="el-GR" i="1" dirty="0" smtClean="0"/>
-              <a:t>λ</a:t>
+              <a:t>El </a:t>
             </a:r>
             <a:r>
               <a:rPr lang="es-AR" dirty="0" smtClean="0"/>
-              <a:t> de la matriz de covarianza.</a:t>
-            </a:r>
-          </a:p>
-          <a:p>
-            <a:endParaRPr lang="es-AR" dirty="0" smtClean="0"/>
-          </a:p>
-          <a:p>
+              <a:t>resultado de </a:t>
+            </a:r>
             <a:r>
               <a:rPr lang="es-AR" dirty="0" smtClean="0"/>
-              <a:t>Los autovectores son normalizados, ordenados de acuerdo a los autovalores (mayor a menor) y así obtener la matriz de transformacion W.</a:t>
-            </a:r>
+              <a:t>esto será </a:t>
+            </a:r>
+            <a:r>
+              <a:rPr lang="es-AR" dirty="0" smtClean="0"/>
+              <a:t>un vector de componentes principales que se </a:t>
+            </a:r>
+            <a:r>
+              <a:rPr lang="es-AR" dirty="0" smtClean="0"/>
+              <a:t>presentará </a:t>
+            </a:r>
+            <a:r>
+              <a:rPr lang="es-AR" dirty="0" smtClean="0"/>
+              <a:t>a una red </a:t>
+            </a:r>
+            <a:r>
+              <a:rPr lang="es-AR" dirty="0" smtClean="0"/>
+              <a:t>y tratará </a:t>
+            </a:r>
+            <a:r>
+              <a:rPr lang="es-AR" dirty="0" smtClean="0"/>
+              <a:t>de reconocer</a:t>
+            </a:r>
+            <a:r>
+              <a:rPr lang="es-AR" dirty="0" smtClean="0"/>
+              <a:t>.</a:t>
+            </a:r>
+          </a:p>
+          <a:p>
+            <a:pPr lvl="1"/>
+            <a:r>
+              <a:rPr lang="es-AR" dirty="0" smtClean="0"/>
+              <a:t>Red previamente entrenada!</a:t>
+            </a:r>
+            <a:endParaRPr lang="es-AR" dirty="0"/>
           </a:p>
         </p:txBody>
       </p:sp>
@@ -11674,38 +11816,85 @@
             <p:ph idx="1"/>
           </p:nvPr>
         </p:nvSpPr>
-        <p:spPr>
-          <a:xfrm>
-            <a:off x="457200" y="1481328"/>
-            <a:ext cx="4686304" cy="4525963"/>
-          </a:xfrm>
-        </p:spPr>
-        <p:txBody>
-          <a:bodyPr/>
+        <p:spPr/>
+        <p:txBody>
+          <a:bodyPr>
+            <a:normAutofit/>
+          </a:bodyPr>
           <a:lstStyle/>
           <a:p>
             <a:r>
+              <a:rPr lang="es-AR" dirty="0" smtClean="0"/>
+              <a:t>Se calcula en etapas:</a:t>
+            </a:r>
+          </a:p>
+          <a:p>
+            <a:endParaRPr lang="es-AR" dirty="0" smtClean="0"/>
+          </a:p>
+          <a:p>
+            <a:pPr marL="850392" lvl="1" indent="-457200">
+              <a:buFont typeface="+mj-lt"/>
+              <a:buAutoNum type="arabicPeriod"/>
+            </a:pPr>
+            <a:r>
+              <a:rPr lang="es-AR" dirty="0" smtClean="0"/>
+              <a:t>Restar la media de los datos a cada variable.</a:t>
+            </a:r>
+            <a:endParaRPr lang="es-AR" dirty="0" smtClean="0"/>
+          </a:p>
+          <a:p>
+            <a:pPr marL="850392" lvl="1" indent="-457200">
+              <a:buFont typeface="+mj-lt"/>
+              <a:buAutoNum type="arabicPeriod"/>
+            </a:pPr>
+            <a:r>
+              <a:rPr lang="es-AR" dirty="0" smtClean="0"/>
+              <a:t>Calcular y crear la matriz de covarianza</a:t>
+            </a:r>
+          </a:p>
+          <a:p>
+            <a:pPr marL="850392" lvl="1" indent="-457200">
+              <a:buFont typeface="+mj-lt"/>
+              <a:buAutoNum type="arabicPeriod"/>
+            </a:pPr>
+            <a:r>
+              <a:rPr lang="es-AR" dirty="0" smtClean="0"/>
+              <a:t>Calcular los autovector y autovalores de la matriz de covarianza.</a:t>
+            </a:r>
+            <a:endParaRPr lang="es-AR" dirty="0" smtClean="0"/>
+          </a:p>
+          <a:p>
+            <a:pPr marL="850392" lvl="1" indent="-457200">
+              <a:buFont typeface="+mj-lt"/>
+              <a:buAutoNum type="arabicPeriod"/>
+            </a:pPr>
+            <a:r>
+              <a:rPr lang="es-AR" dirty="0" smtClean="0"/>
+              <a:t>Tomar el </a:t>
+            </a:r>
+            <a:r>
               <a:rPr lang="es-AR" i="1" dirty="0" smtClean="0"/>
-              <a:t>K </a:t>
-            </a:r>
+              <a:t>Feature Vector</a:t>
+            </a:r>
+          </a:p>
+          <a:p>
+            <a:pPr marL="1088136" lvl="2" indent="-457200"/>
             <a:r>
               <a:rPr lang="es-AR" dirty="0" smtClean="0"/>
-              <a:t> representa el número de dimensiones del subespacio reducido.</a:t>
-            </a:r>
-          </a:p>
-          <a:p>
+              <a:t>Nombre de fantasía para una matriz de vectores.</a:t>
+            </a:r>
             <a:endParaRPr lang="es-AR" dirty="0" smtClean="0"/>
           </a:p>
           <a:p>
-            <a:r>
-              <a:rPr lang="es-AR" i="1" dirty="0" smtClean="0"/>
-              <a:t>p </a:t>
-            </a:r>
+            <a:pPr marL="850392" lvl="1" indent="-457200">
+              <a:buFont typeface="+mj-lt"/>
+              <a:buAutoNum type="arabicPeriod"/>
+            </a:pPr>
             <a:r>
               <a:rPr lang="es-AR" dirty="0" smtClean="0"/>
-              <a:t>un thresshold fijo.</a:t>
-            </a:r>
-            <a:endParaRPr lang="es-AR" i="1" dirty="0"/>
+              <a:t>Multiplicar la traspuesta de los Feature Vectors por la traspuesta de los datos ajustados.</a:t>
+            </a:r>
+            <a:endParaRPr lang="es-AR" dirty="0"/>
           </a:p>
         </p:txBody>
       </p:sp>
@@ -11733,32 +11922,6 @@
           </a:p>
         </p:txBody>
       </p:sp>
-      <p:pic>
-        <p:nvPicPr>
-          <p:cNvPr id="9218" name="Picture 2" descr="E:\Code\ITBA\TrabajosPracticos\doc\clase\img\ACP\Formulas_2.png"/>
-          <p:cNvPicPr>
-            <a:picLocks noChangeAspect="1" noChangeArrowheads="1"/>
-          </p:cNvPicPr>
-          <p:nvPr/>
-        </p:nvPicPr>
-        <p:blipFill>
-          <a:blip r:embed="rId2"/>
-          <a:srcRect/>
-          <a:stretch>
-            <a:fillRect/>
-          </a:stretch>
-        </p:blipFill>
-        <p:spPr bwMode="auto">
-          <a:xfrm>
-            <a:off x="5429256" y="1428736"/>
-            <a:ext cx="3368672" cy="4531664"/>
-          </a:xfrm>
-          <a:prstGeom prst="rect">
-            <a:avLst/>
-          </a:prstGeom>
-          <a:noFill/>
-        </p:spPr>
-      </p:pic>
     </p:spTree>
   </p:cSld>
   <p:clrMapOvr>
@@ -11796,10 +11959,41 @@
         </p:nvSpPr>
         <p:spPr/>
         <p:txBody>
-          <a:bodyPr/>
+          <a:bodyPr>
+            <a:normAutofit/>
+          </a:bodyPr>
           <a:lstStyle/>
           <a:p>
-            <a:endParaRPr lang="es-AR"/>
+            <a:r>
+              <a:rPr lang="es-AR" dirty="0" smtClean="0"/>
+              <a:t>Etapa 1: </a:t>
+            </a:r>
+          </a:p>
+          <a:p>
+            <a:pPr lvl="1"/>
+            <a:endParaRPr lang="es-AR" dirty="0" smtClean="0"/>
+          </a:p>
+          <a:p>
+            <a:pPr lvl="1"/>
+            <a:r>
+              <a:rPr lang="es-AR" dirty="0" smtClean="0"/>
+              <a:t>Esta étapa facilita cálculo de la matríz de covarianza.</a:t>
+            </a:r>
+          </a:p>
+          <a:p>
+            <a:pPr lvl="1"/>
+            <a:endParaRPr lang="es-AR" dirty="0" smtClean="0"/>
+          </a:p>
+          <a:p>
+            <a:pPr lvl="1"/>
+            <a:r>
+              <a:rPr lang="es-AR" dirty="0" smtClean="0"/>
+              <a:t>Se resta la media de cada valor de la fila por cada fila de todas las imágenes.</a:t>
+            </a:r>
+          </a:p>
+          <a:p>
+            <a:pPr lvl="1"/>
+            <a:endParaRPr lang="es-AR" dirty="0" smtClean="0"/>
           </a:p>
         </p:txBody>
       </p:sp>
@@ -11818,7 +12012,12 @@
           <a:bodyPr/>
           <a:lstStyle/>
           <a:p>
-            <a:endParaRPr lang="es-AR"/>
+            <a:pPr algn="ctr"/>
+            <a:r>
+              <a:rPr lang="es-AR" dirty="0" smtClean="0"/>
+              <a:t>Principal Components</a:t>
+            </a:r>
+            <a:endParaRPr lang="es-AR" dirty="0"/>
           </a:p>
         </p:txBody>
       </p:sp>
@@ -11827,6 +12026,293 @@
   <p:clrMapOvr>
     <a:masterClrMapping/>
   </p:clrMapOvr>
+</p:sld>
+</file>
+
+<file path=ppt/slides/slide28.xml><?xml version="1.0" encoding="utf-8"?>
+<p:sld xmlns:a="http://schemas.openxmlformats.org/drawingml/2006/main" xmlns:r="http://schemas.openxmlformats.org/officeDocument/2006/relationships" xmlns:p="http://schemas.openxmlformats.org/presentationml/2006/main">
+  <p:cSld>
+    <p:spTree>
+      <p:nvGrpSpPr>
+        <p:cNvPr id="1" name=""/>
+        <p:cNvGrpSpPr/>
+        <p:nvPr/>
+      </p:nvGrpSpPr>
+      <p:grpSpPr>
+        <a:xfrm>
+          <a:off x="0" y="0"/>
+          <a:ext cx="0" cy="0"/>
+          <a:chOff x="0" y="0"/>
+          <a:chExt cx="0" cy="0"/>
+        </a:xfrm>
+      </p:grpSpPr>
+      <p:sp>
+        <p:nvSpPr>
+          <p:cNvPr id="2" name="Content Placeholder 1"/>
+          <p:cNvSpPr>
+            <a:spLocks noGrp="1"/>
+          </p:cNvSpPr>
+          <p:nvPr>
+            <p:ph idx="1"/>
+          </p:nvPr>
+        </p:nvSpPr>
+        <p:spPr>
+          <a:xfrm>
+            <a:off x="457200" y="1481328"/>
+            <a:ext cx="8229600" cy="4948068"/>
+          </a:xfrm>
+        </p:spPr>
+        <p:txBody>
+          <a:bodyPr>
+            <a:normAutofit/>
+          </a:bodyPr>
+          <a:lstStyle/>
+          <a:p>
+            <a:r>
+              <a:rPr lang="es-AR" dirty="0" smtClean="0"/>
+              <a:t>Etapa 2: Matriz de covarianza</a:t>
+            </a:r>
+          </a:p>
+          <a:p>
+            <a:endParaRPr lang="es-AR" dirty="0" smtClean="0"/>
+          </a:p>
+          <a:p>
+            <a:endParaRPr lang="es-AR" dirty="0" smtClean="0"/>
+          </a:p>
+          <a:p>
+            <a:pPr algn="ctr">
+              <a:buNone/>
+            </a:pPr>
+            <a:endParaRPr lang="es-AR" sz="2400" i="1" dirty="0" smtClean="0"/>
+          </a:p>
+          <a:p>
+            <a:pPr algn="ctr">
+              <a:buNone/>
+            </a:pPr>
+            <a:endParaRPr lang="es-AR" sz="2400" i="1" dirty="0" smtClean="0"/>
+          </a:p>
+          <a:p>
+            <a:pPr lvl="1"/>
+            <a:endParaRPr lang="es-AR" sz="2000" i="1" dirty="0" smtClean="0"/>
+          </a:p>
+          <a:p>
+            <a:pPr lvl="1"/>
+            <a:r>
+              <a:rPr lang="es-AR" sz="2000" i="1" dirty="0" smtClean="0"/>
+              <a:t>x=(xi,yi)</a:t>
+            </a:r>
+            <a:r>
+              <a:rPr lang="es-AR" sz="2000" dirty="0" smtClean="0"/>
+              <a:t> representa al valor del pixel.</a:t>
+            </a:r>
+          </a:p>
+          <a:p>
+            <a:pPr lvl="1"/>
+            <a:r>
+              <a:rPr lang="es-AR" sz="2000" i="1" dirty="0" smtClean="0"/>
+              <a:t>x</a:t>
+            </a:r>
+            <a:r>
+              <a:rPr lang="es-AR" sz="2000" i="1" dirty="0" smtClean="0"/>
+              <a:t> raya</a:t>
+            </a:r>
+            <a:r>
+              <a:rPr lang="es-AR" sz="2000" dirty="0" smtClean="0"/>
+              <a:t> representa la media para todos los pixeles.</a:t>
+            </a:r>
+            <a:endParaRPr lang="es-AR" sz="2000" i="1" dirty="0" smtClean="0"/>
+          </a:p>
+          <a:p>
+            <a:pPr lvl="1"/>
+            <a:r>
+              <a:rPr lang="es-AR" sz="2000" i="1" dirty="0" smtClean="0"/>
+              <a:t>n</a:t>
+            </a:r>
+            <a:r>
+              <a:rPr lang="es-AR" sz="2000" dirty="0" smtClean="0"/>
+              <a:t> representa el total de valores.</a:t>
+            </a:r>
+          </a:p>
+          <a:p>
+            <a:pPr lvl="1"/>
+            <a:endParaRPr lang="es-AR" sz="2000" i="1" dirty="0" smtClean="0"/>
+          </a:p>
+          <a:p>
+            <a:pPr lvl="1"/>
+            <a:endParaRPr lang="es-AR" dirty="0"/>
+          </a:p>
+        </p:txBody>
+      </p:sp>
+      <p:sp>
+        <p:nvSpPr>
+          <p:cNvPr id="3" name="Title 2"/>
+          <p:cNvSpPr>
+            <a:spLocks noGrp="1"/>
+          </p:cNvSpPr>
+          <p:nvPr>
+            <p:ph type="title"/>
+          </p:nvPr>
+        </p:nvSpPr>
+        <p:spPr/>
+        <p:txBody>
+          <a:bodyPr/>
+          <a:lstStyle/>
+          <a:p>
+            <a:pPr algn="ctr"/>
+            <a:r>
+              <a:rPr lang="es-AR" dirty="0" smtClean="0"/>
+              <a:t>Principal Components</a:t>
+            </a:r>
+            <a:endParaRPr lang="es-AR" dirty="0"/>
+          </a:p>
+        </p:txBody>
+      </p:sp>
+      <p:pic>
+        <p:nvPicPr>
+          <p:cNvPr id="2051" name="Picture 3" descr="E:\Code\ITBA\TrabajosPracticos\doc\clase\img\ACP\ecuations.png"/>
+          <p:cNvPicPr>
+            <a:picLocks noChangeAspect="1" noChangeArrowheads="1"/>
+          </p:cNvPicPr>
+          <p:nvPr/>
+        </p:nvPicPr>
+        <p:blipFill>
+          <a:blip r:embed="rId2"/>
+          <a:srcRect/>
+          <a:stretch>
+            <a:fillRect/>
+          </a:stretch>
+        </p:blipFill>
+        <p:spPr bwMode="auto">
+          <a:xfrm>
+            <a:off x="1714480" y="2314573"/>
+            <a:ext cx="5536422" cy="1328741"/>
+          </a:xfrm>
+          <a:prstGeom prst="rect">
+            <a:avLst/>
+          </a:prstGeom>
+          <a:noFill/>
+        </p:spPr>
+      </p:pic>
+    </p:spTree>
+  </p:cSld>
+  <p:clrMapOvr>
+    <a:masterClrMapping/>
+  </p:clrMapOvr>
+  <p:timing>
+    <p:tnLst>
+      <p:par>
+        <p:cTn id="1" dur="indefinite" restart="never" nodeType="tmRoot"/>
+      </p:par>
+    </p:tnLst>
+  </p:timing>
+</p:sld>
+</file>
+
+<file path=ppt/slides/slide29.xml><?xml version="1.0" encoding="utf-8"?>
+<p:sld xmlns:a="http://schemas.openxmlformats.org/drawingml/2006/main" xmlns:r="http://schemas.openxmlformats.org/officeDocument/2006/relationships" xmlns:p="http://schemas.openxmlformats.org/presentationml/2006/main">
+  <p:cSld>
+    <p:spTree>
+      <p:nvGrpSpPr>
+        <p:cNvPr id="1" name=""/>
+        <p:cNvGrpSpPr/>
+        <p:nvPr/>
+      </p:nvGrpSpPr>
+      <p:grpSpPr>
+        <a:xfrm>
+          <a:off x="0" y="0"/>
+          <a:ext cx="0" cy="0"/>
+          <a:chOff x="0" y="0"/>
+          <a:chExt cx="0" cy="0"/>
+        </a:xfrm>
+      </p:grpSpPr>
+      <p:sp>
+        <p:nvSpPr>
+          <p:cNvPr id="2" name="Content Placeholder 1"/>
+          <p:cNvSpPr>
+            <a:spLocks noGrp="1"/>
+          </p:cNvSpPr>
+          <p:nvPr>
+            <p:ph idx="1"/>
+          </p:nvPr>
+        </p:nvSpPr>
+        <p:spPr/>
+        <p:txBody>
+          <a:bodyPr/>
+          <a:lstStyle/>
+          <a:p>
+            <a:r>
+              <a:rPr lang="es-AR" dirty="0" smtClean="0"/>
+              <a:t>R</a:t>
+            </a:r>
+            <a:r>
+              <a:rPr lang="es-AR" dirty="0" smtClean="0"/>
+              <a:t>epresenta cuanto varían la dimensiones repecto de la media con respecto a las demás dimensiones.</a:t>
+            </a:r>
+          </a:p>
+        </p:txBody>
+      </p:sp>
+      <p:sp>
+        <p:nvSpPr>
+          <p:cNvPr id="3" name="Title 2"/>
+          <p:cNvSpPr>
+            <a:spLocks noGrp="1"/>
+          </p:cNvSpPr>
+          <p:nvPr>
+            <p:ph type="title"/>
+          </p:nvPr>
+        </p:nvSpPr>
+        <p:spPr/>
+        <p:txBody>
+          <a:bodyPr/>
+          <a:lstStyle/>
+          <a:p>
+            <a:pPr algn="ctr"/>
+            <a:r>
+              <a:rPr lang="es-AR" dirty="0" smtClean="0"/>
+              <a:t>Principal Components</a:t>
+            </a:r>
+            <a:endParaRPr lang="es-AR" dirty="0"/>
+          </a:p>
+        </p:txBody>
+      </p:sp>
+      <p:pic>
+        <p:nvPicPr>
+          <p:cNvPr id="3074" name="Picture 2" descr="E:\Code\ITBA\TrabajosPracticos\doc\clase\img\ACP\cov_ejemplo.png"/>
+          <p:cNvPicPr>
+            <a:picLocks noChangeAspect="1" noChangeArrowheads="1"/>
+          </p:cNvPicPr>
+          <p:nvPr/>
+        </p:nvPicPr>
+        <p:blipFill>
+          <a:blip r:embed="rId2"/>
+          <a:srcRect/>
+          <a:stretch>
+            <a:fillRect/>
+          </a:stretch>
+        </p:blipFill>
+        <p:spPr bwMode="auto">
+          <a:xfrm>
+            <a:off x="428596" y="3146432"/>
+            <a:ext cx="8501122" cy="2711460"/>
+          </a:xfrm>
+          <a:prstGeom prst="rect">
+            <a:avLst/>
+          </a:prstGeom>
+          <a:noFill/>
+        </p:spPr>
+      </p:pic>
+    </p:spTree>
+  </p:cSld>
+  <p:clrMapOvr>
+    <a:masterClrMapping/>
+  </p:clrMapOvr>
+  <p:timing>
+    <p:tnLst>
+      <p:par>
+        <p:cTn id="1" dur="indefinite" restart="never" nodeType="tmRoot"/>
+      </p:par>
+    </p:tnLst>
+  </p:timing>
 </p:sld>
 </file>
 
@@ -11913,6 +12399,851 @@
             <a:r>
               <a:rPr lang="es-AR" dirty="0" smtClean="0"/>
               <a:t>Introducción</a:t>
+            </a:r>
+            <a:endParaRPr lang="es-AR" dirty="0"/>
+          </a:p>
+        </p:txBody>
+      </p:sp>
+    </p:spTree>
+  </p:cSld>
+  <p:clrMapOvr>
+    <a:masterClrMapping/>
+  </p:clrMapOvr>
+</p:sld>
+</file>
+
+<file path=ppt/slides/slide30.xml><?xml version="1.0" encoding="utf-8"?>
+<p:sld xmlns:a="http://schemas.openxmlformats.org/drawingml/2006/main" xmlns:r="http://schemas.openxmlformats.org/officeDocument/2006/relationships" xmlns:p="http://schemas.openxmlformats.org/presentationml/2006/main">
+  <p:cSld>
+    <p:spTree>
+      <p:nvGrpSpPr>
+        <p:cNvPr id="1" name=""/>
+        <p:cNvGrpSpPr/>
+        <p:nvPr/>
+      </p:nvGrpSpPr>
+      <p:grpSpPr>
+        <a:xfrm>
+          <a:off x="0" y="0"/>
+          <a:ext cx="0" cy="0"/>
+          <a:chOff x="0" y="0"/>
+          <a:chExt cx="0" cy="0"/>
+        </a:xfrm>
+      </p:grpSpPr>
+      <p:sp>
+        <p:nvSpPr>
+          <p:cNvPr id="2" name="Content Placeholder 1"/>
+          <p:cNvSpPr>
+            <a:spLocks noGrp="1"/>
+          </p:cNvSpPr>
+          <p:nvPr>
+            <p:ph idx="1"/>
+          </p:nvPr>
+        </p:nvSpPr>
+        <p:spPr/>
+        <p:txBody>
+          <a:bodyPr>
+            <a:normAutofit/>
+          </a:bodyPr>
+          <a:lstStyle/>
+          <a:p>
+            <a:r>
+              <a:rPr lang="es-AR" dirty="0" smtClean="0"/>
+              <a:t>Etapa 3: Autovalores y Autovectores</a:t>
+            </a:r>
+          </a:p>
+          <a:p>
+            <a:endParaRPr lang="es-AR" dirty="0" smtClean="0"/>
+          </a:p>
+          <a:p>
+            <a:pPr lvl="1"/>
+            <a:r>
+              <a:rPr lang="es-AR" dirty="0" smtClean="0"/>
+              <a:t>Autovalores son el producto de mutiplicar matrices.</a:t>
+            </a:r>
+          </a:p>
+          <a:p>
+            <a:pPr lvl="1"/>
+            <a:endParaRPr lang="es-AR" dirty="0" smtClean="0"/>
+          </a:p>
+          <a:p>
+            <a:pPr lvl="1"/>
+            <a:r>
+              <a:rPr lang="es-AR" dirty="0" smtClean="0"/>
+              <a:t>Son hallados a partir de la multiplciación de la matriz de covarianza por un vector en un espacio bidimensional</a:t>
+            </a:r>
+          </a:p>
+          <a:p>
+            <a:pPr lvl="2"/>
+            <a:r>
+              <a:rPr lang="es-AR" dirty="0" smtClean="0"/>
+              <a:t>Ej: un autovector</a:t>
+            </a:r>
+          </a:p>
+          <a:p>
+            <a:pPr lvl="2"/>
+            <a:endParaRPr lang="es-AR" dirty="0" smtClean="0"/>
+          </a:p>
+          <a:p>
+            <a:pPr lvl="1"/>
+            <a:r>
+              <a:rPr lang="es-AR" dirty="0" smtClean="0"/>
+              <a:t>Esto hace a la matriz de covarianza el equivalente a una matriz de transformacion.</a:t>
+            </a:r>
+          </a:p>
+        </p:txBody>
+      </p:sp>
+      <p:sp>
+        <p:nvSpPr>
+          <p:cNvPr id="3" name="Title 2"/>
+          <p:cNvSpPr>
+            <a:spLocks noGrp="1"/>
+          </p:cNvSpPr>
+          <p:nvPr>
+            <p:ph type="title"/>
+          </p:nvPr>
+        </p:nvSpPr>
+        <p:spPr/>
+        <p:txBody>
+          <a:bodyPr>
+            <a:normAutofit/>
+          </a:bodyPr>
+          <a:lstStyle/>
+          <a:p>
+            <a:pPr algn="ctr"/>
+            <a:r>
+              <a:rPr lang="es-AR" dirty="0" smtClean="0"/>
+              <a:t>Principal </a:t>
+            </a:r>
+            <a:r>
+              <a:rPr lang="es-AR" dirty="0" smtClean="0"/>
+              <a:t>Components</a:t>
+            </a:r>
+            <a:endParaRPr lang="es-AR" dirty="0"/>
+          </a:p>
+        </p:txBody>
+      </p:sp>
+    </p:spTree>
+  </p:cSld>
+  <p:clrMapOvr>
+    <a:masterClrMapping/>
+  </p:clrMapOvr>
+  <p:timing>
+    <p:tnLst>
+      <p:par>
+        <p:cTn id="1" dur="indefinite" restart="never" nodeType="tmRoot"/>
+      </p:par>
+    </p:tnLst>
+  </p:timing>
+</p:sld>
+</file>
+
+<file path=ppt/slides/slide31.xml><?xml version="1.0" encoding="utf-8"?>
+<p:sld xmlns:a="http://schemas.openxmlformats.org/drawingml/2006/main" xmlns:r="http://schemas.openxmlformats.org/officeDocument/2006/relationships" xmlns:p="http://schemas.openxmlformats.org/presentationml/2006/main">
+  <p:cSld>
+    <p:spTree>
+      <p:nvGrpSpPr>
+        <p:cNvPr id="1" name=""/>
+        <p:cNvGrpSpPr/>
+        <p:nvPr/>
+      </p:nvGrpSpPr>
+      <p:grpSpPr>
+        <a:xfrm>
+          <a:off x="0" y="0"/>
+          <a:ext cx="0" cy="0"/>
+          <a:chOff x="0" y="0"/>
+          <a:chExt cx="0" cy="0"/>
+        </a:xfrm>
+      </p:grpSpPr>
+      <p:pic>
+        <p:nvPicPr>
+          <p:cNvPr id="4" name="Content Placeholder 3" descr="autovec_ejemplo.png"/>
+          <p:cNvPicPr>
+            <a:picLocks noGrp="1" noChangeAspect="1"/>
+          </p:cNvPicPr>
+          <p:nvPr>
+            <p:ph idx="1"/>
+          </p:nvPr>
+        </p:nvPicPr>
+        <p:blipFill>
+          <a:blip r:embed="rId2"/>
+          <a:stretch>
+            <a:fillRect/>
+          </a:stretch>
+        </p:blipFill>
+        <p:spPr>
+          <a:xfrm>
+            <a:off x="2285984" y="1733682"/>
+            <a:ext cx="4643470" cy="4338524"/>
+          </a:xfrm>
+        </p:spPr>
+      </p:pic>
+      <p:sp>
+        <p:nvSpPr>
+          <p:cNvPr id="3" name="Title 2"/>
+          <p:cNvSpPr>
+            <a:spLocks noGrp="1"/>
+          </p:cNvSpPr>
+          <p:nvPr>
+            <p:ph type="title"/>
+          </p:nvPr>
+        </p:nvSpPr>
+        <p:spPr/>
+        <p:txBody>
+          <a:bodyPr/>
+          <a:lstStyle/>
+          <a:p>
+            <a:pPr algn="ctr"/>
+            <a:r>
+              <a:rPr lang="es-AR" dirty="0" smtClean="0"/>
+              <a:t>Principal Components</a:t>
+            </a:r>
+            <a:endParaRPr lang="es-AR" dirty="0"/>
+          </a:p>
+        </p:txBody>
+      </p:sp>
+      <p:sp>
+        <p:nvSpPr>
+          <p:cNvPr id="5" name="Rectangle 4"/>
+          <p:cNvSpPr/>
+          <p:nvPr/>
+        </p:nvSpPr>
+        <p:spPr>
+          <a:xfrm>
+            <a:off x="4643438" y="6072206"/>
+            <a:ext cx="4134894" cy="553998"/>
+          </a:xfrm>
+          <a:prstGeom prst="rect">
+            <a:avLst/>
+          </a:prstGeom>
+          <a:noFill/>
+        </p:spPr>
+        <p:txBody>
+          <a:bodyPr wrap="square" lIns="91440" tIns="45720" rIns="91440" bIns="45720">
+            <a:spAutoFit/>
+          </a:bodyPr>
+          <a:lstStyle/>
+          <a:p>
+            <a:pPr algn="ctr"/>
+            <a:r>
+              <a:rPr lang="en-US" sz="3000" b="1" cap="none" spc="0" dirty="0" smtClean="0">
+                <a:ln w="10541" cmpd="sng">
+                  <a:solidFill>
+                    <a:schemeClr val="accent1">
+                      <a:shade val="88000"/>
+                      <a:satMod val="110000"/>
+                    </a:schemeClr>
+                  </a:solidFill>
+                  <a:prstDash val="solid"/>
+                </a:ln>
+                <a:gradFill>
+                  <a:gsLst>
+                    <a:gs pos="0">
+                      <a:schemeClr val="accent1">
+                        <a:tint val="40000"/>
+                        <a:satMod val="250000"/>
+                      </a:schemeClr>
+                    </a:gs>
+                    <a:gs pos="9000">
+                      <a:schemeClr val="accent1">
+                        <a:tint val="52000"/>
+                        <a:satMod val="300000"/>
+                      </a:schemeClr>
+                    </a:gs>
+                    <a:gs pos="50000">
+                      <a:schemeClr val="accent1">
+                        <a:shade val="20000"/>
+                        <a:satMod val="300000"/>
+                      </a:schemeClr>
+                    </a:gs>
+                    <a:gs pos="79000">
+                      <a:schemeClr val="accent1">
+                        <a:tint val="52000"/>
+                        <a:satMod val="300000"/>
+                      </a:schemeClr>
+                    </a:gs>
+                    <a:gs pos="100000">
+                      <a:schemeClr val="accent1">
+                        <a:tint val="40000"/>
+                        <a:satMod val="250000"/>
+                      </a:schemeClr>
+                    </a:gs>
+                  </a:gsLst>
+                  <a:lin ang="5400000"/>
+                </a:gradFill>
+                <a:effectLst/>
+              </a:rPr>
+              <a:t>Normalizar!!</a:t>
+            </a:r>
+            <a:endParaRPr lang="en-US" sz="3000" b="1" cap="none" spc="0" dirty="0">
+              <a:ln w="10541" cmpd="sng">
+                <a:solidFill>
+                  <a:schemeClr val="accent1">
+                    <a:shade val="88000"/>
+                    <a:satMod val="110000"/>
+                  </a:schemeClr>
+                </a:solidFill>
+                <a:prstDash val="solid"/>
+              </a:ln>
+              <a:gradFill>
+                <a:gsLst>
+                  <a:gs pos="0">
+                    <a:schemeClr val="accent1">
+                      <a:tint val="40000"/>
+                      <a:satMod val="250000"/>
+                    </a:schemeClr>
+                  </a:gs>
+                  <a:gs pos="9000">
+                    <a:schemeClr val="accent1">
+                      <a:tint val="52000"/>
+                      <a:satMod val="300000"/>
+                    </a:schemeClr>
+                  </a:gs>
+                  <a:gs pos="50000">
+                    <a:schemeClr val="accent1">
+                      <a:shade val="20000"/>
+                      <a:satMod val="300000"/>
+                    </a:schemeClr>
+                  </a:gs>
+                  <a:gs pos="79000">
+                    <a:schemeClr val="accent1">
+                      <a:tint val="52000"/>
+                      <a:satMod val="300000"/>
+                    </a:schemeClr>
+                  </a:gs>
+                  <a:gs pos="100000">
+                    <a:schemeClr val="accent1">
+                      <a:tint val="40000"/>
+                      <a:satMod val="250000"/>
+                    </a:schemeClr>
+                  </a:gs>
+                </a:gsLst>
+                <a:lin ang="5400000"/>
+              </a:gradFill>
+              <a:effectLst/>
+            </a:endParaRPr>
+          </a:p>
+        </p:txBody>
+      </p:sp>
+    </p:spTree>
+  </p:cSld>
+  <p:clrMapOvr>
+    <a:masterClrMapping/>
+  </p:clrMapOvr>
+  <p:timing>
+    <p:tnLst>
+      <p:par>
+        <p:cTn id="1" dur="indefinite" restart="never" nodeType="tmRoot"/>
+      </p:par>
+    </p:tnLst>
+  </p:timing>
+</p:sld>
+</file>
+
+<file path=ppt/slides/slide32.xml><?xml version="1.0" encoding="utf-8"?>
+<p:sld xmlns:a="http://schemas.openxmlformats.org/drawingml/2006/main" xmlns:r="http://schemas.openxmlformats.org/officeDocument/2006/relationships" xmlns:p="http://schemas.openxmlformats.org/presentationml/2006/main">
+  <p:cSld>
+    <p:spTree>
+      <p:nvGrpSpPr>
+        <p:cNvPr id="1" name=""/>
+        <p:cNvGrpSpPr/>
+        <p:nvPr/>
+      </p:nvGrpSpPr>
+      <p:grpSpPr>
+        <a:xfrm>
+          <a:off x="0" y="0"/>
+          <a:ext cx="0" cy="0"/>
+          <a:chOff x="0" y="0"/>
+          <a:chExt cx="0" cy="0"/>
+        </a:xfrm>
+      </p:grpSpPr>
+      <p:sp>
+        <p:nvSpPr>
+          <p:cNvPr id="2" name="Content Placeholder 1"/>
+          <p:cNvSpPr>
+            <a:spLocks noGrp="1"/>
+          </p:cNvSpPr>
+          <p:nvPr>
+            <p:ph idx="1"/>
+          </p:nvPr>
+        </p:nvSpPr>
+        <p:spPr>
+          <a:xfrm>
+            <a:off x="457200" y="1481328"/>
+            <a:ext cx="8472518" cy="4525963"/>
+          </a:xfrm>
+        </p:spPr>
+        <p:txBody>
+          <a:bodyPr>
+            <a:normAutofit/>
+          </a:bodyPr>
+          <a:lstStyle/>
+          <a:p>
+            <a:r>
+              <a:rPr lang="es-AR" dirty="0" smtClean="0"/>
+              <a:t>Etapa </a:t>
+            </a:r>
+            <a:r>
+              <a:rPr lang="es-AR" dirty="0" smtClean="0"/>
+              <a:t>4: Feature Vectors</a:t>
+            </a:r>
+          </a:p>
+          <a:p>
+            <a:endParaRPr lang="es-AR" dirty="0" smtClean="0"/>
+          </a:p>
+          <a:p>
+            <a:pPr lvl="1"/>
+            <a:r>
+              <a:rPr lang="es-AR" dirty="0" smtClean="0"/>
+              <a:t>Ordenar los autovectores por sus autovalores.</a:t>
+            </a:r>
+          </a:p>
+          <a:p>
+            <a:pPr lvl="2"/>
+            <a:r>
+              <a:rPr lang="es-AR" dirty="0" smtClean="0"/>
+              <a:t>De mayor a menor.</a:t>
+            </a:r>
+          </a:p>
+          <a:p>
+            <a:pPr lvl="2"/>
+            <a:endParaRPr lang="es-AR" dirty="0" smtClean="0"/>
+          </a:p>
+          <a:p>
+            <a:pPr lvl="1"/>
+            <a:r>
+              <a:rPr lang="es-AR" dirty="0" smtClean="0"/>
+              <a:t>Calcula los componentes en orden, de acuerdo a su importancia.</a:t>
+            </a:r>
+          </a:p>
+          <a:p>
+            <a:pPr lvl="1"/>
+            <a:endParaRPr lang="es-AR" dirty="0" smtClean="0"/>
+          </a:p>
+          <a:p>
+            <a:pPr lvl="1"/>
+            <a:r>
+              <a:rPr lang="es-AR" dirty="0" smtClean="0"/>
+              <a:t>Permite que la información sea comprimida y los vectores mas </a:t>
+            </a:r>
+            <a:r>
+              <a:rPr lang="es-AR" i="1" dirty="0" smtClean="0"/>
+              <a:t>débiles</a:t>
+            </a:r>
+            <a:r>
+              <a:rPr lang="es-AR" dirty="0" smtClean="0"/>
+              <a:t> sean removidos.</a:t>
+            </a:r>
+          </a:p>
+          <a:p>
+            <a:pPr lvl="2"/>
+            <a:r>
+              <a:rPr lang="es-AR" dirty="0" smtClean="0"/>
+              <a:t>Información perdida puede considererse “insignificante”.</a:t>
+            </a:r>
+          </a:p>
+          <a:p>
+            <a:pPr lvl="1"/>
+            <a:endParaRPr lang="es-AR" dirty="0" smtClean="0"/>
+          </a:p>
+          <a:p>
+            <a:pPr lvl="1"/>
+            <a:endParaRPr lang="es-AR" dirty="0"/>
+          </a:p>
+        </p:txBody>
+      </p:sp>
+      <p:sp>
+        <p:nvSpPr>
+          <p:cNvPr id="3" name="Title 2"/>
+          <p:cNvSpPr>
+            <a:spLocks noGrp="1"/>
+          </p:cNvSpPr>
+          <p:nvPr>
+            <p:ph type="title"/>
+          </p:nvPr>
+        </p:nvSpPr>
+        <p:spPr/>
+        <p:txBody>
+          <a:bodyPr/>
+          <a:lstStyle/>
+          <a:p>
+            <a:pPr algn="ctr"/>
+            <a:r>
+              <a:rPr lang="es-AR" dirty="0" smtClean="0"/>
+              <a:t>Principal Components</a:t>
+            </a:r>
+            <a:endParaRPr lang="es-AR" dirty="0"/>
+          </a:p>
+        </p:txBody>
+      </p:sp>
+    </p:spTree>
+  </p:cSld>
+  <p:clrMapOvr>
+    <a:masterClrMapping/>
+  </p:clrMapOvr>
+  <p:timing>
+    <p:tnLst>
+      <p:par>
+        <p:cTn id="1" dur="indefinite" restart="never" nodeType="tmRoot"/>
+      </p:par>
+    </p:tnLst>
+  </p:timing>
+</p:sld>
+</file>
+
+<file path=ppt/slides/slide33.xml><?xml version="1.0" encoding="utf-8"?>
+<p:sld xmlns:a="http://schemas.openxmlformats.org/drawingml/2006/main" xmlns:r="http://schemas.openxmlformats.org/officeDocument/2006/relationships" xmlns:p="http://schemas.openxmlformats.org/presentationml/2006/main">
+  <p:cSld>
+    <p:spTree>
+      <p:nvGrpSpPr>
+        <p:cNvPr id="1" name=""/>
+        <p:cNvGrpSpPr/>
+        <p:nvPr/>
+      </p:nvGrpSpPr>
+      <p:grpSpPr>
+        <a:xfrm>
+          <a:off x="0" y="0"/>
+          <a:ext cx="0" cy="0"/>
+          <a:chOff x="0" y="0"/>
+          <a:chExt cx="0" cy="0"/>
+        </a:xfrm>
+      </p:grpSpPr>
+      <p:sp>
+        <p:nvSpPr>
+          <p:cNvPr id="3" name="Title 2"/>
+          <p:cNvSpPr>
+            <a:spLocks noGrp="1"/>
+          </p:cNvSpPr>
+          <p:nvPr>
+            <p:ph type="title"/>
+          </p:nvPr>
+        </p:nvSpPr>
+        <p:spPr/>
+        <p:txBody>
+          <a:bodyPr/>
+          <a:lstStyle/>
+          <a:p>
+            <a:pPr algn="ctr"/>
+            <a:r>
+              <a:rPr lang="es-AR" dirty="0" smtClean="0"/>
+              <a:t>Principal Components</a:t>
+            </a:r>
+            <a:endParaRPr lang="es-AR" dirty="0"/>
+          </a:p>
+        </p:txBody>
+      </p:sp>
+      <p:pic>
+        <p:nvPicPr>
+          <p:cNvPr id="4099" name="Picture 3" descr="E:\Code\ITBA\TrabajosPracticos\doc\clase\img\ACP\Feature_vectors_ejemplo.png"/>
+          <p:cNvPicPr>
+            <a:picLocks noChangeAspect="1" noChangeArrowheads="1"/>
+          </p:cNvPicPr>
+          <p:nvPr/>
+        </p:nvPicPr>
+        <p:blipFill>
+          <a:blip r:embed="rId2"/>
+          <a:srcRect/>
+          <a:stretch>
+            <a:fillRect/>
+          </a:stretch>
+        </p:blipFill>
+        <p:spPr bwMode="auto">
+          <a:xfrm>
+            <a:off x="1214414" y="1428736"/>
+            <a:ext cx="6786610" cy="4611976"/>
+          </a:xfrm>
+          <a:prstGeom prst="rect">
+            <a:avLst/>
+          </a:prstGeom>
+          <a:noFill/>
+        </p:spPr>
+      </p:pic>
+      <p:sp>
+        <p:nvSpPr>
+          <p:cNvPr id="8" name="Frame 7"/>
+          <p:cNvSpPr/>
+          <p:nvPr/>
+        </p:nvSpPr>
+        <p:spPr>
+          <a:xfrm>
+            <a:off x="1142976" y="4643446"/>
+            <a:ext cx="6929486" cy="1428760"/>
+          </a:xfrm>
+          <a:prstGeom prst="frame">
+            <a:avLst/>
+          </a:prstGeom>
+        </p:spPr>
+        <p:style>
+          <a:lnRef idx="2">
+            <a:schemeClr val="accent2"/>
+          </a:lnRef>
+          <a:fillRef idx="1">
+            <a:schemeClr val="lt1"/>
+          </a:fillRef>
+          <a:effectRef idx="0">
+            <a:schemeClr val="accent2"/>
+          </a:effectRef>
+          <a:fontRef idx="minor">
+            <a:schemeClr val="dk1"/>
+          </a:fontRef>
+        </p:style>
+        <p:txBody>
+          <a:bodyPr rtlCol="0" anchor="ctr"/>
+          <a:lstStyle/>
+          <a:p>
+            <a:pPr algn="ctr"/>
+            <a:endParaRPr lang="es-AR">
+              <a:solidFill>
+                <a:schemeClr val="tx1"/>
+              </a:solidFill>
+            </a:endParaRPr>
+          </a:p>
+        </p:txBody>
+      </p:sp>
+    </p:spTree>
+  </p:cSld>
+  <p:clrMapOvr>
+    <a:masterClrMapping/>
+  </p:clrMapOvr>
+</p:sld>
+</file>
+
+<file path=ppt/slides/slide34.xml><?xml version="1.0" encoding="utf-8"?>
+<p:sld xmlns:a="http://schemas.openxmlformats.org/drawingml/2006/main" xmlns:r="http://schemas.openxmlformats.org/officeDocument/2006/relationships" xmlns:p="http://schemas.openxmlformats.org/presentationml/2006/main">
+  <p:cSld>
+    <p:spTree>
+      <p:nvGrpSpPr>
+        <p:cNvPr id="1" name=""/>
+        <p:cNvGrpSpPr/>
+        <p:nvPr/>
+      </p:nvGrpSpPr>
+      <p:grpSpPr>
+        <a:xfrm>
+          <a:off x="0" y="0"/>
+          <a:ext cx="0" cy="0"/>
+          <a:chOff x="0" y="0"/>
+          <a:chExt cx="0" cy="0"/>
+        </a:xfrm>
+      </p:grpSpPr>
+      <p:sp>
+        <p:nvSpPr>
+          <p:cNvPr id="2" name="Content Placeholder 1"/>
+          <p:cNvSpPr>
+            <a:spLocks noGrp="1"/>
+          </p:cNvSpPr>
+          <p:nvPr>
+            <p:ph idx="1"/>
+          </p:nvPr>
+        </p:nvSpPr>
+        <p:spPr/>
+        <p:txBody>
+          <a:bodyPr/>
+          <a:lstStyle/>
+          <a:p>
+            <a:r>
+              <a:rPr lang="es-AR" dirty="0" smtClean="0"/>
+              <a:t>Etapa 5: Trasposición</a:t>
+            </a:r>
+          </a:p>
+          <a:p>
+            <a:endParaRPr lang="es-AR" dirty="0" smtClean="0"/>
+          </a:p>
+          <a:p>
+            <a:pPr lvl="1"/>
+            <a:r>
+              <a:rPr lang="es-AR" dirty="0" smtClean="0"/>
+              <a:t>La última etapa en A.C.P. es tomar la traspuesta del </a:t>
+            </a:r>
+            <a:r>
+              <a:rPr lang="es-AR" i="1" dirty="0" smtClean="0"/>
+              <a:t>feature vector</a:t>
+            </a:r>
+            <a:r>
+              <a:rPr lang="es-AR" dirty="0" smtClean="0"/>
+              <a:t> y multiplicarlo por la traspuesta de cada matriz de datos (la matriz ajustada en la primera etapa).</a:t>
+            </a:r>
+            <a:endParaRPr lang="es-AR" dirty="0"/>
+          </a:p>
+        </p:txBody>
+      </p:sp>
+      <p:sp>
+        <p:nvSpPr>
+          <p:cNvPr id="3" name="Title 2"/>
+          <p:cNvSpPr>
+            <a:spLocks noGrp="1"/>
+          </p:cNvSpPr>
+          <p:nvPr>
+            <p:ph type="title"/>
+          </p:nvPr>
+        </p:nvSpPr>
+        <p:spPr/>
+        <p:txBody>
+          <a:bodyPr/>
+          <a:lstStyle/>
+          <a:p>
+            <a:pPr algn="ctr"/>
+            <a:r>
+              <a:rPr lang="es-AR" dirty="0" smtClean="0"/>
+              <a:t>Principal Components</a:t>
+            </a:r>
+            <a:endParaRPr lang="es-AR" dirty="0"/>
+          </a:p>
+        </p:txBody>
+      </p:sp>
+    </p:spTree>
+  </p:cSld>
+  <p:clrMapOvr>
+    <a:masterClrMapping/>
+  </p:clrMapOvr>
+</p:sld>
+</file>
+
+<file path=ppt/slides/slide35.xml><?xml version="1.0" encoding="utf-8"?>
+<p:sld xmlns:a="http://schemas.openxmlformats.org/drawingml/2006/main" xmlns:r="http://schemas.openxmlformats.org/officeDocument/2006/relationships" xmlns:p="http://schemas.openxmlformats.org/presentationml/2006/main">
+  <p:cSld>
+    <p:spTree>
+      <p:nvGrpSpPr>
+        <p:cNvPr id="1" name=""/>
+        <p:cNvGrpSpPr/>
+        <p:nvPr/>
+      </p:nvGrpSpPr>
+      <p:grpSpPr>
+        <a:xfrm>
+          <a:off x="0" y="0"/>
+          <a:ext cx="0" cy="0"/>
+          <a:chOff x="0" y="0"/>
+          <a:chExt cx="0" cy="0"/>
+        </a:xfrm>
+      </p:grpSpPr>
+      <p:sp>
+        <p:nvSpPr>
+          <p:cNvPr id="2" name="Content Placeholder 1"/>
+          <p:cNvSpPr>
+            <a:spLocks noGrp="1"/>
+          </p:cNvSpPr>
+          <p:nvPr>
+            <p:ph idx="1"/>
+          </p:nvPr>
+        </p:nvSpPr>
+        <p:spPr/>
+        <p:txBody>
+          <a:bodyPr/>
+          <a:lstStyle/>
+          <a:p>
+            <a:r>
+              <a:rPr lang="es-AR" dirty="0" smtClean="0"/>
+              <a:t>Luego de calculados los vectores por cada imagen, se presentan en la </a:t>
+            </a:r>
+            <a:r>
+              <a:rPr lang="es-AR" i="1" dirty="0" smtClean="0"/>
+              <a:t>red </a:t>
+            </a:r>
+            <a:r>
+              <a:rPr lang="es-AR" i="1" smtClean="0"/>
+              <a:t>neuronal</a:t>
+            </a:r>
+            <a:r>
+              <a:rPr lang="es-AR" smtClean="0"/>
+              <a:t>  y </a:t>
+            </a:r>
+            <a:r>
+              <a:rPr lang="es-AR" dirty="0" smtClean="0"/>
+              <a:t>esta se fija si concuerda </a:t>
+            </a:r>
+            <a:r>
+              <a:rPr lang="es-AR" smtClean="0"/>
+              <a:t>con algúno de los ejemplos aprendidos con aterioridad.</a:t>
+            </a:r>
+            <a:endParaRPr lang="es-AR" dirty="0"/>
+          </a:p>
+        </p:txBody>
+      </p:sp>
+      <p:sp>
+        <p:nvSpPr>
+          <p:cNvPr id="3" name="Title 2"/>
+          <p:cNvSpPr>
+            <a:spLocks noGrp="1"/>
+          </p:cNvSpPr>
+          <p:nvPr>
+            <p:ph type="title"/>
+          </p:nvPr>
+        </p:nvSpPr>
+        <p:spPr/>
+        <p:txBody>
+          <a:bodyPr/>
+          <a:lstStyle/>
+          <a:p>
+            <a:pPr algn="ctr"/>
+            <a:r>
+              <a:rPr lang="es-AR" dirty="0" smtClean="0"/>
+              <a:t>Principal Components</a:t>
+            </a:r>
+            <a:endParaRPr lang="es-AR" dirty="0"/>
+          </a:p>
+        </p:txBody>
+      </p:sp>
+    </p:spTree>
+  </p:cSld>
+  <p:clrMapOvr>
+    <a:masterClrMapping/>
+  </p:clrMapOvr>
+</p:sld>
+</file>
+
+<file path=ppt/slides/slide36.xml><?xml version="1.0" encoding="utf-8"?>
+<p:sld xmlns:a="http://schemas.openxmlformats.org/drawingml/2006/main" xmlns:r="http://schemas.openxmlformats.org/officeDocument/2006/relationships" xmlns:p="http://schemas.openxmlformats.org/presentationml/2006/main">
+  <p:cSld>
+    <p:spTree>
+      <p:nvGrpSpPr>
+        <p:cNvPr id="1" name=""/>
+        <p:cNvGrpSpPr/>
+        <p:nvPr/>
+      </p:nvGrpSpPr>
+      <p:grpSpPr>
+        <a:xfrm>
+          <a:off x="0" y="0"/>
+          <a:ext cx="0" cy="0"/>
+          <a:chOff x="0" y="0"/>
+          <a:chExt cx="0" cy="0"/>
+        </a:xfrm>
+      </p:grpSpPr>
+      <p:sp>
+        <p:nvSpPr>
+          <p:cNvPr id="2" name="Content Placeholder 1"/>
+          <p:cNvSpPr>
+            <a:spLocks noGrp="1"/>
+          </p:cNvSpPr>
+          <p:nvPr>
+            <p:ph idx="1"/>
+          </p:nvPr>
+        </p:nvSpPr>
+        <p:spPr/>
+        <p:txBody>
+          <a:bodyPr/>
+          <a:lstStyle/>
+          <a:p>
+            <a:endParaRPr lang="es-AR"/>
+          </a:p>
+        </p:txBody>
+      </p:sp>
+      <p:sp>
+        <p:nvSpPr>
+          <p:cNvPr id="3" name="Title 2"/>
+          <p:cNvSpPr>
+            <a:spLocks noGrp="1"/>
+          </p:cNvSpPr>
+          <p:nvPr>
+            <p:ph type="title"/>
+          </p:nvPr>
+        </p:nvSpPr>
+        <p:spPr/>
+        <p:txBody>
+          <a:bodyPr/>
+          <a:lstStyle/>
+          <a:p>
+            <a:pPr algn="ctr"/>
+            <a:r>
+              <a:rPr lang="es-AR" dirty="0" smtClean="0"/>
+              <a:t>Principal Components</a:t>
             </a:r>
             <a:endParaRPr lang="es-AR" dirty="0"/>
           </a:p>
@@ -11976,19 +13307,11 @@
             <a:pPr lvl="1"/>
             <a:r>
               <a:rPr lang="es-AR" dirty="0" smtClean="0"/>
-              <a:t>Análisis </a:t>
-            </a:r>
-            <a:r>
-              <a:rPr lang="es-AR" dirty="0" smtClean="0"/>
-              <a:t>de </a:t>
+              <a:t>Análisis de </a:t>
             </a:r>
             <a:r>
               <a:rPr lang="es-AR" b="1" dirty="0" smtClean="0"/>
-              <a:t>componentes </a:t>
-            </a:r>
-            <a:r>
-              <a:rPr lang="es-AR" b="1" dirty="0" smtClean="0"/>
-              <a:t>principales.</a:t>
+              <a:t>componentes principales.</a:t>
             </a:r>
           </a:p>
           <a:p>
@@ -12207,50 +13530,6 @@
       </p:grpSpPr>
       <p:sp>
         <p:nvSpPr>
-          <p:cNvPr id="2" name="Content Placeholder 1"/>
-          <p:cNvSpPr>
-            <a:spLocks noGrp="1"/>
-          </p:cNvSpPr>
-          <p:nvPr>
-            <p:ph idx="1"/>
-          </p:nvPr>
-        </p:nvSpPr>
-        <p:spPr/>
-        <p:txBody>
-          <a:bodyPr/>
-          <a:lstStyle/>
-          <a:p>
-            <a:endParaRPr lang="es-AR" dirty="0" smtClean="0"/>
-          </a:p>
-          <a:p>
-            <a:r>
-              <a:rPr lang="es-AR" dirty="0" smtClean="0"/>
-              <a:t>Entrada: imagen a color con 3 componentes por color (RGB)</a:t>
-            </a:r>
-          </a:p>
-          <a:p>
-            <a:endParaRPr lang="es-AR" dirty="0" smtClean="0"/>
-          </a:p>
-          <a:p>
-            <a:r>
-              <a:rPr lang="es-AR" dirty="0" smtClean="0"/>
-              <a:t>Convierte la imagen a escala de 256 tonos de grises.</a:t>
-            </a:r>
-          </a:p>
-          <a:p>
-            <a:endParaRPr lang="es-AR" dirty="0" smtClean="0"/>
-          </a:p>
-          <a:p>
-            <a:r>
-              <a:rPr lang="es-AR" dirty="0" smtClean="0"/>
-              <a:t>Enfatiza detalles del carccter y facilita el procesamiento de la imagen.</a:t>
-            </a:r>
-            <a:endParaRPr lang="es-AR" dirty="0"/>
-          </a:p>
-        </p:txBody>
-      </p:sp>
-      <p:sp>
-        <p:nvSpPr>
           <p:cNvPr id="3" name="Title 2"/>
           <p:cNvSpPr>
             <a:spLocks noGrp="1"/>
@@ -12264,15 +13543,41 @@
           <a:bodyPr/>
           <a:lstStyle/>
           <a:p>
-            <a:pPr lvl="0" algn="ctr"/>
+            <a:pPr algn="ctr"/>
             <a:r>
               <a:rPr lang="es-AR" dirty="0" smtClean="0"/>
-              <a:t>Filtration and Binaryzation</a:t>
+              <a:t>Propuesta</a:t>
             </a:r>
             <a:endParaRPr lang="es-AR" dirty="0"/>
           </a:p>
         </p:txBody>
       </p:sp>
+      <p:pic>
+        <p:nvPicPr>
+          <p:cNvPr id="1026" name="Picture 2" descr="E:\Code\ITBA\TrabajosPracticos\doc\clase\img\esquema__principal.png"/>
+          <p:cNvPicPr>
+            <a:picLocks noChangeAspect="1" noChangeArrowheads="1"/>
+          </p:cNvPicPr>
+          <p:nvPr/>
+        </p:nvPicPr>
+        <p:blipFill>
+          <a:blip r:embed="rId2"/>
+          <a:srcRect/>
+          <a:stretch>
+            <a:fillRect/>
+          </a:stretch>
+        </p:blipFill>
+        <p:spPr bwMode="auto">
+          <a:xfrm>
+            <a:off x="714348" y="1857364"/>
+            <a:ext cx="7565624" cy="3714776"/>
+          </a:xfrm>
+          <a:prstGeom prst="rect">
+            <a:avLst/>
+          </a:prstGeom>
+          <a:noFill/>
+        </p:spPr>
+      </p:pic>
     </p:spTree>
   </p:cSld>
   <p:clrMapOvr>
@@ -12313,9 +13618,12 @@
           <a:bodyPr/>
           <a:lstStyle/>
           <a:p>
+            <a:endParaRPr lang="es-AR" dirty="0" smtClean="0"/>
+          </a:p>
+          <a:p>
             <a:r>
               <a:rPr lang="es-AR" dirty="0" smtClean="0"/>
-              <a:t>El filtrado se obtiene aplicando la operación de convolución sobre la matriz de la imagen.</a:t>
+              <a:t>Entrada: imagen a color con 3 componentes por color (RGB)</a:t>
             </a:r>
           </a:p>
           <a:p>
@@ -12324,26 +13632,18 @@
           <a:p>
             <a:r>
               <a:rPr lang="es-AR" dirty="0" smtClean="0"/>
-              <a:t>Al finalizar esta etapa se logra reducir el ruido en la lectura de la imagen</a:t>
-            </a:r>
-          </a:p>
-          <a:p>
-            <a:pPr lvl="1"/>
+              <a:t>Convierte la imagen a escala de 256 tonos de grises.</a:t>
+            </a:r>
+          </a:p>
+          <a:p>
+            <a:endParaRPr lang="es-AR" dirty="0" smtClean="0"/>
+          </a:p>
+          <a:p>
             <a:r>
               <a:rPr lang="es-AR" dirty="0" smtClean="0"/>
-              <a:t>Pequeñas manchas en el papel</a:t>
-            </a:r>
-          </a:p>
-          <a:p>
-            <a:pPr lvl="1"/>
-            <a:r>
-              <a:rPr lang="es-AR" dirty="0" smtClean="0"/>
-              <a:t>Sombras</a:t>
-            </a:r>
-          </a:p>
-          <a:p>
-            <a:pPr lvl="1"/>
-            <a:endParaRPr lang="es-AR" dirty="0" smtClean="0"/>
+              <a:t>Enfatiza detalles del carccter y facilita el procesamiento de la imagen.</a:t>
+            </a:r>
+            <a:endParaRPr lang="es-AR" dirty="0"/>
           </a:p>
         </p:txBody>
       </p:sp>
@@ -12362,7 +13662,7 @@
           <a:bodyPr/>
           <a:lstStyle/>
           <a:p>
-            <a:pPr algn="ctr"/>
+            <a:pPr lvl="0" algn="ctr"/>
             <a:r>
               <a:rPr lang="es-AR" dirty="0" smtClean="0"/>
               <a:t>Filtration and Binaryzation</a:t>
@@ -12376,13 +13676,6 @@
   <p:clrMapOvr>
     <a:masterClrMapping/>
   </p:clrMapOvr>
-  <p:timing>
-    <p:tnLst>
-      <p:par>
-        <p:cTn id="1" dur="indefinite" restart="never" nodeType="tmRoot"/>
-      </p:par>
-    </p:tnLst>
-  </p:timing>
 </p:sld>
 </file>
 
@@ -12420,7 +13713,7 @@
           <a:p>
             <a:r>
               <a:rPr lang="es-AR" dirty="0" smtClean="0"/>
-              <a:t>La imagen puede ser limpiada tanto como uno desee, pero el tamaño es un problema mayor.</a:t>
+              <a:t>El filtrado se obtiene aplicando la operación de convolución sobre la matriz de la imagen.</a:t>
             </a:r>
           </a:p>
           <a:p>
@@ -12429,11 +13722,26 @@
           <a:p>
             <a:r>
               <a:rPr lang="es-AR" dirty="0" smtClean="0"/>
-              <a:t>Esta etapa consiste en rotar, trasladar y redimensionar el caracter en cuestion.</a:t>
-            </a:r>
-          </a:p>
-          <a:p>
-            <a:endParaRPr lang="es-AR" dirty="0"/>
+              <a:t>Al finalizar esta etapa se logra reducir el ruido en la lectura de la imagen</a:t>
+            </a:r>
+          </a:p>
+          <a:p>
+            <a:pPr lvl="1"/>
+            <a:r>
+              <a:rPr lang="es-AR" dirty="0" smtClean="0"/>
+              <a:t>Pequeñas manchas en el papel</a:t>
+            </a:r>
+          </a:p>
+          <a:p>
+            <a:pPr lvl="1"/>
+            <a:r>
+              <a:rPr lang="es-AR" dirty="0" smtClean="0"/>
+              <a:t>Sombras</a:t>
+            </a:r>
+          </a:p>
+          <a:p>
+            <a:pPr lvl="1"/>
+            <a:endParaRPr lang="es-AR" dirty="0" smtClean="0"/>
           </a:p>
         </p:txBody>
       </p:sp>
@@ -12455,7 +13763,7 @@
             <a:pPr algn="ctr"/>
             <a:r>
               <a:rPr lang="es-AR" dirty="0" smtClean="0"/>
-              <a:t>Normalization</a:t>
+              <a:t>Filtration and Binaryzation</a:t>
             </a:r>
             <a:endParaRPr lang="es-AR" dirty="0"/>
           </a:p>

</xml_diff>

<commit_message>
termino clase oral y casi casi tp6
</commit_message>
<xml_diff>
--- a/doc/clase/presentacion.pptx
+++ b/doc/clase/presentacion.pptx
@@ -11,45 +11,46 @@
     <p:sldId id="260" r:id="rId5"/>
     <p:sldId id="259" r:id="rId6"/>
     <p:sldId id="261" r:id="rId7"/>
-    <p:sldId id="263" r:id="rId8"/>
-    <p:sldId id="271" r:id="rId9"/>
-    <p:sldId id="270" r:id="rId10"/>
-    <p:sldId id="262" r:id="rId11"/>
-    <p:sldId id="264" r:id="rId12"/>
-    <p:sldId id="265" r:id="rId13"/>
-    <p:sldId id="266" r:id="rId14"/>
-    <p:sldId id="272" r:id="rId15"/>
-    <p:sldId id="267" r:id="rId16"/>
-    <p:sldId id="273" r:id="rId17"/>
-    <p:sldId id="279" r:id="rId18"/>
-    <p:sldId id="274" r:id="rId19"/>
-    <p:sldId id="277" r:id="rId20"/>
-    <p:sldId id="278" r:id="rId21"/>
-    <p:sldId id="275" r:id="rId22"/>
-    <p:sldId id="276" r:id="rId23"/>
-    <p:sldId id="294" r:id="rId24"/>
-    <p:sldId id="289" r:id="rId25"/>
-    <p:sldId id="290" r:id="rId26"/>
-    <p:sldId id="291" r:id="rId27"/>
-    <p:sldId id="292" r:id="rId28"/>
-    <p:sldId id="287" r:id="rId29"/>
-    <p:sldId id="283" r:id="rId30"/>
-    <p:sldId id="285" r:id="rId31"/>
-    <p:sldId id="293" r:id="rId32"/>
-    <p:sldId id="295" r:id="rId33"/>
-    <p:sldId id="296" r:id="rId34"/>
-    <p:sldId id="297" r:id="rId35"/>
-    <p:sldId id="298" r:id="rId36"/>
-    <p:sldId id="299" r:id="rId37"/>
-    <p:sldId id="300" r:id="rId38"/>
-    <p:sldId id="301" r:id="rId39"/>
-    <p:sldId id="302" r:id="rId40"/>
-    <p:sldId id="305" r:id="rId41"/>
-    <p:sldId id="307" r:id="rId42"/>
-    <p:sldId id="303" r:id="rId43"/>
-    <p:sldId id="304" r:id="rId44"/>
-    <p:sldId id="306" r:id="rId45"/>
-    <p:sldId id="308" r:id="rId46"/>
+    <p:sldId id="309" r:id="rId8"/>
+    <p:sldId id="263" r:id="rId9"/>
+    <p:sldId id="271" r:id="rId10"/>
+    <p:sldId id="270" r:id="rId11"/>
+    <p:sldId id="262" r:id="rId12"/>
+    <p:sldId id="264" r:id="rId13"/>
+    <p:sldId id="265" r:id="rId14"/>
+    <p:sldId id="266" r:id="rId15"/>
+    <p:sldId id="272" r:id="rId16"/>
+    <p:sldId id="267" r:id="rId17"/>
+    <p:sldId id="273" r:id="rId18"/>
+    <p:sldId id="279" r:id="rId19"/>
+    <p:sldId id="274" r:id="rId20"/>
+    <p:sldId id="277" r:id="rId21"/>
+    <p:sldId id="278" r:id="rId22"/>
+    <p:sldId id="275" r:id="rId23"/>
+    <p:sldId id="276" r:id="rId24"/>
+    <p:sldId id="294" r:id="rId25"/>
+    <p:sldId id="289" r:id="rId26"/>
+    <p:sldId id="290" r:id="rId27"/>
+    <p:sldId id="291" r:id="rId28"/>
+    <p:sldId id="292" r:id="rId29"/>
+    <p:sldId id="287" r:id="rId30"/>
+    <p:sldId id="283" r:id="rId31"/>
+    <p:sldId id="285" r:id="rId32"/>
+    <p:sldId id="293" r:id="rId33"/>
+    <p:sldId id="295" r:id="rId34"/>
+    <p:sldId id="296" r:id="rId35"/>
+    <p:sldId id="297" r:id="rId36"/>
+    <p:sldId id="298" r:id="rId37"/>
+    <p:sldId id="299" r:id="rId38"/>
+    <p:sldId id="300" r:id="rId39"/>
+    <p:sldId id="301" r:id="rId40"/>
+    <p:sldId id="302" r:id="rId41"/>
+    <p:sldId id="305" r:id="rId42"/>
+    <p:sldId id="307" r:id="rId43"/>
+    <p:sldId id="303" r:id="rId44"/>
+    <p:sldId id="304" r:id="rId45"/>
+    <p:sldId id="306" r:id="rId46"/>
+    <p:sldId id="308" r:id="rId47"/>
   </p:sldIdLst>
   <p:sldSz cx="9144000" cy="6858000" type="screen4x3"/>
   <p:notesSz cx="6858000" cy="9144000"/>
@@ -9470,14 +9471,38 @@
           <a:p>
             <a:r>
               <a:rPr lang="es-ES" dirty="0" smtClean="0"/>
-              <a:t>Trabajo practico Especial</a:t>
+              <a:t>Trabajo </a:t>
+            </a:r>
+            <a:r>
+              <a:rPr lang="es-ES" dirty="0" smtClean="0"/>
+              <a:t>práctico Especi</a:t>
+            </a:r>
+            <a:r>
+              <a:rPr lang="es-AR" dirty="0" smtClean="0"/>
+              <a:t>a</a:t>
+            </a:r>
+            <a:r>
+              <a:rPr lang="es-ES" dirty="0" smtClean="0"/>
+              <a:t>l</a:t>
+            </a:r>
+            <a:r>
+              <a:rPr lang="es-ES" dirty="0" smtClean="0"/>
+              <a:t/>
             </a:r>
             <a:br>
               <a:rPr lang="es-ES" dirty="0" smtClean="0"/>
             </a:br>
             <a:r>
               <a:rPr lang="es-ES" dirty="0" smtClean="0"/>
-              <a:t>Aprendizaje autmatico</a:t>
+              <a:t>Aprendizaje </a:t>
+            </a:r>
+            <a:r>
+              <a:rPr lang="es-ES" dirty="0" smtClean="0"/>
+              <a:t>autmático</a:t>
+            </a:r>
+            <a:r>
+              <a:rPr lang="es-ES" dirty="0" smtClean="0"/>
+              <a:t/>
             </a:r>
             <a:br>
               <a:rPr lang="es-ES" dirty="0" smtClean="0"/>
@@ -9525,6 +9550,96 @@
 </file>
 
 <file path=ppt/slides/slide10.xml><?xml version="1.0" encoding="utf-8"?>
+<p:sld xmlns:a="http://schemas.openxmlformats.org/drawingml/2006/main" xmlns:r="http://schemas.openxmlformats.org/officeDocument/2006/relationships" xmlns:p="http://schemas.openxmlformats.org/presentationml/2006/main">
+  <p:cSld>
+    <p:spTree>
+      <p:nvGrpSpPr>
+        <p:cNvPr id="1" name=""/>
+        <p:cNvGrpSpPr/>
+        <p:nvPr/>
+      </p:nvGrpSpPr>
+      <p:grpSpPr>
+        <a:xfrm>
+          <a:off x="0" y="0"/>
+          <a:ext cx="0" cy="0"/>
+          <a:chOff x="0" y="0"/>
+          <a:chExt cx="0" cy="0"/>
+        </a:xfrm>
+      </p:grpSpPr>
+      <p:sp>
+        <p:nvSpPr>
+          <p:cNvPr id="2" name="Content Placeholder 1"/>
+          <p:cNvSpPr>
+            <a:spLocks noGrp="1"/>
+          </p:cNvSpPr>
+          <p:nvPr>
+            <p:ph idx="1"/>
+          </p:nvPr>
+        </p:nvSpPr>
+        <p:spPr/>
+        <p:txBody>
+          <a:bodyPr/>
+          <a:lstStyle/>
+          <a:p>
+            <a:r>
+              <a:rPr lang="es-AR" dirty="0" smtClean="0"/>
+              <a:t>La imagen puede ser limpiada tanto como uno desee, pero el tamaño es un problema mayor.</a:t>
+            </a:r>
+          </a:p>
+          <a:p>
+            <a:endParaRPr lang="es-AR" dirty="0" smtClean="0"/>
+          </a:p>
+          <a:p>
+            <a:r>
+              <a:rPr lang="es-AR" dirty="0" smtClean="0"/>
+              <a:t>Esta etapa consiste en rotar, trasladar y redimensionar el caracter en cuestion.</a:t>
+            </a:r>
+          </a:p>
+          <a:p>
+            <a:endParaRPr lang="es-AR" dirty="0"/>
+          </a:p>
+        </p:txBody>
+      </p:sp>
+      <p:sp>
+        <p:nvSpPr>
+          <p:cNvPr id="3" name="Title 2"/>
+          <p:cNvSpPr>
+            <a:spLocks noGrp="1"/>
+          </p:cNvSpPr>
+          <p:nvPr>
+            <p:ph type="title"/>
+          </p:nvPr>
+        </p:nvSpPr>
+        <p:spPr/>
+        <p:txBody>
+          <a:bodyPr/>
+          <a:lstStyle/>
+          <a:p>
+            <a:pPr algn="ctr"/>
+            <a:r>
+              <a:rPr lang="es-AR" dirty="0" smtClean="0"/>
+              <a:t>Normalization</a:t>
+            </a:r>
+            <a:endParaRPr lang="es-AR" dirty="0"/>
+          </a:p>
+        </p:txBody>
+      </p:sp>
+    </p:spTree>
+  </p:cSld>
+  <p:clrMapOvr>
+    <a:masterClrMapping/>
+  </p:clrMapOvr>
+  <p:timing>
+    <p:tnLst>
+      <p:par>
+        <p:cTn id="1" dur="indefinite" restart="never" nodeType="tmRoot"/>
+      </p:par>
+    </p:tnLst>
+  </p:timing>
+</p:sld>
+</file>
+
+<file path=ppt/slides/slide11.xml><?xml version="1.0" encoding="utf-8"?>
 <p:sld xmlns:a="http://schemas.openxmlformats.org/drawingml/2006/main" xmlns:r="http://schemas.openxmlformats.org/officeDocument/2006/relationships" xmlns:p="http://schemas.openxmlformats.org/presentationml/2006/main">
   <p:cSld>
     <p:spTree>
@@ -9685,7 +9800,7 @@
 </p:sld>
 </file>
 
-<file path=ppt/slides/slide11.xml><?xml version="1.0" encoding="utf-8"?>
+<file path=ppt/slides/slide12.xml><?xml version="1.0" encoding="utf-8"?>
 <p:sld xmlns:a="http://schemas.openxmlformats.org/drawingml/2006/main" xmlns:r="http://schemas.openxmlformats.org/officeDocument/2006/relationships" xmlns:p="http://schemas.openxmlformats.org/presentationml/2006/main">
   <p:cSld>
     <p:spTree>
@@ -9772,7 +9887,7 @@
 </p:sld>
 </file>
 
-<file path=ppt/slides/slide12.xml><?xml version="1.0" encoding="utf-8"?>
+<file path=ppt/slides/slide13.xml><?xml version="1.0" encoding="utf-8"?>
 <p:sld xmlns:a="http://schemas.openxmlformats.org/drawingml/2006/main" xmlns:r="http://schemas.openxmlformats.org/officeDocument/2006/relationships" xmlns:p="http://schemas.openxmlformats.org/presentationml/2006/main">
   <p:cSld>
     <p:spTree>
@@ -9926,7 +10041,7 @@
 </p:sld>
 </file>
 
-<file path=ppt/slides/slide13.xml><?xml version="1.0" encoding="utf-8"?>
+<file path=ppt/slides/slide14.xml><?xml version="1.0" encoding="utf-8"?>
 <p:sld xmlns:a="http://schemas.openxmlformats.org/drawingml/2006/main" xmlns:r="http://schemas.openxmlformats.org/officeDocument/2006/relationships" xmlns:p="http://schemas.openxmlformats.org/presentationml/2006/main">
   <p:cSld>
     <p:spTree>
@@ -10005,7 +10120,7 @@
 </p:sld>
 </file>
 
-<file path=ppt/slides/slide14.xml><?xml version="1.0" encoding="utf-8"?>
+<file path=ppt/slides/slide15.xml><?xml version="1.0" encoding="utf-8"?>
 <p:sld xmlns:a="http://schemas.openxmlformats.org/drawingml/2006/main" xmlns:r="http://schemas.openxmlformats.org/officeDocument/2006/relationships" xmlns:p="http://schemas.openxmlformats.org/presentationml/2006/main">
   <p:cSld>
     <p:spTree>
@@ -10109,7 +10224,7 @@
 </p:sld>
 </file>
 
-<file path=ppt/slides/slide15.xml><?xml version="1.0" encoding="utf-8"?>
+<file path=ppt/slides/slide16.xml><?xml version="1.0" encoding="utf-8"?>
 <p:sld xmlns:a="http://schemas.openxmlformats.org/drawingml/2006/main" xmlns:r="http://schemas.openxmlformats.org/officeDocument/2006/relationships" xmlns:p="http://schemas.openxmlformats.org/presentationml/2006/main">
   <p:cSld>
     <p:spTree>
@@ -10356,130 +10471,6 @@
 </p:sld>
 </file>
 
-<file path=ppt/slides/slide16.xml><?xml version="1.0" encoding="utf-8"?>
-<p:sld xmlns:a="http://schemas.openxmlformats.org/drawingml/2006/main" xmlns:r="http://schemas.openxmlformats.org/officeDocument/2006/relationships" xmlns:p="http://schemas.openxmlformats.org/presentationml/2006/main">
-  <p:cSld>
-    <p:spTree>
-      <p:nvGrpSpPr>
-        <p:cNvPr id="1" name=""/>
-        <p:cNvGrpSpPr/>
-        <p:nvPr/>
-      </p:nvGrpSpPr>
-      <p:grpSpPr>
-        <a:xfrm>
-          <a:off x="0" y="0"/>
-          <a:ext cx="0" cy="0"/>
-          <a:chOff x="0" y="0"/>
-          <a:chExt cx="0" cy="0"/>
-        </a:xfrm>
-      </p:grpSpPr>
-      <p:sp>
-        <p:nvSpPr>
-          <p:cNvPr id="2" name="Content Placeholder 1"/>
-          <p:cNvSpPr>
-            <a:spLocks noGrp="1"/>
-          </p:cNvSpPr>
-          <p:nvPr>
-            <p:ph idx="1"/>
-          </p:nvPr>
-        </p:nvSpPr>
-        <p:spPr/>
-        <p:txBody>
-          <a:bodyPr/>
-          <a:lstStyle/>
-          <a:p>
-            <a:r>
-              <a:rPr lang="es-AR" dirty="0" smtClean="0"/>
-              <a:t>Habilidad para extraer lineas a partir de imágenes </a:t>
-            </a:r>
-            <a:r>
-              <a:rPr lang="es-AR" i="1" dirty="0" smtClean="0"/>
-              <a:t>muy </a:t>
-            </a:r>
-            <a:r>
-              <a:rPr lang="es-AR" dirty="0" smtClean="0"/>
-              <a:t>ruidosas</a:t>
-            </a:r>
-            <a:r>
-              <a:rPr lang="es-AR" i="1" dirty="0" smtClean="0"/>
-              <a:t>.</a:t>
-            </a:r>
-          </a:p>
-          <a:p>
-            <a:pPr lvl="1"/>
-            <a:r>
-              <a:rPr lang="es-AR" dirty="0" smtClean="0"/>
-              <a:t>Caracteres manuscritos podrían considerarse muy ruidosos.</a:t>
-            </a:r>
-          </a:p>
-          <a:p>
-            <a:pPr lvl="1"/>
-            <a:endParaRPr lang="es-AR" dirty="0" smtClean="0"/>
-          </a:p>
-          <a:p>
-            <a:r>
-              <a:rPr lang="es-AR" dirty="0" smtClean="0"/>
-              <a:t>Se puede computar la tranformación </a:t>
-            </a:r>
-            <a:r>
-              <a:rPr lang="es-AR" i="1" dirty="0" smtClean="0"/>
-              <a:t>Radon </a:t>
-            </a:r>
-            <a:r>
-              <a:rPr lang="es-AR" dirty="0" smtClean="0"/>
-              <a:t>de cualquier imagen rotada, trasladada o escalada sabiendo su tranformación </a:t>
-            </a:r>
-            <a:r>
-              <a:rPr lang="es-AR" i="1" dirty="0" smtClean="0"/>
-              <a:t>Radon</a:t>
-            </a:r>
-            <a:r>
-              <a:rPr lang="es-AR" dirty="0" smtClean="0"/>
-              <a:t> original.</a:t>
-            </a:r>
-            <a:endParaRPr lang="es-AR" i="1" dirty="0"/>
-          </a:p>
-        </p:txBody>
-      </p:sp>
-      <p:sp>
-        <p:nvSpPr>
-          <p:cNvPr id="3" name="Title 2"/>
-          <p:cNvSpPr>
-            <a:spLocks noGrp="1"/>
-          </p:cNvSpPr>
-          <p:nvPr>
-            <p:ph type="title"/>
-          </p:nvPr>
-        </p:nvSpPr>
-        <p:spPr/>
-        <p:txBody>
-          <a:bodyPr/>
-          <a:lstStyle/>
-          <a:p>
-            <a:pPr algn="ctr"/>
-            <a:r>
-              <a:rPr lang="es-AR" dirty="0" smtClean="0"/>
-              <a:t>Radon Transform – Porque?</a:t>
-            </a:r>
-            <a:endParaRPr lang="es-AR" dirty="0"/>
-          </a:p>
-        </p:txBody>
-      </p:sp>
-    </p:spTree>
-  </p:cSld>
-  <p:clrMapOvr>
-    <a:masterClrMapping/>
-  </p:clrMapOvr>
-  <p:timing>
-    <p:tnLst>
-      <p:par>
-        <p:cTn id="1" dur="indefinite" restart="never" nodeType="tmRoot"/>
-      </p:par>
-    </p:tnLst>
-  </p:timing>
-</p:sld>
-</file>
-
 <file path=ppt/slides/slide17.xml><?xml version="1.0" encoding="utf-8"?>
 <p:sld xmlns:a="http://schemas.openxmlformats.org/drawingml/2006/main" xmlns:r="http://schemas.openxmlformats.org/officeDocument/2006/relationships" xmlns:p="http://schemas.openxmlformats.org/presentationml/2006/main">
   <p:cSld>
@@ -10514,51 +10505,54 @@
           <a:p>
             <a:r>
               <a:rPr lang="es-AR" dirty="0" smtClean="0"/>
-              <a:t>A partir de las proyecciones Radon, se construye un </a:t>
+              <a:t>Habilidad para extraer lineas a partir de imágenes </a:t>
             </a:r>
             <a:r>
               <a:rPr lang="es-AR" i="1" dirty="0" smtClean="0"/>
-              <a:t>senograma</a:t>
-            </a:r>
-          </a:p>
-          <a:p>
-            <a:endParaRPr lang="es-AR" i="1" dirty="0" smtClean="0"/>
-          </a:p>
-          <a:p>
-            <a:r>
-              <a:rPr lang="es-AR" dirty="0" smtClean="0"/>
-              <a:t>Es basicamente un 2D dataset </a:t>
+              <a:t>muy </a:t>
+            </a:r>
+            <a:r>
+              <a:rPr lang="es-AR" dirty="0" smtClean="0"/>
+              <a:t>ruidosas</a:t>
             </a:r>
             <a:r>
               <a:rPr lang="es-AR" i="1" dirty="0" smtClean="0"/>
-              <a:t>p(r, theta)</a:t>
-            </a:r>
-            <a:r>
-              <a:rPr lang="es-AR" dirty="0" smtClean="0"/>
-              <a:t> que se obtiene de</a:t>
+              <a:t>.</a:t>
+            </a:r>
+          </a:p>
+          <a:p>
+            <a:pPr lvl="1"/>
+            <a:r>
+              <a:rPr lang="es-AR" dirty="0" smtClean="0"/>
+              <a:t>Caracteres manuscritos podrían considerarse muy ruidosos.</a:t>
+            </a:r>
+          </a:p>
+          <a:p>
+            <a:pPr lvl="1"/>
+            <a:endParaRPr lang="es-AR" dirty="0" smtClean="0"/>
+          </a:p>
+          <a:p>
+            <a:r>
+              <a:rPr lang="es-AR" dirty="0" smtClean="0"/>
+              <a:t>Se puede computar la tranformación </a:t>
             </a:r>
             <a:r>
               <a:rPr lang="es-AR" i="1" dirty="0" smtClean="0"/>
-              <a:t>apilar</a:t>
-            </a:r>
-            <a:r>
-              <a:rPr lang="es-AR" dirty="0" smtClean="0"/>
-              <a:t> las proyecciones 1D </a:t>
+              <a:t>Radon </a:t>
+            </a:r>
+            <a:r>
+              <a:rPr lang="es-AR" dirty="0" smtClean="0"/>
+              <a:t>de cualquier imagen rotada, trasladada o escalada sabiendo su tranformación </a:t>
             </a:r>
             <a:r>
               <a:rPr lang="es-AR" i="1" dirty="0" smtClean="0"/>
-              <a:t>p(r)</a:t>
-            </a:r>
-            <a:r>
-              <a:rPr lang="es-AR" dirty="0" smtClean="0"/>
-              <a:t>.</a:t>
-            </a:r>
-          </a:p>
-          <a:p>
-            <a:pPr lvl="1">
-              <a:buNone/>
-            </a:pPr>
-            <a:endParaRPr lang="es-AR" dirty="0" smtClean="0"/>
+              <a:t>Radon</a:t>
+            </a:r>
+            <a:r>
+              <a:rPr lang="es-AR" dirty="0" smtClean="0"/>
+              <a:t> original.</a:t>
+            </a:r>
+            <a:endParaRPr lang="es-AR" i="1" dirty="0"/>
           </a:p>
         </p:txBody>
       </p:sp>
@@ -10580,7 +10574,7 @@
             <a:pPr algn="ctr"/>
             <a:r>
               <a:rPr lang="es-AR" dirty="0" smtClean="0"/>
-              <a:t>Accumulator</a:t>
+              <a:t>Radon Transform – Porque?</a:t>
             </a:r>
             <a:endParaRPr lang="es-AR" dirty="0"/>
           </a:p>
@@ -10602,6 +10596,127 @@
 </file>
 
 <file path=ppt/slides/slide18.xml><?xml version="1.0" encoding="utf-8"?>
+<p:sld xmlns:a="http://schemas.openxmlformats.org/drawingml/2006/main" xmlns:r="http://schemas.openxmlformats.org/officeDocument/2006/relationships" xmlns:p="http://schemas.openxmlformats.org/presentationml/2006/main">
+  <p:cSld>
+    <p:spTree>
+      <p:nvGrpSpPr>
+        <p:cNvPr id="1" name=""/>
+        <p:cNvGrpSpPr/>
+        <p:nvPr/>
+      </p:nvGrpSpPr>
+      <p:grpSpPr>
+        <a:xfrm>
+          <a:off x="0" y="0"/>
+          <a:ext cx="0" cy="0"/>
+          <a:chOff x="0" y="0"/>
+          <a:chExt cx="0" cy="0"/>
+        </a:xfrm>
+      </p:grpSpPr>
+      <p:sp>
+        <p:nvSpPr>
+          <p:cNvPr id="2" name="Content Placeholder 1"/>
+          <p:cNvSpPr>
+            <a:spLocks noGrp="1"/>
+          </p:cNvSpPr>
+          <p:nvPr>
+            <p:ph idx="1"/>
+          </p:nvPr>
+        </p:nvSpPr>
+        <p:spPr/>
+        <p:txBody>
+          <a:bodyPr/>
+          <a:lstStyle/>
+          <a:p>
+            <a:r>
+              <a:rPr lang="es-AR" dirty="0" smtClean="0"/>
+              <a:t>A partir de las proyecciones Radon, se construye un </a:t>
+            </a:r>
+            <a:r>
+              <a:rPr lang="es-AR" i="1" dirty="0" smtClean="0"/>
+              <a:t>senograma</a:t>
+            </a:r>
+          </a:p>
+          <a:p>
+            <a:endParaRPr lang="es-AR" i="1" dirty="0" smtClean="0"/>
+          </a:p>
+          <a:p>
+            <a:r>
+              <a:rPr lang="es-AR" dirty="0" smtClean="0"/>
+              <a:t>Es basicamente un 2D dataset </a:t>
+            </a:r>
+            <a:r>
+              <a:rPr lang="es-AR" i="1" dirty="0" smtClean="0"/>
+              <a:t>p(r, theta)</a:t>
+            </a:r>
+            <a:r>
+              <a:rPr lang="es-AR" dirty="0" smtClean="0"/>
+              <a:t> que se obtiene de</a:t>
+            </a:r>
+            <a:r>
+              <a:rPr lang="es-AR" i="1" dirty="0" smtClean="0"/>
+              <a:t>apilar</a:t>
+            </a:r>
+            <a:r>
+              <a:rPr lang="es-AR" dirty="0" smtClean="0"/>
+              <a:t> las proyecciones 1D </a:t>
+            </a:r>
+            <a:r>
+              <a:rPr lang="es-AR" i="1" dirty="0" smtClean="0"/>
+              <a:t>p(r)</a:t>
+            </a:r>
+            <a:r>
+              <a:rPr lang="es-AR" dirty="0" smtClean="0"/>
+              <a:t>.</a:t>
+            </a:r>
+          </a:p>
+          <a:p>
+            <a:pPr lvl="1">
+              <a:buNone/>
+            </a:pPr>
+            <a:endParaRPr lang="es-AR" dirty="0" smtClean="0"/>
+          </a:p>
+        </p:txBody>
+      </p:sp>
+      <p:sp>
+        <p:nvSpPr>
+          <p:cNvPr id="3" name="Title 2"/>
+          <p:cNvSpPr>
+            <a:spLocks noGrp="1"/>
+          </p:cNvSpPr>
+          <p:nvPr>
+            <p:ph type="title"/>
+          </p:nvPr>
+        </p:nvSpPr>
+        <p:spPr/>
+        <p:txBody>
+          <a:bodyPr/>
+          <a:lstStyle/>
+          <a:p>
+            <a:pPr algn="ctr"/>
+            <a:r>
+              <a:rPr lang="es-AR" dirty="0" smtClean="0"/>
+              <a:t>Accumulator</a:t>
+            </a:r>
+            <a:endParaRPr lang="es-AR" dirty="0"/>
+          </a:p>
+        </p:txBody>
+      </p:sp>
+    </p:spTree>
+  </p:cSld>
+  <p:clrMapOvr>
+    <a:masterClrMapping/>
+  </p:clrMapOvr>
+  <p:timing>
+    <p:tnLst>
+      <p:par>
+        <p:cTn id="1" dur="indefinite" restart="never" nodeType="tmRoot"/>
+      </p:par>
+    </p:tnLst>
+  </p:timing>
+</p:sld>
+</file>
+
+<file path=ppt/slides/slide19.xml><?xml version="1.0" encoding="utf-8"?>
 <p:sld xmlns:a="http://schemas.openxmlformats.org/drawingml/2006/main" xmlns:r="http://schemas.openxmlformats.org/officeDocument/2006/relationships" xmlns:p="http://schemas.openxmlformats.org/presentationml/2006/main">
   <p:cSld>
     <p:spTree>
@@ -10750,7 +10865,85 @@
 </p:sld>
 </file>
 
-<file path=ppt/slides/slide19.xml><?xml version="1.0" encoding="utf-8"?>
+<file path=ppt/slides/slide2.xml><?xml version="1.0" encoding="utf-8"?>
+<p:sld xmlns:a="http://schemas.openxmlformats.org/drawingml/2006/main" xmlns:r="http://schemas.openxmlformats.org/officeDocument/2006/relationships" xmlns:p="http://schemas.openxmlformats.org/presentationml/2006/main">
+  <p:cSld>
+    <p:spTree>
+      <p:nvGrpSpPr>
+        <p:cNvPr id="1" name=""/>
+        <p:cNvGrpSpPr/>
+        <p:nvPr/>
+      </p:nvGrpSpPr>
+      <p:grpSpPr>
+        <a:xfrm>
+          <a:off x="0" y="0"/>
+          <a:ext cx="0" cy="0"/>
+          <a:chOff x="0" y="0"/>
+          <a:chExt cx="0" cy="0"/>
+        </a:xfrm>
+      </p:grpSpPr>
+      <p:sp>
+        <p:nvSpPr>
+          <p:cNvPr id="4" name="Title 3"/>
+          <p:cNvSpPr>
+            <a:spLocks noGrp="1"/>
+          </p:cNvSpPr>
+          <p:nvPr>
+            <p:ph type="ctrTitle"/>
+          </p:nvPr>
+        </p:nvSpPr>
+        <p:spPr/>
+        <p:txBody>
+          <a:bodyPr>
+            <a:normAutofit fontScale="90000"/>
+          </a:bodyPr>
+          <a:lstStyle/>
+          <a:p>
+            <a:r>
+              <a:rPr lang="es-AR" dirty="0" smtClean="0">
+                <a:effectLst/>
+              </a:rPr>
+              <a:t>Reconocimiento de caracteres mediante técnica de transformación de Radon y anális de componentes principales</a:t>
+            </a:r>
+            <a:endParaRPr lang="es-AR" dirty="0"/>
+          </a:p>
+        </p:txBody>
+      </p:sp>
+      <p:sp>
+        <p:nvSpPr>
+          <p:cNvPr id="5" name="Subtitle 4"/>
+          <p:cNvSpPr>
+            <a:spLocks noGrp="1"/>
+          </p:cNvSpPr>
+          <p:nvPr>
+            <p:ph type="subTitle" idx="1"/>
+          </p:nvPr>
+        </p:nvSpPr>
+        <p:spPr/>
+        <p:txBody>
+          <a:bodyPr/>
+          <a:lstStyle/>
+          <a:p>
+            <a:endParaRPr lang="es-AR"/>
+          </a:p>
+        </p:txBody>
+      </p:sp>
+    </p:spTree>
+  </p:cSld>
+  <p:clrMapOvr>
+    <a:masterClrMapping/>
+  </p:clrMapOvr>
+  <p:timing>
+    <p:tnLst>
+      <p:par>
+        <p:cTn id="1" dur="indefinite" restart="never" nodeType="tmRoot"/>
+      </p:par>
+    </p:tnLst>
+  </p:timing>
+</p:sld>
+</file>
+
+<file path=ppt/slides/slide20.xml><?xml version="1.0" encoding="utf-8"?>
 <p:sld xmlns:a="http://schemas.openxmlformats.org/drawingml/2006/main" xmlns:r="http://schemas.openxmlformats.org/officeDocument/2006/relationships" xmlns:p="http://schemas.openxmlformats.org/presentationml/2006/main">
   <p:cSld>
     <p:spTree>
@@ -10898,85 +11091,7 @@
 </p:sld>
 </file>
 
-<file path=ppt/slides/slide2.xml><?xml version="1.0" encoding="utf-8"?>
-<p:sld xmlns:a="http://schemas.openxmlformats.org/drawingml/2006/main" xmlns:r="http://schemas.openxmlformats.org/officeDocument/2006/relationships" xmlns:p="http://schemas.openxmlformats.org/presentationml/2006/main">
-  <p:cSld>
-    <p:spTree>
-      <p:nvGrpSpPr>
-        <p:cNvPr id="1" name=""/>
-        <p:cNvGrpSpPr/>
-        <p:nvPr/>
-      </p:nvGrpSpPr>
-      <p:grpSpPr>
-        <a:xfrm>
-          <a:off x="0" y="0"/>
-          <a:ext cx="0" cy="0"/>
-          <a:chOff x="0" y="0"/>
-          <a:chExt cx="0" cy="0"/>
-        </a:xfrm>
-      </p:grpSpPr>
-      <p:sp>
-        <p:nvSpPr>
-          <p:cNvPr id="4" name="Title 3"/>
-          <p:cNvSpPr>
-            <a:spLocks noGrp="1"/>
-          </p:cNvSpPr>
-          <p:nvPr>
-            <p:ph type="ctrTitle"/>
-          </p:nvPr>
-        </p:nvSpPr>
-        <p:spPr/>
-        <p:txBody>
-          <a:bodyPr>
-            <a:normAutofit fontScale="90000"/>
-          </a:bodyPr>
-          <a:lstStyle/>
-          <a:p>
-            <a:r>
-              <a:rPr lang="es-AR" dirty="0" smtClean="0">
-                <a:effectLst/>
-              </a:rPr>
-              <a:t>Reconocimiento de caracteres mediante técnica de transformación de Radon y anális de componentes principales</a:t>
-            </a:r>
-            <a:endParaRPr lang="es-AR" dirty="0"/>
-          </a:p>
-        </p:txBody>
-      </p:sp>
-      <p:sp>
-        <p:nvSpPr>
-          <p:cNvPr id="5" name="Subtitle 4"/>
-          <p:cNvSpPr>
-            <a:spLocks noGrp="1"/>
-          </p:cNvSpPr>
-          <p:nvPr>
-            <p:ph type="subTitle" idx="1"/>
-          </p:nvPr>
-        </p:nvSpPr>
-        <p:spPr/>
-        <p:txBody>
-          <a:bodyPr/>
-          <a:lstStyle/>
-          <a:p>
-            <a:endParaRPr lang="es-AR"/>
-          </a:p>
-        </p:txBody>
-      </p:sp>
-    </p:spTree>
-  </p:cSld>
-  <p:clrMapOvr>
-    <a:masterClrMapping/>
-  </p:clrMapOvr>
-  <p:timing>
-    <p:tnLst>
-      <p:par>
-        <p:cTn id="1" dur="indefinite" restart="never" nodeType="tmRoot"/>
-      </p:par>
-    </p:tnLst>
-  </p:timing>
-</p:sld>
-</file>
-
-<file path=ppt/slides/slide20.xml><?xml version="1.0" encoding="utf-8"?>
+<file path=ppt/slides/slide21.xml><?xml version="1.0" encoding="utf-8"?>
 <p:sld xmlns:a="http://schemas.openxmlformats.org/drawingml/2006/main" xmlns:r="http://schemas.openxmlformats.org/officeDocument/2006/relationships" xmlns:p="http://schemas.openxmlformats.org/presentationml/2006/main">
   <p:cSld>
     <p:spTree>
@@ -11124,7 +11239,7 @@
 </p:sld>
 </file>
 
-<file path=ppt/slides/slide21.xml><?xml version="1.0" encoding="utf-8"?>
+<file path=ppt/slides/slide22.xml><?xml version="1.0" encoding="utf-8"?>
 <p:sld xmlns:a="http://schemas.openxmlformats.org/drawingml/2006/main" xmlns:r="http://schemas.openxmlformats.org/officeDocument/2006/relationships" xmlns:p="http://schemas.openxmlformats.org/presentationml/2006/main">
   <p:cSld>
     <p:spTree>
@@ -11296,7 +11411,7 @@
 </p:sld>
 </file>
 
-<file path=ppt/slides/slide22.xml><?xml version="1.0" encoding="utf-8"?>
+<file path=ppt/slides/slide23.xml><?xml version="1.0" encoding="utf-8"?>
 <p:sld xmlns:a="http://schemas.openxmlformats.org/drawingml/2006/main" xmlns:r="http://schemas.openxmlformats.org/officeDocument/2006/relationships" xmlns:p="http://schemas.openxmlformats.org/presentationml/2006/main">
   <p:cSld>
     <p:spTree>
@@ -11388,7 +11503,7 @@
 </p:sld>
 </file>
 
-<file path=ppt/slides/slide23.xml><?xml version="1.0" encoding="utf-8"?>
+<file path=ppt/slides/slide24.xml><?xml version="1.0" encoding="utf-8"?>
 <p:sld xmlns:a="http://schemas.openxmlformats.org/drawingml/2006/main" xmlns:r="http://schemas.openxmlformats.org/officeDocument/2006/relationships" xmlns:p="http://schemas.openxmlformats.org/presentationml/2006/main">
   <p:cSld>
     <p:spTree>
@@ -11618,151 +11733,6 @@
 </p:sld>
 </file>
 
-<file path=ppt/slides/slide24.xml><?xml version="1.0" encoding="utf-8"?>
-<p:sld xmlns:a="http://schemas.openxmlformats.org/drawingml/2006/main" xmlns:r="http://schemas.openxmlformats.org/officeDocument/2006/relationships" xmlns:p="http://schemas.openxmlformats.org/presentationml/2006/main">
-  <p:cSld>
-    <p:spTree>
-      <p:nvGrpSpPr>
-        <p:cNvPr id="1" name=""/>
-        <p:cNvGrpSpPr/>
-        <p:nvPr/>
-      </p:nvGrpSpPr>
-      <p:grpSpPr>
-        <a:xfrm>
-          <a:off x="0" y="0"/>
-          <a:ext cx="0" cy="0"/>
-          <a:chOff x="0" y="0"/>
-          <a:chExt cx="0" cy="0"/>
-        </a:xfrm>
-      </p:grpSpPr>
-      <p:sp>
-        <p:nvSpPr>
-          <p:cNvPr id="2" name="Content Placeholder 1"/>
-          <p:cNvSpPr>
-            <a:spLocks noGrp="1"/>
-          </p:cNvSpPr>
-          <p:nvPr>
-            <p:ph idx="1"/>
-          </p:nvPr>
-        </p:nvSpPr>
-        <p:spPr/>
-        <p:txBody>
-          <a:bodyPr>
-            <a:normAutofit/>
-          </a:bodyPr>
-          <a:lstStyle/>
-          <a:p>
-            <a:r>
-              <a:rPr lang="es-AR" dirty="0" smtClean="0"/>
-              <a:t>Se calcula en etapas:</a:t>
-            </a:r>
-          </a:p>
-          <a:p>
-            <a:endParaRPr lang="es-AR" dirty="0" smtClean="0"/>
-          </a:p>
-          <a:p>
-            <a:pPr marL="850392" lvl="1" indent="-457200">
-              <a:buFont typeface="+mj-lt"/>
-              <a:buAutoNum type="arabicPeriod"/>
-            </a:pPr>
-            <a:r>
-              <a:rPr lang="es-AR" dirty="0" smtClean="0"/>
-              <a:t>Restar la media de los datos a cada variable.</a:t>
-            </a:r>
-          </a:p>
-          <a:p>
-            <a:pPr marL="850392" lvl="1" indent="-457200">
-              <a:buFont typeface="+mj-lt"/>
-              <a:buAutoNum type="arabicPeriod"/>
-            </a:pPr>
-            <a:r>
-              <a:rPr lang="es-AR" dirty="0" smtClean="0"/>
-              <a:t>Calcular y crear la matriz de covarianza</a:t>
-            </a:r>
-          </a:p>
-          <a:p>
-            <a:pPr marL="850392" lvl="1" indent="-457200">
-              <a:buFont typeface="+mj-lt"/>
-              <a:buAutoNum type="arabicPeriod"/>
-            </a:pPr>
-            <a:r>
-              <a:rPr lang="es-AR" dirty="0" smtClean="0"/>
-              <a:t>Calcular los autovector y autovalores de la matriz de covarianza.</a:t>
-            </a:r>
-          </a:p>
-          <a:p>
-            <a:pPr marL="850392" lvl="1" indent="-457200">
-              <a:buFont typeface="+mj-lt"/>
-              <a:buAutoNum type="arabicPeriod"/>
-            </a:pPr>
-            <a:r>
-              <a:rPr lang="es-AR" dirty="0" smtClean="0"/>
-              <a:t>Tomar el </a:t>
-            </a:r>
-            <a:r>
-              <a:rPr lang="es-AR" i="1" dirty="0" smtClean="0"/>
-              <a:t>Feature Vector</a:t>
-            </a:r>
-          </a:p>
-          <a:p>
-            <a:pPr marL="1088136" lvl="2" indent="-457200"/>
-            <a:r>
-              <a:rPr lang="es-AR" dirty="0" smtClean="0"/>
-              <a:t>Nombre de fantasía para una matriz de vectores.</a:t>
-            </a:r>
-          </a:p>
-          <a:p>
-            <a:pPr marL="850392" lvl="1" indent="-457200">
-              <a:buFont typeface="+mj-lt"/>
-              <a:buAutoNum type="arabicPeriod"/>
-            </a:pPr>
-            <a:r>
-              <a:rPr lang="es-AR" dirty="0" smtClean="0"/>
-              <a:t>Multiplicar la traspuesta de los Feature Vectors por la traspuesta de los datos ajustados.</a:t>
-            </a:r>
-            <a:endParaRPr lang="es-AR" dirty="0"/>
-          </a:p>
-        </p:txBody>
-      </p:sp>
-      <p:sp>
-        <p:nvSpPr>
-          <p:cNvPr id="3" name="Title 2"/>
-          <p:cNvSpPr>
-            <a:spLocks noGrp="1"/>
-          </p:cNvSpPr>
-          <p:nvPr>
-            <p:ph type="title"/>
-          </p:nvPr>
-        </p:nvSpPr>
-        <p:spPr/>
-        <p:txBody>
-          <a:bodyPr/>
-          <a:lstStyle/>
-          <a:p>
-            <a:pPr algn="ctr"/>
-            <a:r>
-              <a:rPr lang="es-AR" dirty="0" smtClean="0"/>
-              <a:t>Principal Components</a:t>
-            </a:r>
-            <a:endParaRPr lang="es-AR" dirty="0"/>
-          </a:p>
-        </p:txBody>
-      </p:sp>
-    </p:spTree>
-  </p:cSld>
-  <p:clrMapOvr>
-    <a:masterClrMapping/>
-  </p:clrMapOvr>
-  <p:timing>
-    <p:tnLst>
-      <p:par>
-        <p:cTn id="1" dur="indefinite" restart="never" nodeType="tmRoot"/>
-      </p:par>
-    </p:tnLst>
-  </p:timing>
-</p:sld>
-</file>
-
 <file path=ppt/slides/slide25.xml><?xml version="1.0" encoding="utf-8"?>
 <p:sld xmlns:a="http://schemas.openxmlformats.org/drawingml/2006/main" xmlns:r="http://schemas.openxmlformats.org/officeDocument/2006/relationships" xmlns:p="http://schemas.openxmlformats.org/presentationml/2006/main">
   <p:cSld>
@@ -11799,34 +11769,73 @@
           <a:p>
             <a:r>
               <a:rPr lang="es-AR" dirty="0" smtClean="0"/>
-              <a:t>Etapa 1: </a:t>
-            </a:r>
-          </a:p>
-          <a:p>
-            <a:pPr lvl="1"/>
+              <a:t>Se calcula en etapas:</a:t>
+            </a:r>
+          </a:p>
+          <a:p>
             <a:endParaRPr lang="es-AR" dirty="0" smtClean="0"/>
           </a:p>
           <a:p>
-            <a:pPr lvl="1"/>
-            <a:r>
-              <a:rPr lang="es-AR" dirty="0" smtClean="0"/>
-              <a:t>Esta étapa facilita cálculo de la matríz de covarianza.</a:t>
-            </a:r>
-          </a:p>
-          <a:p>
-            <a:pPr lvl="1"/>
-            <a:endParaRPr lang="es-AR" dirty="0" smtClean="0"/>
-          </a:p>
-          <a:p>
-            <a:pPr lvl="1"/>
-            <a:r>
-              <a:rPr lang="es-AR" dirty="0" smtClean="0"/>
-              <a:t>Se resta la media de cada valor de la fila por cada fila de todas las imágenes.</a:t>
-            </a:r>
-          </a:p>
-          <a:p>
-            <a:pPr lvl="1"/>
-            <a:endParaRPr lang="es-AR" dirty="0" smtClean="0"/>
+            <a:pPr marL="850392" lvl="1" indent="-457200">
+              <a:buFont typeface="+mj-lt"/>
+              <a:buAutoNum type="arabicPeriod"/>
+            </a:pPr>
+            <a:r>
+              <a:rPr lang="es-AR" dirty="0" smtClean="0"/>
+              <a:t>Restar la media de los datos a cada variable.</a:t>
+            </a:r>
+          </a:p>
+          <a:p>
+            <a:pPr marL="850392" lvl="1" indent="-457200">
+              <a:buFont typeface="+mj-lt"/>
+              <a:buAutoNum type="arabicPeriod"/>
+            </a:pPr>
+            <a:r>
+              <a:rPr lang="es-AR" dirty="0" smtClean="0"/>
+              <a:t>Calcular y crear la matriz de covarianza</a:t>
+            </a:r>
+          </a:p>
+          <a:p>
+            <a:pPr marL="850392" lvl="1" indent="-457200">
+              <a:buFont typeface="+mj-lt"/>
+              <a:buAutoNum type="arabicPeriod"/>
+            </a:pPr>
+            <a:r>
+              <a:rPr lang="es-AR" dirty="0" smtClean="0"/>
+              <a:t>Calcular los autovector y autovalores de la matriz de covarianza.</a:t>
+            </a:r>
+          </a:p>
+          <a:p>
+            <a:pPr marL="850392" lvl="1" indent="-457200">
+              <a:buFont typeface="+mj-lt"/>
+              <a:buAutoNum type="arabicPeriod"/>
+            </a:pPr>
+            <a:r>
+              <a:rPr lang="es-AR" dirty="0" smtClean="0"/>
+              <a:t>Tomar el </a:t>
+            </a:r>
+            <a:r>
+              <a:rPr lang="es-AR" i="1" dirty="0" smtClean="0"/>
+              <a:t>Feature Vector</a:t>
+            </a:r>
+          </a:p>
+          <a:p>
+            <a:pPr marL="1088136" lvl="2" indent="-457200"/>
+            <a:r>
+              <a:rPr lang="es-AR" dirty="0" smtClean="0"/>
+              <a:t>Nombre de fantasía para una matriz de vectores.</a:t>
+            </a:r>
+          </a:p>
+          <a:p>
+            <a:pPr marL="850392" lvl="1" indent="-457200">
+              <a:buFont typeface="+mj-lt"/>
+              <a:buAutoNum type="arabicPeriod"/>
+            </a:pPr>
+            <a:r>
+              <a:rPr lang="es-AR" dirty="0" smtClean="0"/>
+              <a:t>Multiplicar la traspuesta de los Feature Vectors por la traspuesta de los datos ajustados.</a:t>
+            </a:r>
+            <a:endParaRPr lang="es-AR" dirty="0"/>
           </a:p>
         </p:txBody>
       </p:sp>
@@ -11870,6 +11879,112 @@
 </file>
 
 <file path=ppt/slides/slide26.xml><?xml version="1.0" encoding="utf-8"?>
+<p:sld xmlns:a="http://schemas.openxmlformats.org/drawingml/2006/main" xmlns:r="http://schemas.openxmlformats.org/officeDocument/2006/relationships" xmlns:p="http://schemas.openxmlformats.org/presentationml/2006/main">
+  <p:cSld>
+    <p:spTree>
+      <p:nvGrpSpPr>
+        <p:cNvPr id="1" name=""/>
+        <p:cNvGrpSpPr/>
+        <p:nvPr/>
+      </p:nvGrpSpPr>
+      <p:grpSpPr>
+        <a:xfrm>
+          <a:off x="0" y="0"/>
+          <a:ext cx="0" cy="0"/>
+          <a:chOff x="0" y="0"/>
+          <a:chExt cx="0" cy="0"/>
+        </a:xfrm>
+      </p:grpSpPr>
+      <p:sp>
+        <p:nvSpPr>
+          <p:cNvPr id="2" name="Content Placeholder 1"/>
+          <p:cNvSpPr>
+            <a:spLocks noGrp="1"/>
+          </p:cNvSpPr>
+          <p:nvPr>
+            <p:ph idx="1"/>
+          </p:nvPr>
+        </p:nvSpPr>
+        <p:spPr/>
+        <p:txBody>
+          <a:bodyPr>
+            <a:normAutofit/>
+          </a:bodyPr>
+          <a:lstStyle/>
+          <a:p>
+            <a:r>
+              <a:rPr lang="es-AR" dirty="0" smtClean="0"/>
+              <a:t>Etapa 1: </a:t>
+            </a:r>
+          </a:p>
+          <a:p>
+            <a:pPr lvl="1"/>
+            <a:endParaRPr lang="es-AR" dirty="0" smtClean="0"/>
+          </a:p>
+          <a:p>
+            <a:pPr lvl="1"/>
+            <a:r>
+              <a:rPr lang="es-AR" dirty="0" smtClean="0"/>
+              <a:t>Esta étapa facilita cálculo de la matríz de covarianza.</a:t>
+            </a:r>
+          </a:p>
+          <a:p>
+            <a:pPr lvl="1"/>
+            <a:endParaRPr lang="es-AR" dirty="0" smtClean="0"/>
+          </a:p>
+          <a:p>
+            <a:pPr lvl="1"/>
+            <a:r>
+              <a:rPr lang="es-AR" dirty="0" smtClean="0"/>
+              <a:t>Se resta la media de cada valor de la fila por cada fila de todas las imágenes.</a:t>
+            </a:r>
+          </a:p>
+          <a:p>
+            <a:pPr lvl="1"/>
+            <a:endParaRPr lang="es-AR" dirty="0" smtClean="0"/>
+          </a:p>
+        </p:txBody>
+      </p:sp>
+      <p:sp>
+        <p:nvSpPr>
+          <p:cNvPr id="3" name="Title 2"/>
+          <p:cNvSpPr>
+            <a:spLocks noGrp="1"/>
+          </p:cNvSpPr>
+          <p:nvPr>
+            <p:ph type="title"/>
+          </p:nvPr>
+        </p:nvSpPr>
+        <p:spPr/>
+        <p:txBody>
+          <a:bodyPr/>
+          <a:lstStyle/>
+          <a:p>
+            <a:pPr algn="ctr"/>
+            <a:r>
+              <a:rPr lang="es-AR" dirty="0" smtClean="0"/>
+              <a:t>Principal Components</a:t>
+            </a:r>
+            <a:endParaRPr lang="es-AR" dirty="0"/>
+          </a:p>
+        </p:txBody>
+      </p:sp>
+    </p:spTree>
+  </p:cSld>
+  <p:clrMapOvr>
+    <a:masterClrMapping/>
+  </p:clrMapOvr>
+  <p:timing>
+    <p:tnLst>
+      <p:par>
+        <p:cTn id="1" dur="indefinite" restart="never" nodeType="tmRoot"/>
+      </p:par>
+    </p:tnLst>
+  </p:timing>
+</p:sld>
+</file>
+
+<file path=ppt/slides/slide27.xml><?xml version="1.0" encoding="utf-8"?>
 <p:sld xmlns:a="http://schemas.openxmlformats.org/drawingml/2006/main" xmlns:r="http://schemas.openxmlformats.org/officeDocument/2006/relationships" xmlns:p="http://schemas.openxmlformats.org/presentationml/2006/main">
   <p:cSld>
     <p:spTree>
@@ -12044,7 +12159,7 @@
 </p:sld>
 </file>
 
-<file path=ppt/slides/slide27.xml><?xml version="1.0" encoding="utf-8"?>
+<file path=ppt/slides/slide28.xml><?xml version="1.0" encoding="utf-8"?>
 <p:sld xmlns:a="http://schemas.openxmlformats.org/drawingml/2006/main" xmlns:r="http://schemas.openxmlformats.org/officeDocument/2006/relationships" xmlns:p="http://schemas.openxmlformats.org/presentationml/2006/main">
   <p:cSld>
     <p:spTree>
@@ -12148,7 +12263,7 @@
 </p:sld>
 </file>
 
-<file path=ppt/slides/slide28.xml><?xml version="1.0" encoding="utf-8"?>
+<file path=ppt/slides/slide29.xml><?xml version="1.0" encoding="utf-8"?>
 <p:sld xmlns:a="http://schemas.openxmlformats.org/drawingml/2006/main" xmlns:r="http://schemas.openxmlformats.org/officeDocument/2006/relationships" xmlns:p="http://schemas.openxmlformats.org/presentationml/2006/main">
   <p:cSld>
     <p:spTree>
@@ -12269,7 +12384,110 @@
 </p:sld>
 </file>
 
-<file path=ppt/slides/slide29.xml><?xml version="1.0" encoding="utf-8"?>
+<file path=ppt/slides/slide3.xml><?xml version="1.0" encoding="utf-8"?>
+<p:sld xmlns:a="http://schemas.openxmlformats.org/drawingml/2006/main" xmlns:r="http://schemas.openxmlformats.org/officeDocument/2006/relationships" xmlns:p="http://schemas.openxmlformats.org/presentationml/2006/main">
+  <p:cSld>
+    <p:spTree>
+      <p:nvGrpSpPr>
+        <p:cNvPr id="1" name=""/>
+        <p:cNvGrpSpPr/>
+        <p:nvPr/>
+      </p:nvGrpSpPr>
+      <p:grpSpPr>
+        <a:xfrm>
+          <a:off x="0" y="0"/>
+          <a:ext cx="0" cy="0"/>
+          <a:chOff x="0" y="0"/>
+          <a:chExt cx="0" cy="0"/>
+        </a:xfrm>
+      </p:grpSpPr>
+      <p:sp>
+        <p:nvSpPr>
+          <p:cNvPr id="2" name="Content Placeholder 1"/>
+          <p:cNvSpPr>
+            <a:spLocks noGrp="1"/>
+          </p:cNvSpPr>
+          <p:nvPr>
+            <p:ph idx="1"/>
+          </p:nvPr>
+        </p:nvSpPr>
+        <p:spPr/>
+        <p:txBody>
+          <a:bodyPr/>
+          <a:lstStyle/>
+          <a:p>
+            <a:r>
+              <a:rPr lang="es-AR" dirty="0" smtClean="0"/>
+              <a:t>Reconocedores OCR regulares eran insuficientes</a:t>
+            </a:r>
+          </a:p>
+          <a:p>
+            <a:pPr lvl="1"/>
+            <a:r>
+              <a:rPr lang="es-AR" dirty="0" smtClean="0"/>
+              <a:t>Especialmente al tratar caracteres hechos a mano.</a:t>
+            </a:r>
+          </a:p>
+          <a:p>
+            <a:endParaRPr lang="es-AR" dirty="0" smtClean="0"/>
+          </a:p>
+          <a:p>
+            <a:r>
+              <a:rPr lang="es-AR" dirty="0" smtClean="0"/>
+              <a:t>Impulsado principalmente por agencias que utilizan </a:t>
+            </a:r>
+            <a:r>
+              <a:rPr lang="es-AR" i="1" dirty="0" smtClean="0"/>
+              <a:t>Postal  applications </a:t>
+            </a:r>
+            <a:r>
+              <a:rPr lang="es-AR" dirty="0" smtClean="0"/>
+              <a:t>debido a la baja proporcion de mails clasificados correctamente.</a:t>
+            </a:r>
+            <a:endParaRPr lang="es-AR" dirty="0"/>
+          </a:p>
+        </p:txBody>
+      </p:sp>
+      <p:sp>
+        <p:nvSpPr>
+          <p:cNvPr id="3" name="Title 2"/>
+          <p:cNvSpPr>
+            <a:spLocks noGrp="1"/>
+          </p:cNvSpPr>
+          <p:nvPr>
+            <p:ph type="title"/>
+          </p:nvPr>
+        </p:nvSpPr>
+        <p:spPr/>
+        <p:txBody>
+          <a:bodyPr/>
+          <a:lstStyle/>
+          <a:p>
+            <a:pPr algn="ctr"/>
+            <a:r>
+              <a:rPr lang="es-AR" dirty="0" smtClean="0"/>
+              <a:t>Introducción</a:t>
+            </a:r>
+            <a:endParaRPr lang="es-AR" dirty="0"/>
+          </a:p>
+        </p:txBody>
+      </p:sp>
+    </p:spTree>
+  </p:cSld>
+  <p:clrMapOvr>
+    <a:masterClrMapping/>
+  </p:clrMapOvr>
+  <p:timing>
+    <p:tnLst>
+      <p:par>
+        <p:cTn id="1" dur="indefinite" restart="never" nodeType="tmRoot"/>
+      </p:par>
+    </p:tnLst>
+  </p:timing>
+</p:sld>
+</file>
+
+<file path=ppt/slides/slide30.xml><?xml version="1.0" encoding="utf-8"?>
 <p:sld xmlns:a="http://schemas.openxmlformats.org/drawingml/2006/main" xmlns:r="http://schemas.openxmlformats.org/officeDocument/2006/relationships" xmlns:p="http://schemas.openxmlformats.org/presentationml/2006/main">
   <p:cSld>
     <p:spTree>
@@ -12471,256 +12689,6 @@
 </p:sld>
 </file>
 
-<file path=ppt/slides/slide3.xml><?xml version="1.0" encoding="utf-8"?>
-<p:sld xmlns:a="http://schemas.openxmlformats.org/drawingml/2006/main" xmlns:r="http://schemas.openxmlformats.org/officeDocument/2006/relationships" xmlns:p="http://schemas.openxmlformats.org/presentationml/2006/main">
-  <p:cSld>
-    <p:spTree>
-      <p:nvGrpSpPr>
-        <p:cNvPr id="1" name=""/>
-        <p:cNvGrpSpPr/>
-        <p:nvPr/>
-      </p:nvGrpSpPr>
-      <p:grpSpPr>
-        <a:xfrm>
-          <a:off x="0" y="0"/>
-          <a:ext cx="0" cy="0"/>
-          <a:chOff x="0" y="0"/>
-          <a:chExt cx="0" cy="0"/>
-        </a:xfrm>
-      </p:grpSpPr>
-      <p:sp>
-        <p:nvSpPr>
-          <p:cNvPr id="2" name="Content Placeholder 1"/>
-          <p:cNvSpPr>
-            <a:spLocks noGrp="1"/>
-          </p:cNvSpPr>
-          <p:nvPr>
-            <p:ph idx="1"/>
-          </p:nvPr>
-        </p:nvSpPr>
-        <p:spPr/>
-        <p:txBody>
-          <a:bodyPr/>
-          <a:lstStyle/>
-          <a:p>
-            <a:r>
-              <a:rPr lang="es-AR" dirty="0" smtClean="0"/>
-              <a:t>Reconocedores OCR regulares eran insuficientes</a:t>
-            </a:r>
-          </a:p>
-          <a:p>
-            <a:pPr lvl="1"/>
-            <a:r>
-              <a:rPr lang="es-AR" dirty="0" smtClean="0"/>
-              <a:t>Especialmente al tratar caracteres hechos a mano.</a:t>
-            </a:r>
-          </a:p>
-          <a:p>
-            <a:endParaRPr lang="es-AR" dirty="0" smtClean="0"/>
-          </a:p>
-          <a:p>
-            <a:r>
-              <a:rPr lang="es-AR" dirty="0" smtClean="0"/>
-              <a:t>Impulsado principalmente por agencias que utilizan </a:t>
-            </a:r>
-            <a:r>
-              <a:rPr lang="es-AR" i="1" dirty="0" smtClean="0"/>
-              <a:t>Postal  applications </a:t>
-            </a:r>
-            <a:r>
-              <a:rPr lang="es-AR" dirty="0" smtClean="0"/>
-              <a:t>debido a la baja proporcion de mails clasificados correctamente.</a:t>
-            </a:r>
-            <a:endParaRPr lang="es-AR" dirty="0"/>
-          </a:p>
-        </p:txBody>
-      </p:sp>
-      <p:sp>
-        <p:nvSpPr>
-          <p:cNvPr id="3" name="Title 2"/>
-          <p:cNvSpPr>
-            <a:spLocks noGrp="1"/>
-          </p:cNvSpPr>
-          <p:nvPr>
-            <p:ph type="title"/>
-          </p:nvPr>
-        </p:nvSpPr>
-        <p:spPr/>
-        <p:txBody>
-          <a:bodyPr/>
-          <a:lstStyle/>
-          <a:p>
-            <a:pPr algn="ctr"/>
-            <a:r>
-              <a:rPr lang="es-AR" dirty="0" smtClean="0"/>
-              <a:t>Introducción</a:t>
-            </a:r>
-            <a:endParaRPr lang="es-AR" dirty="0"/>
-          </a:p>
-        </p:txBody>
-      </p:sp>
-    </p:spTree>
-  </p:cSld>
-  <p:clrMapOvr>
-    <a:masterClrMapping/>
-  </p:clrMapOvr>
-  <p:timing>
-    <p:tnLst>
-      <p:par>
-        <p:cTn id="1" dur="indefinite" restart="never" nodeType="tmRoot"/>
-      </p:par>
-    </p:tnLst>
-  </p:timing>
-</p:sld>
-</file>
-
-<file path=ppt/slides/slide30.xml><?xml version="1.0" encoding="utf-8"?>
-<p:sld xmlns:a="http://schemas.openxmlformats.org/drawingml/2006/main" xmlns:r="http://schemas.openxmlformats.org/officeDocument/2006/relationships" xmlns:p="http://schemas.openxmlformats.org/presentationml/2006/main">
-  <p:cSld>
-    <p:spTree>
-      <p:nvGrpSpPr>
-        <p:cNvPr id="1" name=""/>
-        <p:cNvGrpSpPr/>
-        <p:nvPr/>
-      </p:nvGrpSpPr>
-      <p:grpSpPr>
-        <a:xfrm>
-          <a:off x="0" y="0"/>
-          <a:ext cx="0" cy="0"/>
-          <a:chOff x="0" y="0"/>
-          <a:chExt cx="0" cy="0"/>
-        </a:xfrm>
-      </p:grpSpPr>
-      <p:sp>
-        <p:nvSpPr>
-          <p:cNvPr id="2" name="Content Placeholder 1"/>
-          <p:cNvSpPr>
-            <a:spLocks noGrp="1"/>
-          </p:cNvSpPr>
-          <p:nvPr>
-            <p:ph idx="1"/>
-          </p:nvPr>
-        </p:nvSpPr>
-        <p:spPr>
-          <a:xfrm>
-            <a:off x="457200" y="1481328"/>
-            <a:ext cx="8472518" cy="4525963"/>
-          </a:xfrm>
-        </p:spPr>
-        <p:txBody>
-          <a:bodyPr>
-            <a:normAutofit/>
-          </a:bodyPr>
-          <a:lstStyle/>
-          <a:p>
-            <a:r>
-              <a:rPr lang="es-AR" dirty="0" smtClean="0"/>
-              <a:t>Etapa 4: Feature Vectors</a:t>
-            </a:r>
-          </a:p>
-          <a:p>
-            <a:endParaRPr lang="es-AR" dirty="0" smtClean="0"/>
-          </a:p>
-          <a:p>
-            <a:pPr lvl="1"/>
-            <a:r>
-              <a:rPr lang="es-AR" dirty="0" smtClean="0"/>
-              <a:t>Ordenar los autovectores por sus autovalores.</a:t>
-            </a:r>
-          </a:p>
-          <a:p>
-            <a:pPr lvl="2"/>
-            <a:r>
-              <a:rPr lang="es-AR" dirty="0" smtClean="0"/>
-              <a:t>De mayor a menor.</a:t>
-            </a:r>
-          </a:p>
-          <a:p>
-            <a:pPr lvl="2"/>
-            <a:endParaRPr lang="es-AR" dirty="0" smtClean="0"/>
-          </a:p>
-          <a:p>
-            <a:pPr lvl="1"/>
-            <a:r>
-              <a:rPr lang="es-AR" dirty="0" smtClean="0"/>
-              <a:t>Calcula los componentes en orden, de acuerdo a su importancia.</a:t>
-            </a:r>
-          </a:p>
-          <a:p>
-            <a:pPr lvl="1"/>
-            <a:endParaRPr lang="es-AR" dirty="0" smtClean="0"/>
-          </a:p>
-          <a:p>
-            <a:pPr lvl="1"/>
-            <a:r>
-              <a:rPr lang="es-AR" dirty="0" smtClean="0"/>
-              <a:t>Permite que la información sea comprimida y los vectores mas </a:t>
-            </a:r>
-            <a:r>
-              <a:rPr lang="es-AR" i="1" dirty="0" smtClean="0"/>
-              <a:t>débiles</a:t>
-            </a:r>
-            <a:r>
-              <a:rPr lang="es-AR" dirty="0" smtClean="0"/>
-              <a:t> sean removidos.</a:t>
-            </a:r>
-          </a:p>
-          <a:p>
-            <a:pPr lvl="2"/>
-            <a:r>
-              <a:rPr lang="es-AR" dirty="0" smtClean="0"/>
-              <a:t>Información perdida puede considererse “insignificante”.</a:t>
-            </a:r>
-          </a:p>
-          <a:p>
-            <a:pPr lvl="1"/>
-            <a:endParaRPr lang="es-AR" dirty="0" smtClean="0"/>
-          </a:p>
-          <a:p>
-            <a:pPr lvl="1"/>
-            <a:endParaRPr lang="es-AR" dirty="0"/>
-          </a:p>
-        </p:txBody>
-      </p:sp>
-      <p:sp>
-        <p:nvSpPr>
-          <p:cNvPr id="3" name="Title 2"/>
-          <p:cNvSpPr>
-            <a:spLocks noGrp="1"/>
-          </p:cNvSpPr>
-          <p:nvPr>
-            <p:ph type="title"/>
-          </p:nvPr>
-        </p:nvSpPr>
-        <p:spPr/>
-        <p:txBody>
-          <a:bodyPr/>
-          <a:lstStyle/>
-          <a:p>
-            <a:pPr algn="ctr"/>
-            <a:r>
-              <a:rPr lang="es-AR" dirty="0" smtClean="0"/>
-              <a:t>Principal Components</a:t>
-            </a:r>
-            <a:endParaRPr lang="es-AR" dirty="0"/>
-          </a:p>
-        </p:txBody>
-      </p:sp>
-    </p:spTree>
-  </p:cSld>
-  <p:clrMapOvr>
-    <a:masterClrMapping/>
-  </p:clrMapOvr>
-  <p:timing>
-    <p:tnLst>
-      <p:par>
-        <p:cTn id="1" dur="indefinite" restart="never" nodeType="tmRoot"/>
-      </p:par>
-    </p:tnLst>
-  </p:timing>
-</p:sld>
-</file>
-
 <file path=ppt/slides/slide31.xml><?xml version="1.0" encoding="utf-8"?>
 <p:sld xmlns:a="http://schemas.openxmlformats.org/drawingml/2006/main" xmlns:r="http://schemas.openxmlformats.org/officeDocument/2006/relationships" xmlns:p="http://schemas.openxmlformats.org/presentationml/2006/main">
   <p:cSld>
@@ -12740,6 +12708,97 @@
       </p:grpSpPr>
       <p:sp>
         <p:nvSpPr>
+          <p:cNvPr id="2" name="Content Placeholder 1"/>
+          <p:cNvSpPr>
+            <a:spLocks noGrp="1"/>
+          </p:cNvSpPr>
+          <p:nvPr>
+            <p:ph idx="1"/>
+          </p:nvPr>
+        </p:nvSpPr>
+        <p:spPr>
+          <a:xfrm>
+            <a:off x="457200" y="1481328"/>
+            <a:ext cx="8472518" cy="4525963"/>
+          </a:xfrm>
+        </p:spPr>
+        <p:txBody>
+          <a:bodyPr>
+            <a:normAutofit/>
+          </a:bodyPr>
+          <a:lstStyle/>
+          <a:p>
+            <a:r>
+              <a:rPr lang="es-AR" dirty="0" smtClean="0"/>
+              <a:t>Etapa 4: Feature Vectors</a:t>
+            </a:r>
+          </a:p>
+          <a:p>
+            <a:endParaRPr lang="es-AR" dirty="0" smtClean="0"/>
+          </a:p>
+          <a:p>
+            <a:pPr lvl="1"/>
+            <a:r>
+              <a:rPr lang="es-AR" dirty="0" smtClean="0"/>
+              <a:t>Ordenar los autovectores por sus autovalores.</a:t>
+            </a:r>
+          </a:p>
+          <a:p>
+            <a:pPr lvl="2"/>
+            <a:r>
+              <a:rPr lang="es-AR" dirty="0" smtClean="0"/>
+              <a:t>De mayor a menor.</a:t>
+            </a:r>
+          </a:p>
+          <a:p>
+            <a:pPr lvl="2"/>
+            <a:endParaRPr lang="es-AR" dirty="0" smtClean="0"/>
+          </a:p>
+          <a:p>
+            <a:pPr lvl="1"/>
+            <a:r>
+              <a:rPr lang="es-AR" dirty="0" smtClean="0"/>
+              <a:t>Calcula los componentes en orden, de acuerdo a su importancia.</a:t>
+            </a:r>
+          </a:p>
+          <a:p>
+            <a:pPr lvl="1"/>
+            <a:endParaRPr lang="es-AR" dirty="0" smtClean="0"/>
+          </a:p>
+          <a:p>
+            <a:pPr lvl="1"/>
+            <a:r>
+              <a:rPr lang="es-AR" dirty="0" smtClean="0"/>
+              <a:t>Permite que la información sea comprimida y los vectores mas </a:t>
+            </a:r>
+            <a:r>
+              <a:rPr lang="es-AR" i="1" dirty="0" smtClean="0"/>
+              <a:t>débiles</a:t>
+            </a:r>
+            <a:r>
+              <a:rPr lang="es-AR" dirty="0" smtClean="0"/>
+              <a:t> sean removidos.</a:t>
+            </a:r>
+          </a:p>
+          <a:p>
+            <a:pPr lvl="2"/>
+            <a:r>
+              <a:rPr lang="es-AR" dirty="0" smtClean="0"/>
+              <a:t>Información perdida puede considererse “insignificante”.</a:t>
+            </a:r>
+          </a:p>
+          <a:p>
+            <a:pPr lvl="1"/>
+            <a:endParaRPr lang="es-AR" dirty="0" smtClean="0"/>
+          </a:p>
+          <a:p>
+            <a:pPr lvl="1"/>
+            <a:endParaRPr lang="es-AR" dirty="0"/>
+          </a:p>
+        </p:txBody>
+      </p:sp>
+      <p:sp>
+        <p:nvSpPr>
           <p:cNvPr id="3" name="Title 2"/>
           <p:cNvSpPr>
             <a:spLocks noGrp="1"/>
@@ -12759,74 +12818,6 @@
               <a:t>Principal Components</a:t>
             </a:r>
             <a:endParaRPr lang="es-AR" dirty="0"/>
-          </a:p>
-        </p:txBody>
-      </p:sp>
-      <p:pic>
-        <p:nvPicPr>
-          <p:cNvPr id="4099" name="Picture 3" descr="E:\Code\ITBA\TrabajosPracticos\doc\clase\img\ACP\Feature_vectors_ejemplo.png"/>
-          <p:cNvPicPr>
-            <a:picLocks noChangeAspect="1" noChangeArrowheads="1"/>
-          </p:cNvPicPr>
-          <p:nvPr/>
-        </p:nvPicPr>
-        <p:blipFill>
-          <a:blip r:embed="rId2"/>
-          <a:srcRect/>
-          <a:stretch>
-            <a:fillRect/>
-          </a:stretch>
-        </p:blipFill>
-        <p:spPr bwMode="auto">
-          <a:xfrm>
-            <a:off x="1214414" y="1428736"/>
-            <a:ext cx="6786610" cy="4611976"/>
-          </a:xfrm>
-          <a:prstGeom prst="rect">
-            <a:avLst/>
-          </a:prstGeom>
-          <a:noFill/>
-        </p:spPr>
-      </p:pic>
-      <p:sp>
-        <p:nvSpPr>
-          <p:cNvPr id="8" name="Frame 7"/>
-          <p:cNvSpPr/>
-          <p:nvPr/>
-        </p:nvSpPr>
-        <p:spPr>
-          <a:xfrm>
-            <a:off x="1142976" y="4643446"/>
-            <a:ext cx="6929486" cy="1428760"/>
-          </a:xfrm>
-          <a:prstGeom prst="frame">
-            <a:avLst/>
-          </a:prstGeom>
-        </p:spPr>
-        <p:style>
-          <a:lnRef idx="2">
-            <a:schemeClr val="accent2"/>
-          </a:lnRef>
-          <a:fillRef idx="1">
-            <a:schemeClr val="lt1"/>
-          </a:fillRef>
-          <a:effectRef idx="0">
-            <a:schemeClr val="accent2"/>
-          </a:effectRef>
-          <a:fontRef idx="minor">
-            <a:schemeClr val="dk1"/>
-          </a:fontRef>
-        </p:style>
-        <p:txBody>
-          <a:bodyPr rtlCol="0" anchor="ctr"/>
-          <a:lstStyle/>
-          <a:p>
-            <a:pPr algn="ctr"/>
-            <a:endParaRPr lang="es-AR">
-              <a:solidFill>
-                <a:schemeClr val="tx1"/>
-              </a:solidFill>
-            </a:endParaRPr>
           </a:p>
         </p:txBody>
       </p:sp>
@@ -12864,47 +12855,6 @@
       </p:grpSpPr>
       <p:sp>
         <p:nvSpPr>
-          <p:cNvPr id="2" name="Content Placeholder 1"/>
-          <p:cNvSpPr>
-            <a:spLocks noGrp="1"/>
-          </p:cNvSpPr>
-          <p:nvPr>
-            <p:ph idx="1"/>
-          </p:nvPr>
-        </p:nvSpPr>
-        <p:spPr/>
-        <p:txBody>
-          <a:bodyPr/>
-          <a:lstStyle/>
-          <a:p>
-            <a:r>
-              <a:rPr lang="es-AR" dirty="0" smtClean="0"/>
-              <a:t>Etapa 5: Trasposición</a:t>
-            </a:r>
-          </a:p>
-          <a:p>
-            <a:endParaRPr lang="es-AR" dirty="0" smtClean="0"/>
-          </a:p>
-          <a:p>
-            <a:pPr lvl="1"/>
-            <a:r>
-              <a:rPr lang="es-AR" dirty="0" smtClean="0"/>
-              <a:t>La última etapa en A.C.P. es tomar la traspuesta del </a:t>
-            </a:r>
-            <a:r>
-              <a:rPr lang="es-AR" i="1" dirty="0" smtClean="0"/>
-              <a:t>feature vector</a:t>
-            </a:r>
-            <a:r>
-              <a:rPr lang="es-AR" dirty="0" smtClean="0"/>
-              <a:t> y multiplicarlo por la traspuesta de cada matriz de datos (la matriz ajustada en la primera etapa).</a:t>
-            </a:r>
-            <a:endParaRPr lang="es-AR" dirty="0"/>
-          </a:p>
-        </p:txBody>
-      </p:sp>
-      <p:sp>
-        <p:nvSpPr>
           <p:cNvPr id="3" name="Title 2"/>
           <p:cNvSpPr>
             <a:spLocks noGrp="1"/>
@@ -12924,6 +12874,74 @@
               <a:t>Principal Components</a:t>
             </a:r>
             <a:endParaRPr lang="es-AR" dirty="0"/>
+          </a:p>
+        </p:txBody>
+      </p:sp>
+      <p:pic>
+        <p:nvPicPr>
+          <p:cNvPr id="4099" name="Picture 3" descr="E:\Code\ITBA\TrabajosPracticos\doc\clase\img\ACP\Feature_vectors_ejemplo.png"/>
+          <p:cNvPicPr>
+            <a:picLocks noChangeAspect="1" noChangeArrowheads="1"/>
+          </p:cNvPicPr>
+          <p:nvPr/>
+        </p:nvPicPr>
+        <p:blipFill>
+          <a:blip r:embed="rId2"/>
+          <a:srcRect/>
+          <a:stretch>
+            <a:fillRect/>
+          </a:stretch>
+        </p:blipFill>
+        <p:spPr bwMode="auto">
+          <a:xfrm>
+            <a:off x="1214414" y="1428736"/>
+            <a:ext cx="6786610" cy="4611976"/>
+          </a:xfrm>
+          <a:prstGeom prst="rect">
+            <a:avLst/>
+          </a:prstGeom>
+          <a:noFill/>
+        </p:spPr>
+      </p:pic>
+      <p:sp>
+        <p:nvSpPr>
+          <p:cNvPr id="8" name="Frame 7"/>
+          <p:cNvSpPr/>
+          <p:nvPr/>
+        </p:nvSpPr>
+        <p:spPr>
+          <a:xfrm>
+            <a:off x="1142976" y="4643446"/>
+            <a:ext cx="6929486" cy="1428760"/>
+          </a:xfrm>
+          <a:prstGeom prst="frame">
+            <a:avLst/>
+          </a:prstGeom>
+        </p:spPr>
+        <p:style>
+          <a:lnRef idx="2">
+            <a:schemeClr val="accent2"/>
+          </a:lnRef>
+          <a:fillRef idx="1">
+            <a:schemeClr val="lt1"/>
+          </a:fillRef>
+          <a:effectRef idx="0">
+            <a:schemeClr val="accent2"/>
+          </a:effectRef>
+          <a:fontRef idx="minor">
+            <a:schemeClr val="dk1"/>
+          </a:fontRef>
+        </p:style>
+        <p:txBody>
+          <a:bodyPr rtlCol="0" anchor="ctr"/>
+          <a:lstStyle/>
+          <a:p>
+            <a:pPr algn="ctr"/>
+            <a:endParaRPr lang="es-AR">
+              <a:solidFill>
+                <a:schemeClr val="tx1"/>
+              </a:solidFill>
+            </a:endParaRPr>
           </a:p>
         </p:txBody>
       </p:sp>
@@ -12943,6 +12961,103 @@
 </file>
 
 <file path=ppt/slides/slide33.xml><?xml version="1.0" encoding="utf-8"?>
+<p:sld xmlns:a="http://schemas.openxmlformats.org/drawingml/2006/main" xmlns:r="http://schemas.openxmlformats.org/officeDocument/2006/relationships" xmlns:p="http://schemas.openxmlformats.org/presentationml/2006/main">
+  <p:cSld>
+    <p:spTree>
+      <p:nvGrpSpPr>
+        <p:cNvPr id="1" name=""/>
+        <p:cNvGrpSpPr/>
+        <p:nvPr/>
+      </p:nvGrpSpPr>
+      <p:grpSpPr>
+        <a:xfrm>
+          <a:off x="0" y="0"/>
+          <a:ext cx="0" cy="0"/>
+          <a:chOff x="0" y="0"/>
+          <a:chExt cx="0" cy="0"/>
+        </a:xfrm>
+      </p:grpSpPr>
+      <p:sp>
+        <p:nvSpPr>
+          <p:cNvPr id="2" name="Content Placeholder 1"/>
+          <p:cNvSpPr>
+            <a:spLocks noGrp="1"/>
+          </p:cNvSpPr>
+          <p:nvPr>
+            <p:ph idx="1"/>
+          </p:nvPr>
+        </p:nvSpPr>
+        <p:spPr/>
+        <p:txBody>
+          <a:bodyPr/>
+          <a:lstStyle/>
+          <a:p>
+            <a:r>
+              <a:rPr lang="es-AR" dirty="0" smtClean="0"/>
+              <a:t>Etapa 5: Trasposición</a:t>
+            </a:r>
+          </a:p>
+          <a:p>
+            <a:endParaRPr lang="es-AR" dirty="0" smtClean="0"/>
+          </a:p>
+          <a:p>
+            <a:pPr lvl="1"/>
+            <a:r>
+              <a:rPr lang="es-AR" dirty="0" smtClean="0"/>
+              <a:t>La última etapa en A.C.P. es tomar la traspuesta del </a:t>
+            </a:r>
+            <a:r>
+              <a:rPr lang="es-AR" i="1" dirty="0" smtClean="0"/>
+              <a:t>feature vector</a:t>
+            </a:r>
+            <a:r>
+              <a:rPr lang="es-AR" dirty="0" smtClean="0"/>
+              <a:t> y multiplicarlo por la traspuesta de cada matriz de datos (la matriz ajustada en la primera etapa).</a:t>
+            </a:r>
+            <a:endParaRPr lang="es-AR" dirty="0"/>
+          </a:p>
+        </p:txBody>
+      </p:sp>
+      <p:sp>
+        <p:nvSpPr>
+          <p:cNvPr id="3" name="Title 2"/>
+          <p:cNvSpPr>
+            <a:spLocks noGrp="1"/>
+          </p:cNvSpPr>
+          <p:nvPr>
+            <p:ph type="title"/>
+          </p:nvPr>
+        </p:nvSpPr>
+        <p:spPr/>
+        <p:txBody>
+          <a:bodyPr/>
+          <a:lstStyle/>
+          <a:p>
+            <a:pPr algn="ctr"/>
+            <a:r>
+              <a:rPr lang="es-AR" dirty="0" smtClean="0"/>
+              <a:t>Principal Components</a:t>
+            </a:r>
+            <a:endParaRPr lang="es-AR" dirty="0"/>
+          </a:p>
+        </p:txBody>
+      </p:sp>
+    </p:spTree>
+  </p:cSld>
+  <p:clrMapOvr>
+    <a:masterClrMapping/>
+  </p:clrMapOvr>
+  <p:timing>
+    <p:tnLst>
+      <p:par>
+        <p:cTn id="1" dur="indefinite" restart="never" nodeType="tmRoot"/>
+      </p:par>
+    </p:tnLst>
+  </p:timing>
+</p:sld>
+</file>
+
+<file path=ppt/slides/slide34.xml><?xml version="1.0" encoding="utf-8"?>
 <p:sld xmlns:a="http://schemas.openxmlformats.org/drawingml/2006/main" xmlns:r="http://schemas.openxmlformats.org/officeDocument/2006/relationships" xmlns:p="http://schemas.openxmlformats.org/presentationml/2006/main">
   <p:cSld>
     <p:spTree>
@@ -13217,7 +13332,7 @@
 </p:sld>
 </file>
 
-<file path=ppt/slides/slide34.xml><?xml version="1.0" encoding="utf-8"?>
+<file path=ppt/slides/slide35.xml><?xml version="1.0" encoding="utf-8"?>
 <p:sld xmlns:a="http://schemas.openxmlformats.org/drawingml/2006/main" xmlns:r="http://schemas.openxmlformats.org/officeDocument/2006/relationships" xmlns:p="http://schemas.openxmlformats.org/presentationml/2006/main">
   <p:cSld>
     <p:spTree>
@@ -13340,7 +13455,7 @@
 </p:sld>
 </file>
 
-<file path=ppt/slides/slide35.xml><?xml version="1.0" encoding="utf-8"?>
+<file path=ppt/slides/slide36.xml><?xml version="1.0" encoding="utf-8"?>
 <p:sld xmlns:a="http://schemas.openxmlformats.org/drawingml/2006/main" xmlns:r="http://schemas.openxmlformats.org/officeDocument/2006/relationships" xmlns:p="http://schemas.openxmlformats.org/presentationml/2006/main">
   <p:cSld>
     <p:spTree>
@@ -13519,7 +13634,7 @@
 </p:sld>
 </file>
 
-<file path=ppt/slides/slide36.xml><?xml version="1.0" encoding="utf-8"?>
+<file path=ppt/slides/slide37.xml><?xml version="1.0" encoding="utf-8"?>
 <p:sld xmlns:a="http://schemas.openxmlformats.org/drawingml/2006/main" xmlns:r="http://schemas.openxmlformats.org/officeDocument/2006/relationships" xmlns:p="http://schemas.openxmlformats.org/presentationml/2006/main">
   <p:cSld>
     <p:spTree>
@@ -13606,7 +13721,7 @@
 </p:sld>
 </file>
 
-<file path=ppt/slides/slide37.xml><?xml version="1.0" encoding="utf-8"?>
+<file path=ppt/slides/slide38.xml><?xml version="1.0" encoding="utf-8"?>
 <p:sld xmlns:a="http://schemas.openxmlformats.org/drawingml/2006/main" xmlns:r="http://schemas.openxmlformats.org/officeDocument/2006/relationships" xmlns:p="http://schemas.openxmlformats.org/presentationml/2006/main">
   <p:cSld>
     <p:spTree>
@@ -13681,148 +13796,6 @@
 </p:sld>
 </file>
 
-<file path=ppt/slides/slide38.xml><?xml version="1.0" encoding="utf-8"?>
-<p:sld xmlns:a="http://schemas.openxmlformats.org/drawingml/2006/main" xmlns:r="http://schemas.openxmlformats.org/officeDocument/2006/relationships" xmlns:p="http://schemas.openxmlformats.org/presentationml/2006/main">
-  <p:cSld>
-    <p:spTree>
-      <p:nvGrpSpPr>
-        <p:cNvPr id="1" name=""/>
-        <p:cNvGrpSpPr/>
-        <p:nvPr/>
-      </p:nvGrpSpPr>
-      <p:grpSpPr>
-        <a:xfrm>
-          <a:off x="0" y="0"/>
-          <a:ext cx="0" cy="0"/>
-          <a:chOff x="0" y="0"/>
-          <a:chExt cx="0" cy="0"/>
-        </a:xfrm>
-      </p:grpSpPr>
-      <p:sp>
-        <p:nvSpPr>
-          <p:cNvPr id="2" name="Content Placeholder 1"/>
-          <p:cNvSpPr>
-            <a:spLocks noGrp="1"/>
-          </p:cNvSpPr>
-          <p:nvPr>
-            <p:ph idx="1"/>
-          </p:nvPr>
-        </p:nvSpPr>
-        <p:spPr>
-          <a:xfrm>
-            <a:off x="457200" y="1481328"/>
-            <a:ext cx="8229600" cy="5019506"/>
-          </a:xfrm>
-        </p:spPr>
-        <p:txBody>
-          <a:bodyPr/>
-          <a:lstStyle/>
-          <a:p>
-            <a:r>
-              <a:rPr lang="es-AR" dirty="0" smtClean="0"/>
-              <a:t>Datos digitales extraidos de varios documentos </a:t>
-            </a:r>
-            <a:r>
-              <a:rPr lang="es-AR" i="1" dirty="0" smtClean="0"/>
-              <a:t>en papel</a:t>
-            </a:r>
-            <a:r>
-              <a:rPr lang="es-AR" dirty="0" smtClean="0"/>
-              <a:t> de diversos lugares.</a:t>
-            </a:r>
-          </a:p>
-          <a:p>
-            <a:pPr lvl="1"/>
-            <a:r>
-              <a:rPr lang="es-AR" dirty="0" smtClean="0"/>
-              <a:t>Mails</a:t>
-            </a:r>
-          </a:p>
-          <a:p>
-            <a:pPr lvl="1"/>
-            <a:r>
-              <a:rPr lang="es-AR" dirty="0" smtClean="0"/>
-              <a:t>Cheques de bancos</a:t>
-            </a:r>
-          </a:p>
-          <a:p>
-            <a:pPr lvl="1"/>
-            <a:r>
-              <a:rPr lang="es-AR" dirty="0" smtClean="0"/>
-              <a:t>... </a:t>
-            </a:r>
-          </a:p>
-          <a:p>
-            <a:pPr lvl="1"/>
-            <a:endParaRPr lang="es-AR" dirty="0" smtClean="0"/>
-          </a:p>
-          <a:p>
-            <a:r>
-              <a:rPr lang="es-AR" dirty="0" smtClean="0"/>
-              <a:t>Set para Entrenamiento</a:t>
-            </a:r>
-          </a:p>
-          <a:p>
-            <a:pPr lvl="1"/>
-            <a:r>
-              <a:rPr lang="es-AR" dirty="0" smtClean="0"/>
-              <a:t>Patrones de escrituras de aproximadamente 130 escritores diferentes.</a:t>
-            </a:r>
-          </a:p>
-          <a:p>
-            <a:pPr lvl="1"/>
-            <a:r>
-              <a:rPr lang="es-AR" dirty="0" smtClean="0"/>
-              <a:t>920 patrones de digitos distintos.</a:t>
-            </a:r>
-          </a:p>
-          <a:p>
-            <a:pPr lvl="1"/>
-            <a:endParaRPr lang="es-AR" dirty="0" smtClean="0"/>
-          </a:p>
-        </p:txBody>
-      </p:sp>
-      <p:sp>
-        <p:nvSpPr>
-          <p:cNvPr id="3" name="Title 2"/>
-          <p:cNvSpPr>
-            <a:spLocks noGrp="1"/>
-          </p:cNvSpPr>
-          <p:nvPr>
-            <p:ph type="title"/>
-          </p:nvPr>
-        </p:nvSpPr>
-        <p:spPr/>
-        <p:txBody>
-          <a:bodyPr>
-            <a:normAutofit/>
-          </a:bodyPr>
-          <a:lstStyle/>
-          <a:p>
-            <a:pPr algn="ctr"/>
-            <a:r>
-              <a:rPr lang="es-AR" dirty="0" smtClean="0"/>
-              <a:t>Resultados</a:t>
-            </a:r>
-            <a:endParaRPr lang="es-AR" dirty="0"/>
-          </a:p>
-        </p:txBody>
-      </p:sp>
-    </p:spTree>
-  </p:cSld>
-  <p:clrMapOvr>
-    <a:masterClrMapping/>
-  </p:clrMapOvr>
-  <p:timing>
-    <p:tnLst>
-      <p:par>
-        <p:cTn id="1" dur="indefinite" restart="never" nodeType="tmRoot"/>
-      </p:par>
-    </p:tnLst>
-  </p:timing>
-</p:sld>
-</file>
-
 <file path=ppt/slides/slide39.xml><?xml version="1.0" encoding="utf-8"?>
 <p:sld xmlns:a="http://schemas.openxmlformats.org/drawingml/2006/main" xmlns:r="http://schemas.openxmlformats.org/officeDocument/2006/relationships" xmlns:p="http://schemas.openxmlformats.org/presentationml/2006/main">
   <p:cSld>
@@ -13850,21 +13823,48 @@
             <p:ph idx="1"/>
           </p:nvPr>
         </p:nvSpPr>
-        <p:spPr/>
+        <p:spPr>
+          <a:xfrm>
+            <a:off x="457200" y="1481328"/>
+            <a:ext cx="8229600" cy="5019506"/>
+          </a:xfrm>
+        </p:spPr>
         <p:txBody>
           <a:bodyPr/>
           <a:lstStyle/>
           <a:p>
             <a:r>
               <a:rPr lang="es-AR" dirty="0" smtClean="0"/>
-              <a:t>Set de testeo</a:t>
+              <a:t>Datos digitales extraidos de varios documentos </a:t>
+            </a:r>
+            <a:r>
+              <a:rPr lang="es-AR" i="1" dirty="0" smtClean="0"/>
+              <a:t>en papel</a:t>
+            </a:r>
+            <a:r>
+              <a:rPr lang="es-AR" dirty="0" smtClean="0"/>
+              <a:t> de diversos lugares.</a:t>
             </a:r>
           </a:p>
           <a:p>
             <a:pPr lvl="1"/>
             <a:r>
               <a:rPr lang="es-AR" dirty="0" smtClean="0"/>
-              <a:t>300 digitos para cada test.</a:t>
+              <a:t>Mails</a:t>
+            </a:r>
+          </a:p>
+          <a:p>
+            <a:pPr lvl="1"/>
+            <a:r>
+              <a:rPr lang="es-AR" dirty="0" smtClean="0"/>
+              <a:t>Cheques de bancos</a:t>
+            </a:r>
+          </a:p>
+          <a:p>
+            <a:pPr lvl="1"/>
+            <a:r>
+              <a:rPr lang="es-AR" dirty="0" smtClean="0"/>
+              <a:t>... </a:t>
             </a:r>
           </a:p>
           <a:p>
@@ -13874,16 +13874,26 @@
           <a:p>
             <a:r>
               <a:rPr lang="es-AR" dirty="0" smtClean="0"/>
-              <a:t>Cada patrón almacenado estaba representado por un </a:t>
-            </a:r>
-            <a:r>
-              <a:rPr lang="es-AR" i="1" dirty="0" smtClean="0"/>
-              <a:t>feature vector</a:t>
-            </a:r>
-            <a:r>
-              <a:rPr lang="es-AR" dirty="0" smtClean="0"/>
-              <a:t> de 10 elementos.</a:t>
-            </a:r>
+              <a:t>Set para Entrenamiento</a:t>
+            </a:r>
+          </a:p>
+          <a:p>
+            <a:pPr lvl="1"/>
+            <a:r>
+              <a:rPr lang="es-AR" dirty="0" smtClean="0"/>
+              <a:t>Patrones de escrituras de aproximadamente 130 escritores diferentes.</a:t>
+            </a:r>
+          </a:p>
+          <a:p>
+            <a:pPr lvl="1"/>
+            <a:r>
+              <a:rPr lang="es-AR" dirty="0" smtClean="0"/>
+              <a:t>920 patrones de digitos distintos.</a:t>
+            </a:r>
+          </a:p>
+          <a:p>
+            <a:pPr lvl="1"/>
+            <a:endParaRPr lang="es-AR" dirty="0" smtClean="0"/>
           </a:p>
         </p:txBody>
       </p:sp>
@@ -13899,7 +13909,9 @@
         </p:nvSpPr>
         <p:spPr/>
         <p:txBody>
-          <a:bodyPr/>
+          <a:bodyPr>
+            <a:normAutofit/>
+          </a:bodyPr>
           <a:lstStyle/>
           <a:p>
             <a:pPr algn="ctr"/>
@@ -14048,6 +14060,109 @@
 </file>
 
 <file path=ppt/slides/slide40.xml><?xml version="1.0" encoding="utf-8"?>
+<p:sld xmlns:a="http://schemas.openxmlformats.org/drawingml/2006/main" xmlns:r="http://schemas.openxmlformats.org/officeDocument/2006/relationships" xmlns:p="http://schemas.openxmlformats.org/presentationml/2006/main">
+  <p:cSld>
+    <p:spTree>
+      <p:nvGrpSpPr>
+        <p:cNvPr id="1" name=""/>
+        <p:cNvGrpSpPr/>
+        <p:nvPr/>
+      </p:nvGrpSpPr>
+      <p:grpSpPr>
+        <a:xfrm>
+          <a:off x="0" y="0"/>
+          <a:ext cx="0" cy="0"/>
+          <a:chOff x="0" y="0"/>
+          <a:chExt cx="0" cy="0"/>
+        </a:xfrm>
+      </p:grpSpPr>
+      <p:sp>
+        <p:nvSpPr>
+          <p:cNvPr id="2" name="Content Placeholder 1"/>
+          <p:cNvSpPr>
+            <a:spLocks noGrp="1"/>
+          </p:cNvSpPr>
+          <p:nvPr>
+            <p:ph idx="1"/>
+          </p:nvPr>
+        </p:nvSpPr>
+        <p:spPr/>
+        <p:txBody>
+          <a:bodyPr/>
+          <a:lstStyle/>
+          <a:p>
+            <a:r>
+              <a:rPr lang="es-AR" dirty="0" smtClean="0"/>
+              <a:t>Set de testeo</a:t>
+            </a:r>
+          </a:p>
+          <a:p>
+            <a:pPr lvl="1"/>
+            <a:r>
+              <a:rPr lang="es-AR" dirty="0" smtClean="0"/>
+              <a:t>300 digitos para cada test.</a:t>
+            </a:r>
+          </a:p>
+          <a:p>
+            <a:pPr lvl="1"/>
+            <a:endParaRPr lang="es-AR" dirty="0" smtClean="0"/>
+          </a:p>
+          <a:p>
+            <a:r>
+              <a:rPr lang="es-AR" dirty="0" smtClean="0"/>
+              <a:t>Cada patrón almacenado estaba representado por un </a:t>
+            </a:r>
+            <a:r>
+              <a:rPr lang="es-AR" i="1" dirty="0" smtClean="0"/>
+              <a:t>feature vector</a:t>
+            </a:r>
+            <a:r>
+              <a:rPr lang="es-AR" dirty="0" smtClean="0"/>
+              <a:t> de 10 elementos.</a:t>
+            </a:r>
+          </a:p>
+        </p:txBody>
+      </p:sp>
+      <p:sp>
+        <p:nvSpPr>
+          <p:cNvPr id="3" name="Title 2"/>
+          <p:cNvSpPr>
+            <a:spLocks noGrp="1"/>
+          </p:cNvSpPr>
+          <p:nvPr>
+            <p:ph type="title"/>
+          </p:nvPr>
+        </p:nvSpPr>
+        <p:spPr/>
+        <p:txBody>
+          <a:bodyPr/>
+          <a:lstStyle/>
+          <a:p>
+            <a:pPr algn="ctr"/>
+            <a:r>
+              <a:rPr lang="es-AR" dirty="0" smtClean="0"/>
+              <a:t>Resultados</a:t>
+            </a:r>
+            <a:endParaRPr lang="es-AR" dirty="0"/>
+          </a:p>
+        </p:txBody>
+      </p:sp>
+    </p:spTree>
+  </p:cSld>
+  <p:clrMapOvr>
+    <a:masterClrMapping/>
+  </p:clrMapOvr>
+  <p:timing>
+    <p:tnLst>
+      <p:par>
+        <p:cTn id="1" dur="indefinite" restart="never" nodeType="tmRoot"/>
+      </p:par>
+    </p:tnLst>
+  </p:timing>
+</p:sld>
+</file>
+
+<file path=ppt/slides/slide41.xml><?xml version="1.0" encoding="utf-8"?>
 <p:sld xmlns:a="http://schemas.openxmlformats.org/drawingml/2006/main" xmlns:r="http://schemas.openxmlformats.org/officeDocument/2006/relationships" xmlns:p="http://schemas.openxmlformats.org/presentationml/2006/main">
   <p:cSld>
     <p:spTree>
@@ -14268,95 +14383,6 @@
 </p:sld>
 </file>
 
-<file path=ppt/slides/slide41.xml><?xml version="1.0" encoding="utf-8"?>
-<p:sld xmlns:a="http://schemas.openxmlformats.org/drawingml/2006/main" xmlns:r="http://schemas.openxmlformats.org/officeDocument/2006/relationships" xmlns:p="http://schemas.openxmlformats.org/presentationml/2006/main">
-  <p:cSld>
-    <p:spTree>
-      <p:nvGrpSpPr>
-        <p:cNvPr id="1" name=""/>
-        <p:cNvGrpSpPr/>
-        <p:nvPr/>
-      </p:nvGrpSpPr>
-      <p:grpSpPr>
-        <a:xfrm>
-          <a:off x="0" y="0"/>
-          <a:ext cx="0" cy="0"/>
-          <a:chOff x="0" y="0"/>
-          <a:chExt cx="0" cy="0"/>
-        </a:xfrm>
-      </p:grpSpPr>
-      <p:sp>
-        <p:nvSpPr>
-          <p:cNvPr id="2" name="Content Placeholder 1"/>
-          <p:cNvSpPr>
-            <a:spLocks noGrp="1"/>
-          </p:cNvSpPr>
-          <p:nvPr>
-            <p:ph idx="1"/>
-          </p:nvPr>
-        </p:nvSpPr>
-        <p:spPr/>
-        <p:txBody>
-          <a:bodyPr/>
-          <a:lstStyle/>
-          <a:p>
-            <a:r>
-              <a:rPr lang="es-AR" dirty="0" smtClean="0"/>
-              <a:t>Capacidad de analisis:</a:t>
-            </a:r>
-          </a:p>
-          <a:p>
-            <a:pPr lvl="1"/>
-            <a:r>
-              <a:rPr lang="es-AR" dirty="0" smtClean="0"/>
-              <a:t>30 caracteres por segundo.</a:t>
-            </a:r>
-          </a:p>
-          <a:p>
-            <a:pPr lvl="1"/>
-            <a:r>
-              <a:rPr lang="es-AR" dirty="0" smtClean="0"/>
-              <a:t>Sin optimizaciones.</a:t>
-            </a:r>
-          </a:p>
-          <a:p>
-            <a:pPr lvl="1"/>
-            <a:endParaRPr lang="es-AR" dirty="0"/>
-          </a:p>
-        </p:txBody>
-      </p:sp>
-      <p:sp>
-        <p:nvSpPr>
-          <p:cNvPr id="3" name="Title 2"/>
-          <p:cNvSpPr>
-            <a:spLocks noGrp="1"/>
-          </p:cNvSpPr>
-          <p:nvPr>
-            <p:ph type="title"/>
-          </p:nvPr>
-        </p:nvSpPr>
-        <p:spPr/>
-        <p:txBody>
-          <a:bodyPr/>
-          <a:lstStyle/>
-          <a:p>
-            <a:pPr algn="ctr"/>
-            <a:r>
-              <a:rPr lang="es-AR" dirty="0" smtClean="0"/>
-              <a:t>Resultados</a:t>
-            </a:r>
-            <a:endParaRPr lang="es-AR" dirty="0"/>
-          </a:p>
-        </p:txBody>
-      </p:sp>
-    </p:spTree>
-  </p:cSld>
-  <p:clrMapOvr>
-    <a:masterClrMapping/>
-  </p:clrMapOvr>
-</p:sld>
-</file>
-
 <file path=ppt/slides/slide42.xml><?xml version="1.0" encoding="utf-8"?>
 <p:sld xmlns:a="http://schemas.openxmlformats.org/drawingml/2006/main" xmlns:r="http://schemas.openxmlformats.org/officeDocument/2006/relationships" xmlns:p="http://schemas.openxmlformats.org/presentationml/2006/main">
   <p:cSld>
@@ -14386,66 +14412,31 @@
         </p:nvSpPr>
         <p:spPr/>
         <p:txBody>
-          <a:bodyPr>
-            <a:normAutofit/>
-          </a:bodyPr>
+          <a:bodyPr/>
           <a:lstStyle/>
           <a:p>
             <a:r>
               <a:rPr lang="es-AR" dirty="0" smtClean="0"/>
-              <a:t>Liu and Sako</a:t>
+              <a:t>Capacidad de analisis:</a:t>
             </a:r>
           </a:p>
           <a:p>
             <a:pPr lvl="1"/>
             <a:r>
               <a:rPr lang="es-AR" dirty="0" smtClean="0"/>
-              <a:t>Caracteres manuscritos.</a:t>
+              <a:t>30 caracteres por segundo.</a:t>
             </a:r>
           </a:p>
           <a:p>
             <a:pPr lvl="1"/>
             <a:r>
               <a:rPr lang="es-AR" dirty="0" smtClean="0"/>
-              <a:t>Funcion de discriminante cuadrado.</a:t>
+              <a:t>Sin optimizaciones.</a:t>
             </a:r>
           </a:p>
           <a:p>
             <a:pPr lvl="1"/>
-            <a:r>
-              <a:rPr lang="es-AR" dirty="0" smtClean="0"/>
-              <a:t>98% éxito.</a:t>
-            </a:r>
-          </a:p>
-          <a:p>
-            <a:endParaRPr lang="es-AR" dirty="0" smtClean="0"/>
-          </a:p>
-          <a:p>
-            <a:r>
-              <a:rPr lang="es-AR" dirty="0" smtClean="0"/>
-              <a:t>Kaufman and Bunke</a:t>
-            </a:r>
-          </a:p>
-          <a:p>
-            <a:pPr lvl="1"/>
-            <a:r>
-              <a:rPr lang="es-AR" dirty="0" smtClean="0"/>
-              <a:t>Cadenas ocultas de Markov.</a:t>
-            </a:r>
-          </a:p>
-          <a:p>
-            <a:pPr lvl="1"/>
-            <a:r>
-              <a:rPr lang="es-AR" dirty="0" smtClean="0"/>
-              <a:t>Reconocimiento de digitos.</a:t>
-            </a:r>
-          </a:p>
-          <a:p>
-            <a:pPr lvl="1"/>
-            <a:r>
-              <a:rPr lang="es-AR" dirty="0" smtClean="0"/>
-              <a:t>87% éxito.</a:t>
-            </a:r>
+            <a:endParaRPr lang="es-AR" dirty="0"/>
           </a:p>
         </p:txBody>
       </p:sp>
@@ -14467,7 +14458,7 @@
             <a:pPr algn="ctr"/>
             <a:r>
               <a:rPr lang="es-AR" dirty="0" smtClean="0"/>
-              <a:t>Resultados de otros autores</a:t>
+              <a:t>Resultados</a:t>
             </a:r>
             <a:endParaRPr lang="es-AR" dirty="0"/>
           </a:p>
@@ -14478,13 +14469,6 @@
   <p:clrMapOvr>
     <a:masterClrMapping/>
   </p:clrMapOvr>
-  <p:timing>
-    <p:tnLst>
-      <p:par>
-        <p:cTn id="1" dur="indefinite" restart="never" nodeType="tmRoot"/>
-      </p:par>
-    </p:tnLst>
-  </p:timing>
 </p:sld>
 </file>
 
@@ -14517,33 +14501,35 @@
         </p:nvSpPr>
         <p:spPr/>
         <p:txBody>
-          <a:bodyPr/>
+          <a:bodyPr>
+            <a:normAutofit/>
+          </a:bodyPr>
           <a:lstStyle/>
           <a:p>
             <a:r>
               <a:rPr lang="es-AR" dirty="0" smtClean="0"/>
-              <a:t>Aissaoui and Haouari</a:t>
+              <a:t>Liu and Sako</a:t>
             </a:r>
           </a:p>
           <a:p>
             <a:pPr lvl="1"/>
             <a:r>
               <a:rPr lang="es-AR" dirty="0" smtClean="0"/>
-              <a:t>Descriptores de Furier nrmalizados.</a:t>
+              <a:t>Caracteres manuscritos.</a:t>
             </a:r>
           </a:p>
           <a:p>
             <a:pPr lvl="1"/>
             <a:r>
               <a:rPr lang="es-AR" dirty="0" smtClean="0"/>
-              <a:t>Reconocimiento de caracteres.</a:t>
+              <a:t>Funcion de discriminante cuadrado.</a:t>
             </a:r>
           </a:p>
           <a:p>
             <a:pPr lvl="1"/>
             <a:r>
               <a:rPr lang="es-AR" dirty="0" smtClean="0"/>
-              <a:t>96% éxito.</a:t>
+              <a:t>98% éxito.</a:t>
             </a:r>
           </a:p>
           <a:p>
@@ -14552,14 +14538,14 @@
           <a:p>
             <a:r>
               <a:rPr lang="es-AR" dirty="0" smtClean="0"/>
-              <a:t>Bellili</a:t>
+              <a:t>Kaufman and Bunke</a:t>
             </a:r>
           </a:p>
           <a:p>
             <a:pPr lvl="1"/>
             <a:r>
               <a:rPr lang="es-AR" dirty="0" smtClean="0"/>
-              <a:t>MLP-SVM.</a:t>
+              <a:t>Cadenas ocultas de Markov.</a:t>
             </a:r>
           </a:p>
           <a:p>
@@ -14573,9 +14559,8 @@
             <a:pPr lvl="1"/>
             <a:r>
               <a:rPr lang="es-AR" dirty="0" smtClean="0"/>
-              <a:t>98% éxito.</a:t>
-            </a:r>
-            <a:endParaRPr lang="es-AR" dirty="0"/>
+              <a:t>87% éxito.</a:t>
+            </a:r>
           </a:p>
         </p:txBody>
       </p:sp>
@@ -14652,6 +14637,136 @@
           <a:p>
             <a:r>
               <a:rPr lang="es-AR" dirty="0" smtClean="0"/>
+              <a:t>Aissaoui and Haouari</a:t>
+            </a:r>
+          </a:p>
+          <a:p>
+            <a:pPr lvl="1"/>
+            <a:r>
+              <a:rPr lang="es-AR" dirty="0" smtClean="0"/>
+              <a:t>Descriptores de Furier nrmalizados.</a:t>
+            </a:r>
+          </a:p>
+          <a:p>
+            <a:pPr lvl="1"/>
+            <a:r>
+              <a:rPr lang="es-AR" dirty="0" smtClean="0"/>
+              <a:t>Reconocimiento de caracteres.</a:t>
+            </a:r>
+          </a:p>
+          <a:p>
+            <a:pPr lvl="1"/>
+            <a:r>
+              <a:rPr lang="es-AR" dirty="0" smtClean="0"/>
+              <a:t>96% éxito.</a:t>
+            </a:r>
+          </a:p>
+          <a:p>
+            <a:endParaRPr lang="es-AR" dirty="0" smtClean="0"/>
+          </a:p>
+          <a:p>
+            <a:r>
+              <a:rPr lang="es-AR" dirty="0" smtClean="0"/>
+              <a:t>Bellili</a:t>
+            </a:r>
+          </a:p>
+          <a:p>
+            <a:pPr lvl="1"/>
+            <a:r>
+              <a:rPr lang="es-AR" dirty="0" smtClean="0"/>
+              <a:t>MLP-SVM.</a:t>
+            </a:r>
+          </a:p>
+          <a:p>
+            <a:pPr lvl="1"/>
+            <a:r>
+              <a:rPr lang="es-AR" dirty="0" smtClean="0"/>
+              <a:t>Reconocimiento de digitos.</a:t>
+            </a:r>
+          </a:p>
+          <a:p>
+            <a:pPr lvl="1"/>
+            <a:r>
+              <a:rPr lang="es-AR" dirty="0" smtClean="0"/>
+              <a:t>98% éxito.</a:t>
+            </a:r>
+            <a:endParaRPr lang="es-AR" dirty="0"/>
+          </a:p>
+        </p:txBody>
+      </p:sp>
+      <p:sp>
+        <p:nvSpPr>
+          <p:cNvPr id="3" name="Title 2"/>
+          <p:cNvSpPr>
+            <a:spLocks noGrp="1"/>
+          </p:cNvSpPr>
+          <p:nvPr>
+            <p:ph type="title"/>
+          </p:nvPr>
+        </p:nvSpPr>
+        <p:spPr/>
+        <p:txBody>
+          <a:bodyPr/>
+          <a:lstStyle/>
+          <a:p>
+            <a:pPr algn="ctr"/>
+            <a:r>
+              <a:rPr lang="es-AR" dirty="0" smtClean="0"/>
+              <a:t>Resultados de otros autores</a:t>
+            </a:r>
+            <a:endParaRPr lang="es-AR" dirty="0"/>
+          </a:p>
+        </p:txBody>
+      </p:sp>
+    </p:spTree>
+  </p:cSld>
+  <p:clrMapOvr>
+    <a:masterClrMapping/>
+  </p:clrMapOvr>
+  <p:timing>
+    <p:tnLst>
+      <p:par>
+        <p:cTn id="1" dur="indefinite" restart="never" nodeType="tmRoot"/>
+      </p:par>
+    </p:tnLst>
+  </p:timing>
+</p:sld>
+</file>
+
+<file path=ppt/slides/slide45.xml><?xml version="1.0" encoding="utf-8"?>
+<p:sld xmlns:a="http://schemas.openxmlformats.org/drawingml/2006/main" xmlns:r="http://schemas.openxmlformats.org/officeDocument/2006/relationships" xmlns:p="http://schemas.openxmlformats.org/presentationml/2006/main">
+  <p:cSld>
+    <p:spTree>
+      <p:nvGrpSpPr>
+        <p:cNvPr id="1" name=""/>
+        <p:cNvGrpSpPr/>
+        <p:nvPr/>
+      </p:nvGrpSpPr>
+      <p:grpSpPr>
+        <a:xfrm>
+          <a:off x="0" y="0"/>
+          <a:ext cx="0" cy="0"/>
+          <a:chOff x="0" y="0"/>
+          <a:chExt cx="0" cy="0"/>
+        </a:xfrm>
+      </p:grpSpPr>
+      <p:sp>
+        <p:nvSpPr>
+          <p:cNvPr id="2" name="Content Placeholder 1"/>
+          <p:cNvSpPr>
+            <a:spLocks noGrp="1"/>
+          </p:cNvSpPr>
+          <p:nvPr>
+            <p:ph idx="1"/>
+          </p:nvPr>
+        </p:nvSpPr>
+        <p:spPr/>
+        <p:txBody>
+          <a:bodyPr/>
+          <a:lstStyle/>
+          <a:p>
+            <a:r>
+              <a:rPr lang="es-AR" dirty="0" smtClean="0"/>
               <a:t>La selección del total de features para cada caracter puede volverse muy problemático.</a:t>
             </a:r>
           </a:p>
@@ -14704,7 +14819,7 @@
 </p:sld>
 </file>
 
-<file path=ppt/slides/slide45.xml><?xml version="1.0" encoding="utf-8"?>
+<file path=ppt/slides/slide46.xml><?xml version="1.0" encoding="utf-8"?>
 <p:sld xmlns:a="http://schemas.openxmlformats.org/drawingml/2006/main" xmlns:r="http://schemas.openxmlformats.org/officeDocument/2006/relationships" xmlns:p="http://schemas.openxmlformats.org/presentationml/2006/main">
   <p:cSld>
     <p:spTree>
@@ -14962,32 +15077,7 @@
           <a:bodyPr/>
           <a:lstStyle/>
           <a:p>
-            <a:endParaRPr lang="es-AR" dirty="0" smtClean="0"/>
-          </a:p>
-          <a:p>
-            <a:r>
-              <a:rPr lang="es-AR" dirty="0" smtClean="0"/>
-              <a:t>Entrada: imagen a color con 3 componentes por color (RGB)</a:t>
-            </a:r>
-          </a:p>
-          <a:p>
-            <a:endParaRPr lang="es-AR" dirty="0" smtClean="0"/>
-          </a:p>
-          <a:p>
-            <a:r>
-              <a:rPr lang="es-AR" dirty="0" smtClean="0"/>
-              <a:t>Convierte la imagen a escala de 256 tonos de grises.</a:t>
-            </a:r>
-          </a:p>
-          <a:p>
-            <a:endParaRPr lang="es-AR" dirty="0" smtClean="0"/>
-          </a:p>
-          <a:p>
-            <a:r>
-              <a:rPr lang="es-AR" dirty="0" smtClean="0"/>
-              <a:t>Enfatiza detalles del carccter y facilita el procesamiento de la imagen.</a:t>
-            </a:r>
-            <a:endParaRPr lang="es-AR" dirty="0"/>
+            <a:endParaRPr lang="es-AR"/>
           </a:p>
         </p:txBody>
       </p:sp>
@@ -15006,15 +15096,41 @@
           <a:bodyPr/>
           <a:lstStyle/>
           <a:p>
-            <a:pPr lvl="0" algn="ctr"/>
-            <a:r>
-              <a:rPr lang="es-AR" dirty="0" smtClean="0"/>
-              <a:t>Filtration and Binaryzation</a:t>
+            <a:pPr algn="ctr"/>
+            <a:r>
+              <a:rPr lang="es-AR" dirty="0" smtClean="0"/>
+              <a:t>Propuesta</a:t>
             </a:r>
             <a:endParaRPr lang="es-AR" dirty="0"/>
           </a:p>
         </p:txBody>
       </p:sp>
+      <p:pic>
+        <p:nvPicPr>
+          <p:cNvPr id="1026" name="Picture 2" descr="E:\Code\ITBA\TrabajosPracticos\doc\clase\img\esquema_general.png"/>
+          <p:cNvPicPr>
+            <a:picLocks noChangeAspect="1" noChangeArrowheads="1"/>
+          </p:cNvPicPr>
+          <p:nvPr/>
+        </p:nvPicPr>
+        <p:blipFill>
+          <a:blip r:embed="rId2"/>
+          <a:srcRect/>
+          <a:stretch>
+            <a:fillRect/>
+          </a:stretch>
+        </p:blipFill>
+        <p:spPr bwMode="auto">
+          <a:xfrm>
+            <a:off x="1" y="2006358"/>
+            <a:ext cx="9144000" cy="3237143"/>
+          </a:xfrm>
+          <a:prstGeom prst="rect">
+            <a:avLst/>
+          </a:prstGeom>
+          <a:noFill/>
+        </p:spPr>
+      </p:pic>
     </p:spTree>
   </p:cSld>
   <p:clrMapOvr>
@@ -15062,37 +15178,32 @@
           <a:bodyPr/>
           <a:lstStyle/>
           <a:p>
-            <a:r>
-              <a:rPr lang="es-AR" dirty="0" smtClean="0"/>
-              <a:t>El filtrado se obtiene aplicando la operación de convolución sobre la matriz de la imagen.</a:t>
-            </a:r>
-          </a:p>
-          <a:p>
             <a:endParaRPr lang="es-AR" dirty="0" smtClean="0"/>
           </a:p>
           <a:p>
             <a:r>
               <a:rPr lang="es-AR" dirty="0" smtClean="0"/>
-              <a:t>Al finalizar esta etapa se logra reducir el ruido en la lectura de la imagen</a:t>
-            </a:r>
-          </a:p>
-          <a:p>
-            <a:pPr lvl="1"/>
-            <a:r>
-              <a:rPr lang="es-AR" dirty="0" smtClean="0"/>
-              <a:t>Pequeñas manchas en el papel</a:t>
-            </a:r>
-          </a:p>
-          <a:p>
-            <a:pPr lvl="1"/>
-            <a:r>
-              <a:rPr lang="es-AR" dirty="0" smtClean="0"/>
-              <a:t>Sombras</a:t>
-            </a:r>
-          </a:p>
-          <a:p>
-            <a:pPr lvl="1"/>
+              <a:t>Entrada: imagen a color con 3 componentes por color (RGB)</a:t>
+            </a:r>
+          </a:p>
+          <a:p>
             <a:endParaRPr lang="es-AR" dirty="0" smtClean="0"/>
+          </a:p>
+          <a:p>
+            <a:r>
+              <a:rPr lang="es-AR" dirty="0" smtClean="0"/>
+              <a:t>Convierte la imagen a escala de 256 tonos de grises.</a:t>
+            </a:r>
+          </a:p>
+          <a:p>
+            <a:endParaRPr lang="es-AR" dirty="0" smtClean="0"/>
+          </a:p>
+          <a:p>
+            <a:r>
+              <a:rPr lang="es-AR" dirty="0" smtClean="0"/>
+              <a:t>Enfatiza detalles del carccter y facilita el procesamiento de la imagen.</a:t>
+            </a:r>
+            <a:endParaRPr lang="es-AR" dirty="0"/>
           </a:p>
         </p:txBody>
       </p:sp>
@@ -15111,7 +15222,7 @@
           <a:bodyPr/>
           <a:lstStyle/>
           <a:p>
-            <a:pPr algn="ctr"/>
+            <a:pPr lvl="0" algn="ctr"/>
             <a:r>
               <a:rPr lang="es-AR" dirty="0" smtClean="0"/>
               <a:t>Filtration and Binaryzation</a:t>
@@ -15169,7 +15280,7 @@
           <a:p>
             <a:r>
               <a:rPr lang="es-AR" dirty="0" smtClean="0"/>
-              <a:t>La imagen puede ser limpiada tanto como uno desee, pero el tamaño es un problema mayor.</a:t>
+              <a:t>El filtrado se obtiene aplicando la operación de convolución sobre la matriz de la imagen.</a:t>
             </a:r>
           </a:p>
           <a:p>
@@ -15178,11 +15289,26 @@
           <a:p>
             <a:r>
               <a:rPr lang="es-AR" dirty="0" smtClean="0"/>
-              <a:t>Esta etapa consiste en rotar, trasladar y redimensionar el caracter en cuestion.</a:t>
-            </a:r>
-          </a:p>
-          <a:p>
-            <a:endParaRPr lang="es-AR" dirty="0"/>
+              <a:t>Al finalizar esta etapa se logra reducir el ruido en la lectura de la imagen</a:t>
+            </a:r>
+          </a:p>
+          <a:p>
+            <a:pPr lvl="1"/>
+            <a:r>
+              <a:rPr lang="es-AR" dirty="0" smtClean="0"/>
+              <a:t>Pequeñas manchas en el papel</a:t>
+            </a:r>
+          </a:p>
+          <a:p>
+            <a:pPr lvl="1"/>
+            <a:r>
+              <a:rPr lang="es-AR" dirty="0" smtClean="0"/>
+              <a:t>Sombras</a:t>
+            </a:r>
+          </a:p>
+          <a:p>
+            <a:pPr lvl="1"/>
+            <a:endParaRPr lang="es-AR" dirty="0" smtClean="0"/>
           </a:p>
         </p:txBody>
       </p:sp>
@@ -15204,7 +15330,7 @@
             <a:pPr algn="ctr"/>
             <a:r>
               <a:rPr lang="es-AR" dirty="0" smtClean="0"/>
-              <a:t>Normalization</a:t>
+              <a:t>Filtration and Binaryzation</a:t>
             </a:r>
             <a:endParaRPr lang="es-AR" dirty="0"/>
           </a:p>

</xml_diff>